<commit_message>
Final constexpr fixes and more
git-svn-id: https://svn.code.sf.net/p/cpp-lects-rus/code/trunk@333 39143b06-f351-456c-9f92-4cd32fad6823
</commit_message>
<xml_diff>
--- a/other_lects/informatics/08-realworld.pptx
+++ b/other_lects/informatics/08-realworld.pptx
@@ -20,7 +20,16 @@
     <p:sldId id="270" r:id="rId14"/>
     <p:sldId id="271" r:id="rId15"/>
     <p:sldId id="272" r:id="rId16"/>
-    <p:sldId id="258" r:id="rId17"/>
+    <p:sldId id="273" r:id="rId17"/>
+    <p:sldId id="278" r:id="rId18"/>
+    <p:sldId id="279" r:id="rId19"/>
+    <p:sldId id="274" r:id="rId20"/>
+    <p:sldId id="275" r:id="rId21"/>
+    <p:sldId id="276" r:id="rId22"/>
+    <p:sldId id="277" r:id="rId23"/>
+    <p:sldId id="280" r:id="rId24"/>
+    <p:sldId id="281" r:id="rId25"/>
+    <p:sldId id="258" r:id="rId26"/>
   </p:sldIdLst>
   <p:sldSz cx="12192000" cy="6858000"/>
   <p:notesSz cx="6858000" cy="9144000"/>
@@ -7334,7 +7343,7 @@
             <a:fld id="{96DFF08F-DC6B-4601-B491-B0F83F6DD2DA}" type="datetimeFigureOut">
               <a:rPr lang="en-US" dirty="0"/>
               <a:pPr/>
-              <a:t>4/13/2019</a:t>
+              <a:t>4/14/2019</a:t>
             </a:fld>
             <a:endParaRPr lang="en-US" dirty="0"/>
           </a:p>
@@ -7551,7 +7560,7 @@
           <a:p>
             <a:fld id="{96DFF08F-DC6B-4601-B491-B0F83F6DD2DA}" type="datetimeFigureOut">
               <a:rPr lang="en-US" dirty="0"/>
-              <a:t>4/13/2019</a:t>
+              <a:t>4/14/2019</a:t>
             </a:fld>
             <a:endParaRPr lang="en-US" dirty="0"/>
           </a:p>
@@ -7726,7 +7735,7 @@
           <a:p>
             <a:fld id="{96DFF08F-DC6B-4601-B491-B0F83F6DD2DA}" type="datetimeFigureOut">
               <a:rPr lang="en-US" dirty="0"/>
-              <a:t>4/13/2019</a:t>
+              <a:t>4/14/2019</a:t>
             </a:fld>
             <a:endParaRPr lang="en-US" dirty="0"/>
           </a:p>
@@ -7891,7 +7900,7 @@
           <a:p>
             <a:fld id="{96DFF08F-DC6B-4601-B491-B0F83F6DD2DA}" type="datetimeFigureOut">
               <a:rPr lang="en-US" dirty="0"/>
-              <a:t>4/13/2019</a:t>
+              <a:t>4/14/2019</a:t>
             </a:fld>
             <a:endParaRPr lang="en-US" dirty="0"/>
           </a:p>
@@ -8137,7 +8146,7 @@
           <a:p>
             <a:fld id="{96DFF08F-DC6B-4601-B491-B0F83F6DD2DA}" type="datetimeFigureOut">
               <a:rPr lang="en-US" dirty="0"/>
-              <a:t>4/13/2019</a:t>
+              <a:t>4/14/2019</a:t>
             </a:fld>
             <a:endParaRPr lang="en-US" dirty="0"/>
           </a:p>
@@ -8455,7 +8464,7 @@
           <a:p>
             <a:fld id="{96DFF08F-DC6B-4601-B491-B0F83F6DD2DA}" type="datetimeFigureOut">
               <a:rPr lang="en-US" dirty="0"/>
-              <a:t>4/13/2019</a:t>
+              <a:t>4/14/2019</a:t>
             </a:fld>
             <a:endParaRPr lang="en-US" dirty="0"/>
           </a:p>
@@ -8874,7 +8883,7 @@
           <a:p>
             <a:fld id="{96DFF08F-DC6B-4601-B491-B0F83F6DD2DA}" type="datetimeFigureOut">
               <a:rPr lang="en-US" dirty="0"/>
-              <a:t>4/13/2019</a:t>
+              <a:t>4/14/2019</a:t>
             </a:fld>
             <a:endParaRPr lang="en-US" dirty="0"/>
           </a:p>
@@ -8987,7 +8996,7 @@
           <a:p>
             <a:fld id="{96DFF08F-DC6B-4601-B491-B0F83F6DD2DA}" type="datetimeFigureOut">
               <a:rPr lang="en-US" dirty="0"/>
-              <a:t>4/13/2019</a:t>
+              <a:t>4/14/2019</a:t>
             </a:fld>
             <a:endParaRPr lang="en-US" dirty="0"/>
           </a:p>
@@ -9077,7 +9086,7 @@
           <a:p>
             <a:fld id="{96DFF08F-DC6B-4601-B491-B0F83F6DD2DA}" type="datetimeFigureOut">
               <a:rPr lang="en-US" dirty="0"/>
-              <a:t>4/13/2019</a:t>
+              <a:t>4/14/2019</a:t>
             </a:fld>
             <a:endParaRPr lang="en-US" dirty="0"/>
           </a:p>
@@ -9362,7 +9371,7 @@
           <a:p>
             <a:fld id="{96DFF08F-DC6B-4601-B491-B0F83F6DD2DA}" type="datetimeFigureOut">
               <a:rPr lang="en-US" dirty="0"/>
-              <a:t>4/13/2019</a:t>
+              <a:t>4/14/2019</a:t>
             </a:fld>
             <a:endParaRPr lang="en-US" dirty="0"/>
           </a:p>
@@ -9629,7 +9638,7 @@
           <a:p>
             <a:fld id="{96DFF08F-DC6B-4601-B491-B0F83F6DD2DA}" type="datetimeFigureOut">
               <a:rPr lang="en-US" dirty="0"/>
-              <a:t>4/13/2019</a:t>
+              <a:t>4/14/2019</a:t>
             </a:fld>
             <a:endParaRPr lang="en-US" dirty="0"/>
           </a:p>
@@ -9878,7 +9887,7 @@
             <a:fld id="{96DFF08F-DC6B-4601-B491-B0F83F6DD2DA}" type="datetimeFigureOut">
               <a:rPr lang="en-US" dirty="0"/>
               <a:pPr/>
-              <a:t>4/13/2019</a:t>
+              <a:t>4/14/2019</a:t>
             </a:fld>
             <a:endParaRPr lang="en-US" dirty="0"/>
           </a:p>
@@ -13564,6 +13573,2314 @@
       </p:grpSpPr>
       <p:sp>
         <p:nvSpPr>
+          <p:cNvPr id="2" name="Title 1">
+            <a:extLst>
+              <a:ext uri="{FF2B5EF4-FFF2-40B4-BE49-F238E27FC236}">
+                <a16:creationId xmlns:a16="http://schemas.microsoft.com/office/drawing/2014/main" id="{FABB7056-EEE1-4E75-9ABE-A4742966097B}"/>
+              </a:ext>
+            </a:extLst>
+          </p:cNvPr>
+          <p:cNvSpPr>
+            <a:spLocks noGrp="1"/>
+          </p:cNvSpPr>
+          <p:nvPr>
+            <p:ph type="title"/>
+          </p:nvPr>
+        </p:nvSpPr>
+        <p:spPr/>
+        <p:txBody>
+          <a:bodyPr/>
+          <a:lstStyle/>
+          <a:p>
+            <a:r>
+              <a:rPr lang="ru-RU"/>
+              <a:t>Обсуждение</a:t>
+            </a:r>
+          </a:p>
+        </p:txBody>
+      </p:sp>
+      <p:sp>
+        <p:nvSpPr>
+          <p:cNvPr id="3" name="Content Placeholder 2">
+            <a:extLst>
+              <a:ext uri="{FF2B5EF4-FFF2-40B4-BE49-F238E27FC236}">
+                <a16:creationId xmlns:a16="http://schemas.microsoft.com/office/drawing/2014/main" id="{C8A54D07-E50D-4A47-A9E7-B308604FB3D0}"/>
+              </a:ext>
+            </a:extLst>
+          </p:cNvPr>
+          <p:cNvSpPr>
+            <a:spLocks noGrp="1"/>
+          </p:cNvSpPr>
+          <p:nvPr>
+            <p:ph idx="1"/>
+          </p:nvPr>
+        </p:nvSpPr>
+        <p:spPr/>
+        <p:txBody>
+          <a:bodyPr/>
+          <a:lstStyle/>
+          <a:p>
+            <a:r>
+              <a:rPr lang="ru-RU"/>
+              <a:t>Предположим, что вы не знаете размер кэшей на вашем компьютере</a:t>
+            </a:r>
+          </a:p>
+          <a:p>
+            <a:r>
+              <a:rPr lang="ru-RU"/>
+              <a:t>Как бы вы его выяснили?</a:t>
+            </a:r>
+          </a:p>
+          <a:p>
+            <a:endParaRPr lang="ru-RU"/>
+          </a:p>
+        </p:txBody>
+      </p:sp>
+    </p:spTree>
+    <p:extLst>
+      <p:ext uri="{BB962C8B-B14F-4D97-AF65-F5344CB8AC3E}">
+        <p14:creationId xmlns:p14="http://schemas.microsoft.com/office/powerpoint/2010/main" val="4179952216"/>
+      </p:ext>
+    </p:extLst>
+  </p:cSld>
+  <p:clrMapOvr>
+    <a:masterClrMapping/>
+  </p:clrMapOvr>
+</p:sld>
+</file>
+
+<file path=ppt/slides/slide17.xml><?xml version="1.0" encoding="utf-8"?>
+<p:sld xmlns:a="http://schemas.openxmlformats.org/drawingml/2006/main" xmlns:r="http://schemas.openxmlformats.org/officeDocument/2006/relationships" xmlns:p="http://schemas.openxmlformats.org/presentationml/2006/main">
+  <p:cSld>
+    <p:spTree>
+      <p:nvGrpSpPr>
+        <p:cNvPr id="1" name=""/>
+        <p:cNvGrpSpPr/>
+        <p:nvPr/>
+      </p:nvGrpSpPr>
+      <p:grpSpPr>
+        <a:xfrm>
+          <a:off x="0" y="0"/>
+          <a:ext cx="0" cy="0"/>
+          <a:chOff x="0" y="0"/>
+          <a:chExt cx="0" cy="0"/>
+        </a:xfrm>
+      </p:grpSpPr>
+      <p:sp>
+        <p:nvSpPr>
+          <p:cNvPr id="2" name="Title 1">
+            <a:extLst>
+              <a:ext uri="{FF2B5EF4-FFF2-40B4-BE49-F238E27FC236}">
+                <a16:creationId xmlns:a16="http://schemas.microsoft.com/office/drawing/2014/main" id="{2EA4B09E-7579-40B7-82FA-49DC1DE30960}"/>
+              </a:ext>
+            </a:extLst>
+          </p:cNvPr>
+          <p:cNvSpPr>
+            <a:spLocks noGrp="1"/>
+          </p:cNvSpPr>
+          <p:nvPr>
+            <p:ph type="title"/>
+          </p:nvPr>
+        </p:nvSpPr>
+        <p:spPr/>
+        <p:txBody>
+          <a:bodyPr/>
+          <a:lstStyle/>
+          <a:p>
+            <a:r>
+              <a:rPr lang="ru-RU"/>
+              <a:t>Метод Монте-Карло</a:t>
+            </a:r>
+          </a:p>
+        </p:txBody>
+      </p:sp>
+      <mc:AlternateContent xmlns:mc="http://schemas.openxmlformats.org/markup-compatibility/2006" xmlns:a14="http://schemas.microsoft.com/office/drawing/2010/main">
+        <mc:Choice Requires="a14">
+          <p:sp>
+            <p:nvSpPr>
+              <p:cNvPr id="3" name="Content Placeholder 2">
+                <a:extLst>
+                  <a:ext uri="{FF2B5EF4-FFF2-40B4-BE49-F238E27FC236}">
+                    <a16:creationId xmlns:a16="http://schemas.microsoft.com/office/drawing/2014/main" id="{7A2D3647-963C-46B2-96C1-0F0DF61C2005}"/>
+                  </a:ext>
+                </a:extLst>
+              </p:cNvPr>
+              <p:cNvSpPr>
+                <a:spLocks noGrp="1"/>
+              </p:cNvSpPr>
+              <p:nvPr>
+                <p:ph idx="1"/>
+              </p:nvPr>
+            </p:nvSpPr>
+            <p:spPr/>
+            <p:txBody>
+              <a:bodyPr/>
+              <a:lstStyle/>
+              <a:p>
+                <a:r>
+                  <a:rPr lang="ru-RU"/>
+                  <a:t>Предположим, у нас есть массив размера </a:t>
+                </a:r>
+                <a14:m>
+                  <m:oMath xmlns:m="http://schemas.openxmlformats.org/officeDocument/2006/math">
+                    <m:r>
+                      <a:rPr lang="en-US" i="1" smtClean="0">
+                        <a:latin typeface="Cambria Math" panose="02040503050406030204" pitchFamily="18" charset="0"/>
+                      </a:rPr>
+                      <m:t>𝑁</m:t>
+                    </m:r>
+                  </m:oMath>
+                </a14:m>
+                <a:endParaRPr lang="en-US"/>
+              </a:p>
+              <a:p>
+                <a:r>
+                  <a:rPr lang="ru-RU"/>
+                  <a:t>Если к этому массиву обращаться (например инкрементировать элементы) последовательно и замерить время </a:t>
+                </a:r>
+                <a14:m>
+                  <m:oMath xmlns:m="http://schemas.openxmlformats.org/officeDocument/2006/math">
+                    <m:sSub>
+                      <m:sSubPr>
+                        <m:ctrlPr>
+                          <a:rPr lang="ru-RU" i="1" smtClean="0">
+                            <a:latin typeface="Cambria Math" panose="02040503050406030204" pitchFamily="18" charset="0"/>
+                          </a:rPr>
+                        </m:ctrlPr>
+                      </m:sSubPr>
+                      <m:e>
+                        <m:r>
+                          <a:rPr lang="en-US" b="0" i="1" smtClean="0">
+                            <a:latin typeface="Cambria Math" panose="02040503050406030204" pitchFamily="18" charset="0"/>
+                          </a:rPr>
+                          <m:t>𝑡</m:t>
+                        </m:r>
+                      </m:e>
+                      <m:sub>
+                        <m:r>
+                          <a:rPr lang="en-US" b="0" i="1" smtClean="0">
+                            <a:latin typeface="Cambria Math" panose="02040503050406030204" pitchFamily="18" charset="0"/>
+                          </a:rPr>
+                          <m:t>1</m:t>
+                        </m:r>
+                      </m:sub>
+                    </m:sSub>
+                  </m:oMath>
+                </a14:m>
+                <a:endParaRPr lang="en-US"/>
+              </a:p>
+              <a:p>
+                <a:r>
+                  <a:rPr lang="ru-RU"/>
+                  <a:t>А потом сделать такое же количество обращений по случайным адресам и замерить время </a:t>
+                </a:r>
+                <a14:m>
+                  <m:oMath xmlns:m="http://schemas.openxmlformats.org/officeDocument/2006/math">
+                    <m:sSub>
+                      <m:sSubPr>
+                        <m:ctrlPr>
+                          <a:rPr lang="ru-RU" i="1">
+                            <a:latin typeface="Cambria Math" panose="02040503050406030204" pitchFamily="18" charset="0"/>
+                          </a:rPr>
+                        </m:ctrlPr>
+                      </m:sSubPr>
+                      <m:e>
+                        <m:r>
+                          <a:rPr lang="en-US" i="1">
+                            <a:latin typeface="Cambria Math" panose="02040503050406030204" pitchFamily="18" charset="0"/>
+                          </a:rPr>
+                          <m:t>𝑡</m:t>
+                        </m:r>
+                      </m:e>
+                      <m:sub>
+                        <m:r>
+                          <a:rPr lang="ru-RU" b="0" i="1" smtClean="0">
+                            <a:latin typeface="Cambria Math" panose="02040503050406030204" pitchFamily="18" charset="0"/>
+                          </a:rPr>
+                          <m:t>2</m:t>
+                        </m:r>
+                      </m:sub>
+                    </m:sSub>
+                  </m:oMath>
+                </a14:m>
+                <a:endParaRPr lang="ru-RU"/>
+              </a:p>
+              <a:p>
+                <a:r>
+                  <a:rPr lang="ru-RU"/>
+                  <a:t>То что нам скажет соотношение </a:t>
+                </a:r>
+                <a14:m>
+                  <m:oMath xmlns:m="http://schemas.openxmlformats.org/officeDocument/2006/math">
+                    <m:sSub>
+                      <m:sSubPr>
+                        <m:ctrlPr>
+                          <a:rPr lang="ru-RU" i="1">
+                            <a:latin typeface="Cambria Math" panose="02040503050406030204" pitchFamily="18" charset="0"/>
+                          </a:rPr>
+                        </m:ctrlPr>
+                      </m:sSubPr>
+                      <m:e>
+                        <m:r>
+                          <a:rPr lang="en-US" i="1">
+                            <a:latin typeface="Cambria Math" panose="02040503050406030204" pitchFamily="18" charset="0"/>
+                          </a:rPr>
+                          <m:t>𝑡</m:t>
+                        </m:r>
+                      </m:e>
+                      <m:sub>
+                        <m:r>
+                          <a:rPr lang="en-US" i="1">
+                            <a:latin typeface="Cambria Math" panose="02040503050406030204" pitchFamily="18" charset="0"/>
+                          </a:rPr>
+                          <m:t>1</m:t>
+                        </m:r>
+                      </m:sub>
+                    </m:sSub>
+                  </m:oMath>
+                </a14:m>
+                <a:r>
+                  <a:rPr lang="ru-RU"/>
+                  <a:t> и </a:t>
+                </a:r>
+                <a14:m>
+                  <m:oMath xmlns:m="http://schemas.openxmlformats.org/officeDocument/2006/math">
+                    <m:sSub>
+                      <m:sSubPr>
+                        <m:ctrlPr>
+                          <a:rPr lang="ru-RU" i="1">
+                            <a:latin typeface="Cambria Math" panose="02040503050406030204" pitchFamily="18" charset="0"/>
+                          </a:rPr>
+                        </m:ctrlPr>
+                      </m:sSubPr>
+                      <m:e>
+                        <m:r>
+                          <a:rPr lang="en-US" i="1">
+                            <a:latin typeface="Cambria Math" panose="02040503050406030204" pitchFamily="18" charset="0"/>
+                          </a:rPr>
+                          <m:t>𝑡</m:t>
+                        </m:r>
+                      </m:e>
+                      <m:sub>
+                        <m:r>
+                          <a:rPr lang="ru-RU" b="0" i="1" smtClean="0">
+                            <a:latin typeface="Cambria Math" panose="02040503050406030204" pitchFamily="18" charset="0"/>
+                          </a:rPr>
+                          <m:t>2</m:t>
+                        </m:r>
+                      </m:sub>
+                    </m:sSub>
+                  </m:oMath>
+                </a14:m>
+                <a:r>
+                  <a:rPr lang="ru-RU"/>
+                  <a:t> для разных </a:t>
+                </a:r>
+                <a14:m>
+                  <m:oMath xmlns:m="http://schemas.openxmlformats.org/officeDocument/2006/math">
+                    <m:r>
+                      <a:rPr lang="en-US" i="1" smtClean="0">
+                        <a:latin typeface="Cambria Math" panose="02040503050406030204" pitchFamily="18" charset="0"/>
+                      </a:rPr>
+                      <m:t>𝑁</m:t>
+                    </m:r>
+                  </m:oMath>
+                </a14:m>
+                <a:r>
+                  <a:rPr lang="en-US"/>
+                  <a:t>?</a:t>
+                </a:r>
+              </a:p>
+              <a:p>
+                <a:r>
+                  <a:rPr lang="ru-RU"/>
+                  <a:t>Можем ли мы использовать этот метод для оценки эффективного размера кэшей на своей машине?</a:t>
+                </a:r>
+              </a:p>
+              <a:p>
+                <a:r>
+                  <a:rPr lang="ru-RU"/>
+                  <a:t>Проведите соотв. эксперименты и замеры</a:t>
+                </a:r>
+              </a:p>
+            </p:txBody>
+          </p:sp>
+        </mc:Choice>
+        <mc:Fallback xmlns="">
+          <p:sp>
+            <p:nvSpPr>
+              <p:cNvPr id="3" name="Content Placeholder 2">
+                <a:extLst>
+                  <a:ext uri="{FF2B5EF4-FFF2-40B4-BE49-F238E27FC236}">
+                    <a16:creationId xmlns:a16="http://schemas.microsoft.com/office/drawing/2014/main" id="{7A2D3647-963C-46B2-96C1-0F0DF61C2005}"/>
+                  </a:ext>
+                </a:extLst>
+              </p:cNvPr>
+              <p:cNvSpPr>
+                <a:spLocks noGrp="1" noRot="1" noChangeAspect="1" noMove="1" noResize="1" noEditPoints="1" noAdjustHandles="1" noChangeArrowheads="1" noChangeShapeType="1" noTextEdit="1"/>
+              </p:cNvSpPr>
+              <p:nvPr>
+                <p:ph idx="1"/>
+              </p:nvPr>
+            </p:nvSpPr>
+            <p:spPr>
+              <a:blipFill>
+                <a:blip r:embed="rId2"/>
+                <a:stretch>
+                  <a:fillRect t="-1813"/>
+                </a:stretch>
+              </a:blipFill>
+            </p:spPr>
+            <p:txBody>
+              <a:bodyPr/>
+              <a:lstStyle/>
+              <a:p>
+                <a:r>
+                  <a:rPr lang="ru-RU">
+                    <a:noFill/>
+                  </a:rPr>
+                  <a:t> </a:t>
+                </a:r>
+              </a:p>
+            </p:txBody>
+          </p:sp>
+        </mc:Fallback>
+      </mc:AlternateContent>
+    </p:spTree>
+    <p:extLst>
+      <p:ext uri="{BB962C8B-B14F-4D97-AF65-F5344CB8AC3E}">
+        <p14:creationId xmlns:p14="http://schemas.microsoft.com/office/powerpoint/2010/main" val="3183721547"/>
+      </p:ext>
+    </p:extLst>
+  </p:cSld>
+  <p:clrMapOvr>
+    <a:masterClrMapping/>
+  </p:clrMapOvr>
+</p:sld>
+</file>
+
+<file path=ppt/slides/slide18.xml><?xml version="1.0" encoding="utf-8"?>
+<p:sld xmlns:a="http://schemas.openxmlformats.org/drawingml/2006/main" xmlns:r="http://schemas.openxmlformats.org/officeDocument/2006/relationships" xmlns:p="http://schemas.openxmlformats.org/presentationml/2006/main">
+  <p:cSld>
+    <p:spTree>
+      <p:nvGrpSpPr>
+        <p:cNvPr id="1" name=""/>
+        <p:cNvGrpSpPr/>
+        <p:nvPr/>
+      </p:nvGrpSpPr>
+      <p:grpSpPr>
+        <a:xfrm>
+          <a:off x="0" y="0"/>
+          <a:ext cx="0" cy="0"/>
+          <a:chOff x="0" y="0"/>
+          <a:chExt cx="0" cy="0"/>
+        </a:xfrm>
+      </p:grpSpPr>
+      <p:sp>
+        <p:nvSpPr>
+          <p:cNvPr id="2" name="Title 1">
+            <a:extLst>
+              <a:ext uri="{FF2B5EF4-FFF2-40B4-BE49-F238E27FC236}">
+                <a16:creationId xmlns:a16="http://schemas.microsoft.com/office/drawing/2014/main" id="{BC0DC8DE-9CEB-4CDB-9C8B-EC64E676DED7}"/>
+              </a:ext>
+            </a:extLst>
+          </p:cNvPr>
+          <p:cNvSpPr>
+            <a:spLocks noGrp="1"/>
+          </p:cNvSpPr>
+          <p:nvPr>
+            <p:ph type="title"/>
+          </p:nvPr>
+        </p:nvSpPr>
+        <p:spPr/>
+        <p:txBody>
+          <a:bodyPr/>
+          <a:lstStyle/>
+          <a:p>
+            <a:r>
+              <a:rPr lang="ru-RU"/>
+              <a:t>Эффекты кэшей и асимптотика</a:t>
+            </a:r>
+          </a:p>
+        </p:txBody>
+      </p:sp>
+      <p:sp>
+        <p:nvSpPr>
+          <p:cNvPr id="3" name="Content Placeholder 2">
+            <a:extLst>
+              <a:ext uri="{FF2B5EF4-FFF2-40B4-BE49-F238E27FC236}">
+                <a16:creationId xmlns:a16="http://schemas.microsoft.com/office/drawing/2014/main" id="{24738B28-B8A9-4F88-B631-7A004E292FB6}"/>
+              </a:ext>
+            </a:extLst>
+          </p:cNvPr>
+          <p:cNvSpPr>
+            <a:spLocks noGrp="1"/>
+          </p:cNvSpPr>
+          <p:nvPr>
+            <p:ph idx="1"/>
+          </p:nvPr>
+        </p:nvSpPr>
+        <p:spPr/>
+        <p:txBody>
+          <a:bodyPr/>
+          <a:lstStyle/>
+          <a:p>
+            <a:r>
+              <a:rPr lang="ru-RU"/>
+              <a:t>Плохая кэш-локальность может снизить производительность в </a:t>
+            </a:r>
+            <a:r>
+              <a:rPr lang="en-US">
+                <a:latin typeface="Consolas" panose="020B0609020204030204" pitchFamily="49" charset="0"/>
+              </a:rPr>
+              <a:t>20</a:t>
+            </a:r>
+            <a:r>
+              <a:rPr lang="en-US"/>
+              <a:t>-</a:t>
+            </a:r>
+            <a:r>
+              <a:rPr lang="en-US">
+                <a:latin typeface="Consolas" panose="020B0609020204030204" pitchFamily="49" charset="0"/>
+              </a:rPr>
+              <a:t>30</a:t>
+            </a:r>
+            <a:r>
+              <a:rPr lang="en-US"/>
+              <a:t> </a:t>
+            </a:r>
+            <a:r>
+              <a:rPr lang="ru-RU"/>
+              <a:t>раз</a:t>
+            </a:r>
+          </a:p>
+          <a:p>
+            <a:r>
+              <a:rPr lang="ru-RU"/>
+              <a:t>Предположим, что у вас есть выбор между алгоритмом </a:t>
+            </a:r>
+            <a:r>
+              <a:rPr lang="en-US"/>
+              <a:t>O(NlogN) </a:t>
+            </a:r>
+            <a:r>
+              <a:rPr lang="ru-RU"/>
+              <a:t>с хорошей локальностью данных и алгоритмом </a:t>
+            </a:r>
+            <a:r>
+              <a:rPr lang="en-US"/>
+              <a:t>O(N) </a:t>
+            </a:r>
+            <a:r>
+              <a:rPr lang="ru-RU"/>
+              <a:t>с плохой локальностью</a:t>
+            </a:r>
+          </a:p>
+          <a:p>
+            <a:r>
+              <a:rPr lang="ru-RU"/>
+              <a:t>Каким должен быть выбор для разных </a:t>
+            </a:r>
+            <a:r>
+              <a:rPr lang="en-US"/>
+              <a:t>N?</a:t>
+            </a:r>
+            <a:endParaRPr lang="ru-RU"/>
+          </a:p>
+        </p:txBody>
+      </p:sp>
+    </p:spTree>
+    <p:extLst>
+      <p:ext uri="{BB962C8B-B14F-4D97-AF65-F5344CB8AC3E}">
+        <p14:creationId xmlns:p14="http://schemas.microsoft.com/office/powerpoint/2010/main" val="3006709348"/>
+      </p:ext>
+    </p:extLst>
+  </p:cSld>
+  <p:clrMapOvr>
+    <a:masterClrMapping/>
+  </p:clrMapOvr>
+</p:sld>
+</file>
+
+<file path=ppt/slides/slide19.xml><?xml version="1.0" encoding="utf-8"?>
+<p:sld xmlns:a="http://schemas.openxmlformats.org/drawingml/2006/main" xmlns:r="http://schemas.openxmlformats.org/officeDocument/2006/relationships" xmlns:p="http://schemas.openxmlformats.org/presentationml/2006/main">
+  <p:cSld>
+    <p:spTree>
+      <p:nvGrpSpPr>
+        <p:cNvPr id="1" name=""/>
+        <p:cNvGrpSpPr/>
+        <p:nvPr/>
+      </p:nvGrpSpPr>
+      <p:grpSpPr>
+        <a:xfrm>
+          <a:off x="0" y="0"/>
+          <a:ext cx="0" cy="0"/>
+          <a:chOff x="0" y="0"/>
+          <a:chExt cx="0" cy="0"/>
+        </a:xfrm>
+      </p:grpSpPr>
+      <p:sp>
+        <p:nvSpPr>
+          <p:cNvPr id="2" name="Title 1">
+            <a:extLst>
+              <a:ext uri="{FF2B5EF4-FFF2-40B4-BE49-F238E27FC236}">
+                <a16:creationId xmlns:a16="http://schemas.microsoft.com/office/drawing/2014/main" id="{C5A05B98-0C67-4E02-B8C2-3B5DB3D60A8C}"/>
+              </a:ext>
+            </a:extLst>
+          </p:cNvPr>
+          <p:cNvSpPr>
+            <a:spLocks noGrp="1"/>
+          </p:cNvSpPr>
+          <p:nvPr>
+            <p:ph type="title"/>
+          </p:nvPr>
+        </p:nvSpPr>
+        <p:spPr/>
+        <p:txBody>
+          <a:bodyPr/>
+          <a:lstStyle/>
+          <a:p>
+            <a:r>
+              <a:rPr lang="ru-RU"/>
+              <a:t>Кэш как структура данных</a:t>
+            </a:r>
+          </a:p>
+        </p:txBody>
+      </p:sp>
+      <p:sp>
+        <p:nvSpPr>
+          <p:cNvPr id="3" name="Content Placeholder 2">
+            <a:extLst>
+              <a:ext uri="{FF2B5EF4-FFF2-40B4-BE49-F238E27FC236}">
+                <a16:creationId xmlns:a16="http://schemas.microsoft.com/office/drawing/2014/main" id="{E612F2F9-5CDB-42F1-A715-F3CD1C56D0F5}"/>
+              </a:ext>
+            </a:extLst>
+          </p:cNvPr>
+          <p:cNvSpPr>
+            <a:spLocks noGrp="1"/>
+          </p:cNvSpPr>
+          <p:nvPr>
+            <p:ph idx="1"/>
+          </p:nvPr>
+        </p:nvSpPr>
+        <p:spPr>
+          <a:xfrm>
+            <a:off x="1143000" y="2057399"/>
+            <a:ext cx="9872871" cy="4536347"/>
+          </a:xfrm>
+        </p:spPr>
+        <p:txBody>
+          <a:bodyPr>
+            <a:normAutofit/>
+          </a:bodyPr>
+          <a:lstStyle/>
+          <a:p>
+            <a:r>
+              <a:rPr lang="ru-RU"/>
+              <a:t>Есть страницы по </a:t>
+            </a:r>
+            <a:r>
+              <a:rPr lang="ru-RU">
+                <a:latin typeface="Consolas" panose="020B0609020204030204" pitchFamily="49" charset="0"/>
+              </a:rPr>
+              <a:t>64</a:t>
+            </a:r>
+            <a:r>
+              <a:rPr lang="ru-RU"/>
+              <a:t> байта, включая номер</a:t>
+            </a:r>
+          </a:p>
+          <a:p>
+            <a:pPr marL="45720" indent="0">
+              <a:buNone/>
+            </a:pPr>
+            <a:r>
+              <a:rPr lang="en-US">
+                <a:latin typeface="Consolas" panose="020B0609020204030204" pitchFamily="49" charset="0"/>
+              </a:rPr>
+              <a:t>struct page {</a:t>
+            </a:r>
+            <a:br>
+              <a:rPr lang="en-US">
+                <a:latin typeface="Consolas" panose="020B0609020204030204" pitchFamily="49" charset="0"/>
+              </a:rPr>
+            </a:br>
+            <a:r>
+              <a:rPr lang="en-US">
+                <a:latin typeface="Consolas" panose="020B0609020204030204" pitchFamily="49" charset="0"/>
+              </a:rPr>
+              <a:t>  int index;     </a:t>
+            </a:r>
+            <a:r>
+              <a:rPr lang="en-US">
+                <a:solidFill>
+                  <a:schemeClr val="bg1">
+                    <a:lumMod val="50000"/>
+                  </a:schemeClr>
+                </a:solidFill>
+                <a:latin typeface="Consolas" panose="020B0609020204030204" pitchFamily="49" charset="0"/>
+              </a:rPr>
+              <a:t>// page index: 1, 2, ... n</a:t>
+            </a:r>
+            <a:br>
+              <a:rPr lang="en-US">
+                <a:solidFill>
+                  <a:schemeClr val="bg1">
+                    <a:lumMod val="50000"/>
+                  </a:schemeClr>
+                </a:solidFill>
+                <a:latin typeface="Consolas" panose="020B0609020204030204" pitchFamily="49" charset="0"/>
+              </a:rPr>
+            </a:br>
+            <a:r>
+              <a:rPr lang="en-US">
+                <a:latin typeface="Consolas" panose="020B0609020204030204" pitchFamily="49" charset="0"/>
+              </a:rPr>
+              <a:t>  char data[60]; </a:t>
+            </a:r>
+            <a:r>
+              <a:rPr lang="en-US">
+                <a:solidFill>
+                  <a:schemeClr val="bg1">
+                    <a:lumMod val="50000"/>
+                  </a:schemeClr>
+                </a:solidFill>
+                <a:latin typeface="Consolas" panose="020B0609020204030204" pitchFamily="49" charset="0"/>
+              </a:rPr>
+              <a:t>// page data</a:t>
+            </a:r>
+            <a:br>
+              <a:rPr lang="en-US">
+                <a:latin typeface="Consolas" panose="020B0609020204030204" pitchFamily="49" charset="0"/>
+              </a:rPr>
+            </a:br>
+            <a:r>
+              <a:rPr lang="en-US">
+                <a:latin typeface="Consolas" panose="020B0609020204030204" pitchFamily="49" charset="0"/>
+              </a:rPr>
+              <a:t>};</a:t>
+            </a:r>
+            <a:endParaRPr lang="ru-RU">
+              <a:latin typeface="Consolas" panose="020B0609020204030204" pitchFamily="49" charset="0"/>
+            </a:endParaRPr>
+          </a:p>
+          <a:p>
+            <a:r>
+              <a:rPr lang="ru-RU"/>
+              <a:t>Также существует медленная функция</a:t>
+            </a:r>
+            <a:endParaRPr lang="en-US"/>
+          </a:p>
+          <a:p>
+            <a:pPr marL="45720" indent="0">
+              <a:buNone/>
+            </a:pPr>
+            <a:r>
+              <a:rPr lang="en-US">
+                <a:latin typeface="Consolas" panose="020B0609020204030204" pitchFamily="49" charset="0"/>
+              </a:rPr>
+              <a:t>void slow_get_page(int n, struct page *p);</a:t>
+            </a:r>
+            <a:endParaRPr lang="ru-RU">
+              <a:latin typeface="Consolas" panose="020B0609020204030204" pitchFamily="49" charset="0"/>
+            </a:endParaRPr>
+          </a:p>
+          <a:p>
+            <a:r>
+              <a:rPr lang="ru-RU"/>
+              <a:t>Необходимо завести кэш для обращений к страницам</a:t>
+            </a:r>
+          </a:p>
+          <a:p>
+            <a:r>
+              <a:rPr lang="ru-RU"/>
+              <a:t>Считаем, что всего в  кэше места не больше, чем на</a:t>
+            </a:r>
+            <a:r>
+              <a:rPr lang="en-US"/>
+              <a:t> m </a:t>
+            </a:r>
+            <a:r>
+              <a:rPr lang="ru-RU"/>
+              <a:t>страниц, </a:t>
+            </a:r>
+            <a:r>
+              <a:rPr lang="en-US"/>
+              <a:t>m</a:t>
+            </a:r>
+            <a:r>
+              <a:rPr lang="ru-RU"/>
+              <a:t> много меньше</a:t>
+            </a:r>
+            <a:r>
+              <a:rPr lang="en-US"/>
+              <a:t> n</a:t>
+            </a:r>
+          </a:p>
+        </p:txBody>
+      </p:sp>
+    </p:spTree>
+    <p:extLst>
+      <p:ext uri="{BB962C8B-B14F-4D97-AF65-F5344CB8AC3E}">
+        <p14:creationId xmlns:p14="http://schemas.microsoft.com/office/powerpoint/2010/main" val="3861461032"/>
+      </p:ext>
+    </p:extLst>
+  </p:cSld>
+  <p:clrMapOvr>
+    <a:masterClrMapping/>
+  </p:clrMapOvr>
+</p:sld>
+</file>
+
+<file path=ppt/slides/slide2.xml><?xml version="1.0" encoding="utf-8"?>
+<p:sld xmlns:a="http://schemas.openxmlformats.org/drawingml/2006/main" xmlns:r="http://schemas.openxmlformats.org/officeDocument/2006/relationships" xmlns:p="http://schemas.openxmlformats.org/presentationml/2006/main">
+  <p:cSld>
+    <p:spTree>
+      <p:nvGrpSpPr>
+        <p:cNvPr id="1" name=""/>
+        <p:cNvGrpSpPr/>
+        <p:nvPr/>
+      </p:nvGrpSpPr>
+      <p:grpSpPr>
+        <a:xfrm>
+          <a:off x="0" y="0"/>
+          <a:ext cx="0" cy="0"/>
+          <a:chOff x="0" y="0"/>
+          <a:chExt cx="0" cy="0"/>
+        </a:xfrm>
+      </p:grpSpPr>
+      <p:sp>
+        <p:nvSpPr>
+          <p:cNvPr id="2" name="Title 1">
+            <a:extLst>
+              <a:ext uri="{FF2B5EF4-FFF2-40B4-BE49-F238E27FC236}">
+                <a16:creationId xmlns:a16="http://schemas.microsoft.com/office/drawing/2014/main" id="{FAB44B53-E875-43D6-AC4C-772A677B97FC}"/>
+              </a:ext>
+            </a:extLst>
+          </p:cNvPr>
+          <p:cNvSpPr>
+            <a:spLocks noGrp="1"/>
+          </p:cNvSpPr>
+          <p:nvPr>
+            <p:ph type="title"/>
+          </p:nvPr>
+        </p:nvSpPr>
+        <p:spPr/>
+        <p:txBody>
+          <a:bodyPr/>
+          <a:lstStyle/>
+          <a:p>
+            <a:r>
+              <a:rPr lang="ru-RU"/>
+              <a:t>Загадочная проблема</a:t>
+            </a:r>
+          </a:p>
+        </p:txBody>
+      </p:sp>
+      <p:sp>
+        <p:nvSpPr>
+          <p:cNvPr id="3" name="Content Placeholder 2">
+            <a:extLst>
+              <a:ext uri="{FF2B5EF4-FFF2-40B4-BE49-F238E27FC236}">
+                <a16:creationId xmlns:a16="http://schemas.microsoft.com/office/drawing/2014/main" id="{A7FD2C83-04A6-43DC-98B2-C73A76BB6A91}"/>
+              </a:ext>
+            </a:extLst>
+          </p:cNvPr>
+          <p:cNvSpPr>
+            <a:spLocks noGrp="1"/>
+          </p:cNvSpPr>
+          <p:nvPr>
+            <p:ph idx="1"/>
+          </p:nvPr>
+        </p:nvSpPr>
+        <p:spPr>
+          <a:xfrm>
+            <a:off x="1143000" y="2057400"/>
+            <a:ext cx="9872871" cy="4494320"/>
+          </a:xfrm>
+        </p:spPr>
+        <p:txBody>
+          <a:bodyPr/>
+          <a:lstStyle/>
+          <a:p>
+            <a:r>
+              <a:rPr lang="ru-RU"/>
+              <a:t>Следующий код суммирует все элементы массива, меньшие, чем </a:t>
+            </a:r>
+            <a:r>
+              <a:rPr lang="en-US">
+                <a:latin typeface="Consolas" panose="020B0609020204030204" pitchFamily="49" charset="0"/>
+              </a:rPr>
+              <a:t>128</a:t>
+            </a:r>
+            <a:endParaRPr lang="ru-RU"/>
+          </a:p>
+          <a:p>
+            <a:pPr marL="45720" indent="0">
+              <a:buNone/>
+            </a:pPr>
+            <a:r>
+              <a:rPr lang="en-US">
+                <a:latin typeface="Consolas" panose="020B0609020204030204" pitchFamily="49" charset="0"/>
+              </a:rPr>
+              <a:t>for (j = 0; j &lt; len; ++j)</a:t>
+            </a:r>
+            <a:br>
+              <a:rPr lang="en-US">
+                <a:latin typeface="Consolas" panose="020B0609020204030204" pitchFamily="49" charset="0"/>
+              </a:rPr>
+            </a:br>
+            <a:r>
+              <a:rPr lang="en-US">
+                <a:latin typeface="Consolas" panose="020B0609020204030204" pitchFamily="49" charset="0"/>
+              </a:rPr>
+              <a:t>  if (arr[j] &gt; 128)</a:t>
+            </a:r>
+            <a:br>
+              <a:rPr lang="en-US">
+                <a:latin typeface="Consolas" panose="020B0609020204030204" pitchFamily="49" charset="0"/>
+              </a:rPr>
+            </a:br>
+            <a:r>
+              <a:rPr lang="en-US">
+                <a:latin typeface="Consolas" panose="020B0609020204030204" pitchFamily="49" charset="0"/>
+              </a:rPr>
+              <a:t>    sum += arr[j]; </a:t>
+            </a:r>
+            <a:endParaRPr lang="ru-RU">
+              <a:latin typeface="Consolas" panose="020B0609020204030204" pitchFamily="49" charset="0"/>
+            </a:endParaRPr>
+          </a:p>
+          <a:p>
+            <a:r>
+              <a:rPr lang="ru-RU"/>
+              <a:t>Проблема в том, что</a:t>
+            </a:r>
+            <a:r>
+              <a:rPr lang="en-US"/>
+              <a:t> </a:t>
+            </a:r>
+            <a:r>
+              <a:rPr lang="ru-RU"/>
+              <a:t>для несортированных массивов он (без изменений в самом коде) работает почти в четыре раза медленнее, чем для сортированных</a:t>
+            </a:r>
+          </a:p>
+          <a:p>
+            <a:r>
+              <a:rPr lang="ru-RU"/>
+              <a:t>См. пример </a:t>
+            </a:r>
+            <a:r>
+              <a:rPr lang="en-US" b="1">
+                <a:latin typeface="Consolas" panose="020B0609020204030204" pitchFamily="49" charset="0"/>
+              </a:rPr>
+              <a:t>bmystery.c</a:t>
+            </a:r>
+            <a:r>
+              <a:rPr lang="en-US"/>
+              <a:t> </a:t>
+            </a:r>
+            <a:r>
+              <a:rPr lang="ru-RU"/>
+              <a:t>в файлах к семинару</a:t>
+            </a:r>
+          </a:p>
+          <a:p>
+            <a:r>
+              <a:rPr lang="ru-RU"/>
+              <a:t>Предположим, необходимо эффективно обрабатывать именно несортированные массивы</a:t>
+            </a:r>
+          </a:p>
+          <a:p>
+            <a:r>
+              <a:rPr lang="ru-RU"/>
+              <a:t>Значит надо понять </a:t>
+            </a:r>
+            <a:r>
+              <a:rPr lang="ru-RU">
+                <a:solidFill>
+                  <a:srgbClr val="0000FF"/>
+                </a:solidFill>
+              </a:rPr>
+              <a:t>почему</a:t>
+            </a:r>
+            <a:r>
+              <a:rPr lang="ru-RU"/>
+              <a:t> происходит замедление и </a:t>
+            </a:r>
+            <a:r>
+              <a:rPr lang="ru-RU">
+                <a:solidFill>
+                  <a:srgbClr val="0000FF"/>
+                </a:solidFill>
+              </a:rPr>
+              <a:t>как</a:t>
+            </a:r>
+            <a:r>
+              <a:rPr lang="ru-RU"/>
+              <a:t> это исправить</a:t>
+            </a:r>
+          </a:p>
+          <a:p>
+            <a:endParaRPr lang="ru-RU"/>
+          </a:p>
+        </p:txBody>
+      </p:sp>
+    </p:spTree>
+    <p:extLst>
+      <p:ext uri="{BB962C8B-B14F-4D97-AF65-F5344CB8AC3E}">
+        <p14:creationId xmlns:p14="http://schemas.microsoft.com/office/powerpoint/2010/main" val="3437026259"/>
+      </p:ext>
+    </p:extLst>
+  </p:cSld>
+  <p:clrMapOvr>
+    <a:masterClrMapping/>
+  </p:clrMapOvr>
+</p:sld>
+</file>
+
+<file path=ppt/slides/slide20.xml><?xml version="1.0" encoding="utf-8"?>
+<p:sld xmlns:a="http://schemas.openxmlformats.org/drawingml/2006/main" xmlns:r="http://schemas.openxmlformats.org/officeDocument/2006/relationships" xmlns:p="http://schemas.openxmlformats.org/presentationml/2006/main">
+  <p:cSld>
+    <p:spTree>
+      <p:nvGrpSpPr>
+        <p:cNvPr id="1" name=""/>
+        <p:cNvGrpSpPr/>
+        <p:nvPr/>
+      </p:nvGrpSpPr>
+      <p:grpSpPr>
+        <a:xfrm>
+          <a:off x="0" y="0"/>
+          <a:ext cx="0" cy="0"/>
+          <a:chOff x="0" y="0"/>
+          <a:chExt cx="0" cy="0"/>
+        </a:xfrm>
+      </p:grpSpPr>
+      <p:sp>
+        <p:nvSpPr>
+          <p:cNvPr id="2" name="Title 1">
+            <a:extLst>
+              <a:ext uri="{FF2B5EF4-FFF2-40B4-BE49-F238E27FC236}">
+                <a16:creationId xmlns:a16="http://schemas.microsoft.com/office/drawing/2014/main" id="{818499C1-FE69-4C9F-91B7-98FA6511BB22}"/>
+              </a:ext>
+            </a:extLst>
+          </p:cNvPr>
+          <p:cNvSpPr>
+            <a:spLocks noGrp="1"/>
+          </p:cNvSpPr>
+          <p:nvPr>
+            <p:ph type="title"/>
+          </p:nvPr>
+        </p:nvSpPr>
+        <p:spPr/>
+        <p:txBody>
+          <a:bodyPr/>
+          <a:lstStyle/>
+          <a:p>
+            <a:r>
+              <a:rPr lang="ru-RU"/>
+              <a:t>Кэш как структура данных</a:t>
+            </a:r>
+          </a:p>
+        </p:txBody>
+      </p:sp>
+      <p:sp>
+        <p:nvSpPr>
+          <p:cNvPr id="3" name="Content Placeholder 2">
+            <a:extLst>
+              <a:ext uri="{FF2B5EF4-FFF2-40B4-BE49-F238E27FC236}">
+                <a16:creationId xmlns:a16="http://schemas.microsoft.com/office/drawing/2014/main" id="{1D9B1900-BFA3-469E-B38F-D4834E071CDE}"/>
+              </a:ext>
+            </a:extLst>
+          </p:cNvPr>
+          <p:cNvSpPr>
+            <a:spLocks noGrp="1"/>
+          </p:cNvSpPr>
+          <p:nvPr>
+            <p:ph idx="1"/>
+          </p:nvPr>
+        </p:nvSpPr>
+        <p:spPr/>
+        <p:txBody>
+          <a:bodyPr/>
+          <a:lstStyle/>
+          <a:p>
+            <a:r>
+              <a:rPr lang="ru-RU"/>
+              <a:t>Какую структуру данных выбрать для кеша?</a:t>
+            </a:r>
+          </a:p>
+          <a:p>
+            <a:r>
+              <a:rPr lang="ru-RU"/>
+              <a:t>Какую стратегию кэширования выбрать?</a:t>
+            </a:r>
+          </a:p>
+          <a:p>
+            <a:r>
+              <a:rPr lang="ru-RU"/>
+              <a:t>Например у нас есть место на </a:t>
+            </a:r>
+            <a:r>
+              <a:rPr lang="ru-RU">
+                <a:latin typeface="Consolas" panose="020B0609020204030204" pitchFamily="49" charset="0"/>
+              </a:rPr>
+              <a:t>3</a:t>
+            </a:r>
+            <a:r>
+              <a:rPr lang="ru-RU"/>
+              <a:t> страницы и к нам поступают запросы:</a:t>
+            </a:r>
+          </a:p>
+          <a:p>
+            <a:pPr marL="45720" indent="0">
+              <a:buNone/>
+            </a:pPr>
+            <a:r>
+              <a:rPr lang="ru-RU">
+                <a:latin typeface="Consolas" panose="020B0609020204030204" pitchFamily="49" charset="0"/>
+              </a:rPr>
+              <a:t>1, 2, 3, 4, 1, 2, 5, 1, 2, 3, 4, </a:t>
+            </a:r>
+            <a:r>
+              <a:rPr lang="en-US">
+                <a:latin typeface="Consolas" panose="020B0609020204030204" pitchFamily="49" charset="0"/>
+              </a:rPr>
+              <a:t>3</a:t>
+            </a:r>
+            <a:endParaRPr lang="ru-RU">
+              <a:latin typeface="Consolas" panose="020B0609020204030204" pitchFamily="49" charset="0"/>
+            </a:endParaRPr>
+          </a:p>
+          <a:p>
+            <a:r>
+              <a:rPr lang="ru-RU"/>
+              <a:t>В какой момент страница </a:t>
+            </a:r>
+            <a:r>
+              <a:rPr lang="ru-RU">
+                <a:solidFill>
+                  <a:srgbClr val="0000FF"/>
+                </a:solidFill>
+              </a:rPr>
+              <a:t>кэшируется</a:t>
+            </a:r>
+            <a:r>
+              <a:rPr lang="ru-RU"/>
+              <a:t>?</a:t>
+            </a:r>
+          </a:p>
+          <a:p>
+            <a:r>
+              <a:rPr lang="ru-RU"/>
+              <a:t>В какой момент страница </a:t>
+            </a:r>
+            <a:r>
+              <a:rPr lang="ru-RU">
+                <a:solidFill>
+                  <a:srgbClr val="0000FF"/>
+                </a:solidFill>
+              </a:rPr>
+              <a:t>вытесняется</a:t>
+            </a:r>
+            <a:r>
+              <a:rPr lang="ru-RU"/>
+              <a:t> из кэша?</a:t>
+            </a:r>
+          </a:p>
+        </p:txBody>
+      </p:sp>
+    </p:spTree>
+    <p:extLst>
+      <p:ext uri="{BB962C8B-B14F-4D97-AF65-F5344CB8AC3E}">
+        <p14:creationId xmlns:p14="http://schemas.microsoft.com/office/powerpoint/2010/main" val="1240043427"/>
+      </p:ext>
+    </p:extLst>
+  </p:cSld>
+  <p:clrMapOvr>
+    <a:masterClrMapping/>
+  </p:clrMapOvr>
+</p:sld>
+</file>
+
+<file path=ppt/slides/slide21.xml><?xml version="1.0" encoding="utf-8"?>
+<p:sld xmlns:a="http://schemas.openxmlformats.org/drawingml/2006/main" xmlns:r="http://schemas.openxmlformats.org/officeDocument/2006/relationships" xmlns:p="http://schemas.openxmlformats.org/presentationml/2006/main">
+  <p:cSld>
+    <p:spTree>
+      <p:nvGrpSpPr>
+        <p:cNvPr id="1" name=""/>
+        <p:cNvGrpSpPr/>
+        <p:nvPr/>
+      </p:nvGrpSpPr>
+      <p:grpSpPr>
+        <a:xfrm>
+          <a:off x="0" y="0"/>
+          <a:ext cx="0" cy="0"/>
+          <a:chOff x="0" y="0"/>
+          <a:chExt cx="0" cy="0"/>
+        </a:xfrm>
+      </p:grpSpPr>
+      <p:sp>
+        <p:nvSpPr>
+          <p:cNvPr id="2" name="Title 1">
+            <a:extLst>
+              <a:ext uri="{FF2B5EF4-FFF2-40B4-BE49-F238E27FC236}">
+                <a16:creationId xmlns:a16="http://schemas.microsoft.com/office/drawing/2014/main" id="{8245E15D-8AA5-4B85-AAC0-1BEEFA59FB8C}"/>
+              </a:ext>
+            </a:extLst>
+          </p:cNvPr>
+          <p:cNvSpPr>
+            <a:spLocks noGrp="1"/>
+          </p:cNvSpPr>
+          <p:nvPr>
+            <p:ph type="title"/>
+          </p:nvPr>
+        </p:nvSpPr>
+        <p:spPr/>
+        <p:txBody>
+          <a:bodyPr/>
+          <a:lstStyle/>
+          <a:p>
+            <a:r>
+              <a:rPr lang="ru-RU"/>
+              <a:t>Кэш как структура данных: </a:t>
+            </a:r>
+            <a:r>
+              <a:rPr lang="en-US"/>
+              <a:t>LRU</a:t>
+            </a:r>
+            <a:endParaRPr lang="ru-RU"/>
+          </a:p>
+        </p:txBody>
+      </p:sp>
+      <p:sp>
+        <p:nvSpPr>
+          <p:cNvPr id="3" name="Content Placeholder 2">
+            <a:extLst>
+              <a:ext uri="{FF2B5EF4-FFF2-40B4-BE49-F238E27FC236}">
+                <a16:creationId xmlns:a16="http://schemas.microsoft.com/office/drawing/2014/main" id="{9CD02FE6-D3CD-4147-9083-67D2B1B067D9}"/>
+              </a:ext>
+            </a:extLst>
+          </p:cNvPr>
+          <p:cNvSpPr>
+            <a:spLocks noGrp="1"/>
+          </p:cNvSpPr>
+          <p:nvPr>
+            <p:ph idx="1"/>
+          </p:nvPr>
+        </p:nvSpPr>
+        <p:spPr>
+          <a:xfrm>
+            <a:off x="1143000" y="2057399"/>
+            <a:ext cx="9872871" cy="4402123"/>
+          </a:xfrm>
+        </p:spPr>
+        <p:txBody>
+          <a:bodyPr/>
+          <a:lstStyle/>
+          <a:p>
+            <a:r>
+              <a:rPr lang="ru-RU"/>
+              <a:t>Стратегия </a:t>
+            </a:r>
+            <a:r>
+              <a:rPr lang="en-US"/>
+              <a:t>LRU (least recently used) </a:t>
+            </a:r>
+            <a:r>
+              <a:rPr lang="ru-RU"/>
+              <a:t>подразумевает очередь в которой элементы индексируются хеш-таблицей</a:t>
+            </a:r>
+          </a:p>
+          <a:p>
+            <a:r>
+              <a:rPr lang="ru-RU"/>
+              <a:t>Если запрошенный элемент найден, он передвигается вперёд, если не найден, то добавляется спереди, а задний вытесняется</a:t>
+            </a:r>
+            <a:endParaRPr lang="en-US"/>
+          </a:p>
+          <a:p>
+            <a:r>
+              <a:rPr lang="ru-RU"/>
+              <a:t>Например у нас есть место на </a:t>
+            </a:r>
+            <a:r>
+              <a:rPr lang="ru-RU">
+                <a:latin typeface="Consolas" panose="020B0609020204030204" pitchFamily="49" charset="0"/>
+              </a:rPr>
+              <a:t>4</a:t>
+            </a:r>
+            <a:r>
+              <a:rPr lang="ru-RU"/>
+              <a:t> страницы и к нам поступают запросы:</a:t>
+            </a:r>
+          </a:p>
+          <a:p>
+            <a:pPr marL="45720" indent="0">
+              <a:buNone/>
+            </a:pPr>
+            <a:r>
+              <a:rPr lang="ru-RU">
+                <a:solidFill>
+                  <a:schemeClr val="tx1">
+                    <a:lumMod val="95000"/>
+                    <a:lumOff val="5000"/>
+                  </a:schemeClr>
+                </a:solidFill>
+                <a:latin typeface="Consolas" panose="020B0609020204030204" pitchFamily="49" charset="0"/>
+              </a:rPr>
+              <a:t>1, 2, 3, 4</a:t>
+            </a:r>
+            <a:r>
+              <a:rPr lang="ru-RU">
+                <a:latin typeface="Consolas" panose="020B0609020204030204" pitchFamily="49" charset="0"/>
+              </a:rPr>
+              <a:t>, </a:t>
+            </a:r>
+            <a:r>
+              <a:rPr lang="ru-RU">
+                <a:solidFill>
+                  <a:srgbClr val="0000FF"/>
+                </a:solidFill>
+                <a:latin typeface="Consolas" panose="020B0609020204030204" pitchFamily="49" charset="0"/>
+              </a:rPr>
+              <a:t>1</a:t>
+            </a:r>
+            <a:r>
+              <a:rPr lang="ru-RU">
+                <a:solidFill>
+                  <a:schemeClr val="tx1">
+                    <a:lumMod val="95000"/>
+                    <a:lumOff val="5000"/>
+                  </a:schemeClr>
+                </a:solidFill>
+                <a:latin typeface="Consolas" panose="020B0609020204030204" pitchFamily="49" charset="0"/>
+              </a:rPr>
+              <a:t>, </a:t>
+            </a:r>
+            <a:r>
+              <a:rPr lang="ru-RU">
+                <a:solidFill>
+                  <a:srgbClr val="0000FF"/>
+                </a:solidFill>
+                <a:latin typeface="Consolas" panose="020B0609020204030204" pitchFamily="49" charset="0"/>
+              </a:rPr>
+              <a:t>2</a:t>
+            </a:r>
+            <a:r>
+              <a:rPr lang="ru-RU">
+                <a:solidFill>
+                  <a:schemeClr val="tx1">
+                    <a:lumMod val="95000"/>
+                    <a:lumOff val="5000"/>
+                  </a:schemeClr>
+                </a:solidFill>
+                <a:latin typeface="Consolas" panose="020B0609020204030204" pitchFamily="49" charset="0"/>
+              </a:rPr>
+              <a:t>, 5, </a:t>
+            </a:r>
+            <a:r>
+              <a:rPr lang="ru-RU">
+                <a:solidFill>
+                  <a:srgbClr val="0000FF"/>
+                </a:solidFill>
+                <a:latin typeface="Consolas" panose="020B0609020204030204" pitchFamily="49" charset="0"/>
+              </a:rPr>
+              <a:t>1</a:t>
+            </a:r>
+            <a:r>
+              <a:rPr lang="ru-RU">
+                <a:solidFill>
+                  <a:schemeClr val="tx1">
+                    <a:lumMod val="95000"/>
+                    <a:lumOff val="5000"/>
+                  </a:schemeClr>
+                </a:solidFill>
+                <a:latin typeface="Consolas" panose="020B0609020204030204" pitchFamily="49" charset="0"/>
+              </a:rPr>
+              <a:t>, </a:t>
+            </a:r>
+            <a:r>
+              <a:rPr lang="ru-RU">
+                <a:solidFill>
+                  <a:srgbClr val="0000FF"/>
+                </a:solidFill>
+                <a:latin typeface="Consolas" panose="020B0609020204030204" pitchFamily="49" charset="0"/>
+              </a:rPr>
+              <a:t>2</a:t>
+            </a:r>
+            <a:r>
+              <a:rPr lang="ru-RU">
+                <a:solidFill>
+                  <a:schemeClr val="tx1">
+                    <a:lumMod val="95000"/>
+                    <a:lumOff val="5000"/>
+                  </a:schemeClr>
+                </a:solidFill>
+                <a:latin typeface="Consolas" panose="020B0609020204030204" pitchFamily="49" charset="0"/>
+              </a:rPr>
+              <a:t>, 3, 4, </a:t>
+            </a:r>
+            <a:r>
+              <a:rPr lang="en-US">
+                <a:solidFill>
+                  <a:srgbClr val="0000FF"/>
+                </a:solidFill>
+                <a:latin typeface="Consolas" panose="020B0609020204030204" pitchFamily="49" charset="0"/>
+              </a:rPr>
+              <a:t>3</a:t>
+            </a:r>
+            <a:endParaRPr lang="ru-RU">
+              <a:solidFill>
+                <a:srgbClr val="0000FF"/>
+              </a:solidFill>
+              <a:latin typeface="Consolas" panose="020B0609020204030204" pitchFamily="49" charset="0"/>
+            </a:endParaRPr>
+          </a:p>
+          <a:p>
+            <a:r>
+              <a:rPr lang="ru-RU"/>
+              <a:t>Тогда кэш меняется так</a:t>
+            </a:r>
+          </a:p>
+          <a:p>
+            <a:pPr marL="45720" indent="0">
+              <a:buNone/>
+            </a:pPr>
+            <a:r>
+              <a:rPr lang="en-US">
+                <a:solidFill>
+                  <a:schemeClr val="tx1">
+                    <a:lumMod val="95000"/>
+                    <a:lumOff val="5000"/>
+                  </a:schemeClr>
+                </a:solidFill>
+                <a:latin typeface="Consolas" panose="020B0609020204030204" pitchFamily="49" charset="0"/>
+                <a:sym typeface="Symbol" panose="05050102010706020507" pitchFamily="18" charset="2"/>
+              </a:rPr>
+              <a:t>1  2, 1  3, 2, 1  </a:t>
+            </a:r>
+            <a:r>
+              <a:rPr lang="ru-RU">
+                <a:latin typeface="Consolas" panose="020B0609020204030204" pitchFamily="49" charset="0"/>
+              </a:rPr>
+              <a:t>4</a:t>
+            </a:r>
+            <a:r>
+              <a:rPr lang="en-US">
+                <a:solidFill>
+                  <a:schemeClr val="tx1">
+                    <a:lumMod val="95000"/>
+                    <a:lumOff val="5000"/>
+                  </a:schemeClr>
+                </a:solidFill>
+                <a:latin typeface="Consolas" panose="020B0609020204030204" pitchFamily="49" charset="0"/>
+              </a:rPr>
+              <a:t>, 3</a:t>
+            </a:r>
+            <a:r>
+              <a:rPr lang="ru-RU">
+                <a:latin typeface="Consolas" panose="020B0609020204030204" pitchFamily="49" charset="0"/>
+              </a:rPr>
+              <a:t>, 2, </a:t>
+            </a:r>
+            <a:r>
+              <a:rPr lang="en-US">
+                <a:latin typeface="Consolas" panose="020B0609020204030204" pitchFamily="49" charset="0"/>
+              </a:rPr>
+              <a:t>1 </a:t>
+            </a:r>
+            <a:r>
+              <a:rPr lang="en-US">
+                <a:latin typeface="Consolas" panose="020B0609020204030204" pitchFamily="49" charset="0"/>
+                <a:sym typeface="Symbol" panose="05050102010706020507" pitchFamily="18" charset="2"/>
+              </a:rPr>
+              <a:t> </a:t>
+            </a:r>
+            <a:r>
+              <a:rPr lang="en-US">
+                <a:solidFill>
+                  <a:srgbClr val="0000FF"/>
+                </a:solidFill>
+                <a:latin typeface="Consolas" panose="020B0609020204030204" pitchFamily="49" charset="0"/>
+                <a:sym typeface="Symbol" panose="05050102010706020507" pitchFamily="18" charset="2"/>
+              </a:rPr>
+              <a:t>1</a:t>
+            </a:r>
+            <a:r>
+              <a:rPr lang="en-US">
+                <a:latin typeface="Consolas" panose="020B0609020204030204" pitchFamily="49" charset="0"/>
+                <a:sym typeface="Symbol" panose="05050102010706020507" pitchFamily="18" charset="2"/>
+              </a:rPr>
+              <a:t>,</a:t>
+            </a:r>
+            <a:r>
+              <a:rPr lang="en-US">
+                <a:solidFill>
+                  <a:schemeClr val="tx1">
+                    <a:lumMod val="95000"/>
+                    <a:lumOff val="5000"/>
+                  </a:schemeClr>
+                </a:solidFill>
+                <a:latin typeface="Consolas" panose="020B0609020204030204" pitchFamily="49" charset="0"/>
+                <a:sym typeface="Symbol" panose="05050102010706020507" pitchFamily="18" charset="2"/>
+              </a:rPr>
+              <a:t> </a:t>
+            </a:r>
+            <a:r>
+              <a:rPr lang="ru-RU">
+                <a:solidFill>
+                  <a:schemeClr val="tx1">
+                    <a:lumMod val="95000"/>
+                    <a:lumOff val="5000"/>
+                  </a:schemeClr>
+                </a:solidFill>
+                <a:latin typeface="Consolas" panose="020B0609020204030204" pitchFamily="49" charset="0"/>
+              </a:rPr>
+              <a:t>4</a:t>
+            </a:r>
+            <a:r>
+              <a:rPr lang="en-US">
+                <a:solidFill>
+                  <a:schemeClr val="tx1">
+                    <a:lumMod val="95000"/>
+                    <a:lumOff val="5000"/>
+                  </a:schemeClr>
+                </a:solidFill>
+                <a:latin typeface="Consolas" panose="020B0609020204030204" pitchFamily="49" charset="0"/>
+              </a:rPr>
+              <a:t>, 3</a:t>
+            </a:r>
+            <a:r>
+              <a:rPr lang="ru-RU">
+                <a:solidFill>
+                  <a:schemeClr val="tx1">
+                    <a:lumMod val="95000"/>
+                    <a:lumOff val="5000"/>
+                  </a:schemeClr>
+                </a:solidFill>
+                <a:latin typeface="Consolas" panose="020B0609020204030204" pitchFamily="49" charset="0"/>
+              </a:rPr>
+              <a:t>, 2</a:t>
+            </a:r>
+            <a:r>
+              <a:rPr lang="en-US">
+                <a:solidFill>
+                  <a:schemeClr val="tx1">
+                    <a:lumMod val="95000"/>
+                    <a:lumOff val="5000"/>
+                  </a:schemeClr>
+                </a:solidFill>
+                <a:latin typeface="Consolas" panose="020B0609020204030204" pitchFamily="49" charset="0"/>
+              </a:rPr>
+              <a:t> </a:t>
+            </a:r>
+            <a:r>
+              <a:rPr lang="en-US">
+                <a:solidFill>
+                  <a:schemeClr val="tx1">
+                    <a:lumMod val="95000"/>
+                    <a:lumOff val="5000"/>
+                  </a:schemeClr>
+                </a:solidFill>
+                <a:latin typeface="Consolas" panose="020B0609020204030204" pitchFamily="49" charset="0"/>
+                <a:sym typeface="Symbol" panose="05050102010706020507" pitchFamily="18" charset="2"/>
+              </a:rPr>
+              <a:t> </a:t>
+            </a:r>
+            <a:r>
+              <a:rPr lang="en-US">
+                <a:solidFill>
+                  <a:srgbClr val="0000FF"/>
+                </a:solidFill>
+                <a:latin typeface="Consolas" panose="020B0609020204030204" pitchFamily="49" charset="0"/>
+                <a:sym typeface="Symbol" panose="05050102010706020507" pitchFamily="18" charset="2"/>
+              </a:rPr>
+              <a:t>2</a:t>
+            </a:r>
+            <a:r>
+              <a:rPr lang="en-US">
+                <a:solidFill>
+                  <a:schemeClr val="tx1">
+                    <a:lumMod val="95000"/>
+                    <a:lumOff val="5000"/>
+                  </a:schemeClr>
+                </a:solidFill>
+                <a:latin typeface="Consolas" panose="020B0609020204030204" pitchFamily="49" charset="0"/>
+                <a:sym typeface="Symbol" panose="05050102010706020507" pitchFamily="18" charset="2"/>
+              </a:rPr>
+              <a:t>, 1, </a:t>
+            </a:r>
+            <a:r>
+              <a:rPr lang="ru-RU">
+                <a:solidFill>
+                  <a:schemeClr val="tx1">
+                    <a:lumMod val="95000"/>
+                    <a:lumOff val="5000"/>
+                  </a:schemeClr>
+                </a:solidFill>
+                <a:latin typeface="Consolas" panose="020B0609020204030204" pitchFamily="49" charset="0"/>
+              </a:rPr>
+              <a:t>4</a:t>
+            </a:r>
+            <a:r>
+              <a:rPr lang="en-US">
+                <a:solidFill>
+                  <a:schemeClr val="tx1">
+                    <a:lumMod val="95000"/>
+                    <a:lumOff val="5000"/>
+                  </a:schemeClr>
+                </a:solidFill>
+                <a:latin typeface="Consolas" panose="020B0609020204030204" pitchFamily="49" charset="0"/>
+              </a:rPr>
+              <a:t>, 3</a:t>
+            </a:r>
+            <a:br>
+              <a:rPr lang="en-US">
+                <a:solidFill>
+                  <a:schemeClr val="tx1">
+                    <a:lumMod val="95000"/>
+                    <a:lumOff val="5000"/>
+                  </a:schemeClr>
+                </a:solidFill>
+                <a:latin typeface="Consolas" panose="020B0609020204030204" pitchFamily="49" charset="0"/>
+              </a:rPr>
+            </a:br>
+            <a:r>
+              <a:rPr lang="en-US">
+                <a:solidFill>
+                  <a:schemeClr val="tx1">
+                    <a:lumMod val="95000"/>
+                    <a:lumOff val="5000"/>
+                  </a:schemeClr>
+                </a:solidFill>
+                <a:latin typeface="Consolas" panose="020B0609020204030204" pitchFamily="49" charset="0"/>
+              </a:rPr>
+              <a:t>  </a:t>
+            </a:r>
+            <a:r>
+              <a:rPr lang="en-US">
+                <a:solidFill>
+                  <a:schemeClr val="tx1">
+                    <a:lumMod val="95000"/>
+                    <a:lumOff val="5000"/>
+                  </a:schemeClr>
+                </a:solidFill>
+                <a:latin typeface="Consolas" panose="020B0609020204030204" pitchFamily="49" charset="0"/>
+                <a:sym typeface="Symbol" panose="05050102010706020507" pitchFamily="18" charset="2"/>
+              </a:rPr>
+              <a:t> 5, 2, 1, 4  </a:t>
+            </a:r>
+            <a:r>
+              <a:rPr lang="en-US">
+                <a:solidFill>
+                  <a:srgbClr val="0000FF"/>
+                </a:solidFill>
+                <a:latin typeface="Consolas" panose="020B0609020204030204" pitchFamily="49" charset="0"/>
+                <a:sym typeface="Symbol" panose="05050102010706020507" pitchFamily="18" charset="2"/>
+              </a:rPr>
+              <a:t>1</a:t>
+            </a:r>
+            <a:r>
+              <a:rPr lang="en-US">
+                <a:solidFill>
+                  <a:schemeClr val="tx1">
+                    <a:lumMod val="95000"/>
+                    <a:lumOff val="5000"/>
+                  </a:schemeClr>
+                </a:solidFill>
+                <a:latin typeface="Consolas" panose="020B0609020204030204" pitchFamily="49" charset="0"/>
+                <a:sym typeface="Symbol" panose="05050102010706020507" pitchFamily="18" charset="2"/>
+              </a:rPr>
+              <a:t>, 5, 2, 4  </a:t>
+            </a:r>
+            <a:r>
+              <a:rPr lang="en-US">
+                <a:solidFill>
+                  <a:srgbClr val="0000FF"/>
+                </a:solidFill>
+                <a:latin typeface="Consolas" panose="020B0609020204030204" pitchFamily="49" charset="0"/>
+                <a:sym typeface="Symbol" panose="05050102010706020507" pitchFamily="18" charset="2"/>
+              </a:rPr>
+              <a:t>2</a:t>
+            </a:r>
+            <a:r>
+              <a:rPr lang="en-US">
+                <a:solidFill>
+                  <a:schemeClr val="tx1">
+                    <a:lumMod val="95000"/>
+                    <a:lumOff val="5000"/>
+                  </a:schemeClr>
+                </a:solidFill>
+                <a:latin typeface="Consolas" panose="020B0609020204030204" pitchFamily="49" charset="0"/>
+                <a:sym typeface="Symbol" panose="05050102010706020507" pitchFamily="18" charset="2"/>
+              </a:rPr>
+              <a:t>, 1, 5, 4  3, 2, 1, 5 </a:t>
+            </a:r>
+            <a:br>
+              <a:rPr lang="en-US">
+                <a:solidFill>
+                  <a:schemeClr val="tx1">
+                    <a:lumMod val="95000"/>
+                    <a:lumOff val="5000"/>
+                  </a:schemeClr>
+                </a:solidFill>
+                <a:latin typeface="Consolas" panose="020B0609020204030204" pitchFamily="49" charset="0"/>
+                <a:sym typeface="Symbol" panose="05050102010706020507" pitchFamily="18" charset="2"/>
+              </a:rPr>
+            </a:br>
+            <a:r>
+              <a:rPr lang="en-US">
+                <a:solidFill>
+                  <a:schemeClr val="tx1">
+                    <a:lumMod val="95000"/>
+                    <a:lumOff val="5000"/>
+                  </a:schemeClr>
+                </a:solidFill>
+                <a:latin typeface="Consolas" panose="020B0609020204030204" pitchFamily="49" charset="0"/>
+                <a:sym typeface="Symbol" panose="05050102010706020507" pitchFamily="18" charset="2"/>
+              </a:rPr>
+              <a:t>   4, 3, 2, 1  </a:t>
+            </a:r>
+            <a:r>
+              <a:rPr lang="en-US">
+                <a:solidFill>
+                  <a:srgbClr val="0000FF"/>
+                </a:solidFill>
+                <a:latin typeface="Consolas" panose="020B0609020204030204" pitchFamily="49" charset="0"/>
+                <a:sym typeface="Symbol" panose="05050102010706020507" pitchFamily="18" charset="2"/>
+              </a:rPr>
+              <a:t>3</a:t>
+            </a:r>
+            <a:r>
+              <a:rPr lang="en-US">
+                <a:solidFill>
+                  <a:schemeClr val="tx1">
+                    <a:lumMod val="95000"/>
+                    <a:lumOff val="5000"/>
+                  </a:schemeClr>
+                </a:solidFill>
+                <a:latin typeface="Consolas" panose="020B0609020204030204" pitchFamily="49" charset="0"/>
+                <a:sym typeface="Symbol" panose="05050102010706020507" pitchFamily="18" charset="2"/>
+              </a:rPr>
+              <a:t>, 4, 2, 1</a:t>
+            </a:r>
+            <a:endParaRPr lang="ru-RU">
+              <a:solidFill>
+                <a:schemeClr val="tx1">
+                  <a:lumMod val="95000"/>
+                  <a:lumOff val="5000"/>
+                </a:schemeClr>
+              </a:solidFill>
+            </a:endParaRPr>
+          </a:p>
+        </p:txBody>
+      </p:sp>
+    </p:spTree>
+    <p:extLst>
+      <p:ext uri="{BB962C8B-B14F-4D97-AF65-F5344CB8AC3E}">
+        <p14:creationId xmlns:p14="http://schemas.microsoft.com/office/powerpoint/2010/main" val="3718799346"/>
+      </p:ext>
+    </p:extLst>
+  </p:cSld>
+  <p:clrMapOvr>
+    <a:masterClrMapping/>
+  </p:clrMapOvr>
+</p:sld>
+</file>
+
+<file path=ppt/slides/slide22.xml><?xml version="1.0" encoding="utf-8"?>
+<p:sld xmlns:a="http://schemas.openxmlformats.org/drawingml/2006/main" xmlns:r="http://schemas.openxmlformats.org/officeDocument/2006/relationships" xmlns:p="http://schemas.openxmlformats.org/presentationml/2006/main">
+  <p:cSld>
+    <p:spTree>
+      <p:nvGrpSpPr>
+        <p:cNvPr id="1" name=""/>
+        <p:cNvGrpSpPr/>
+        <p:nvPr/>
+      </p:nvGrpSpPr>
+      <p:grpSpPr>
+        <a:xfrm>
+          <a:off x="0" y="0"/>
+          <a:ext cx="0" cy="0"/>
+          <a:chOff x="0" y="0"/>
+          <a:chExt cx="0" cy="0"/>
+        </a:xfrm>
+      </p:grpSpPr>
+      <p:sp>
+        <p:nvSpPr>
+          <p:cNvPr id="2" name="Title 1">
+            <a:extLst>
+              <a:ext uri="{FF2B5EF4-FFF2-40B4-BE49-F238E27FC236}">
+                <a16:creationId xmlns:a16="http://schemas.microsoft.com/office/drawing/2014/main" id="{35EC59D2-568E-43B7-8C1A-6D8CFF502448}"/>
+              </a:ext>
+            </a:extLst>
+          </p:cNvPr>
+          <p:cNvSpPr>
+            <a:spLocks noGrp="1"/>
+          </p:cNvSpPr>
+          <p:nvPr>
+            <p:ph type="title"/>
+          </p:nvPr>
+        </p:nvSpPr>
+        <p:spPr/>
+        <p:txBody>
+          <a:bodyPr/>
+          <a:lstStyle/>
+          <a:p>
+            <a:r>
+              <a:rPr lang="en-US"/>
+              <a:t>Problem LC – LRU </a:t>
+            </a:r>
+            <a:r>
+              <a:rPr lang="ru-RU"/>
+              <a:t>кэш</a:t>
+            </a:r>
+          </a:p>
+        </p:txBody>
+      </p:sp>
+      <p:sp>
+        <p:nvSpPr>
+          <p:cNvPr id="3" name="Content Placeholder 2">
+            <a:extLst>
+              <a:ext uri="{FF2B5EF4-FFF2-40B4-BE49-F238E27FC236}">
+                <a16:creationId xmlns:a16="http://schemas.microsoft.com/office/drawing/2014/main" id="{B72ECF3F-45B6-4812-803D-4D8A0ABDE82F}"/>
+              </a:ext>
+            </a:extLst>
+          </p:cNvPr>
+          <p:cNvSpPr>
+            <a:spLocks noGrp="1"/>
+          </p:cNvSpPr>
+          <p:nvPr>
+            <p:ph idx="1"/>
+          </p:nvPr>
+        </p:nvSpPr>
+        <p:spPr>
+          <a:xfrm>
+            <a:off x="1143000" y="2057399"/>
+            <a:ext cx="9872871" cy="4678961"/>
+          </a:xfrm>
+        </p:spPr>
+        <p:txBody>
+          <a:bodyPr>
+            <a:normAutofit/>
+          </a:bodyPr>
+          <a:lstStyle/>
+          <a:p>
+            <a:r>
+              <a:rPr lang="ru-RU"/>
+              <a:t>Необходимо написать код функции</a:t>
+            </a:r>
+          </a:p>
+          <a:p>
+            <a:pPr marL="45720" indent="0">
+              <a:buNone/>
+            </a:pPr>
+            <a:r>
+              <a:rPr lang="en-US">
+                <a:latin typeface="Consolas" panose="020B0609020204030204" pitchFamily="49" charset="0"/>
+              </a:rPr>
+              <a:t>struct page {</a:t>
+            </a:r>
+            <a:br>
+              <a:rPr lang="en-US">
+                <a:latin typeface="Consolas" panose="020B0609020204030204" pitchFamily="49" charset="0"/>
+              </a:rPr>
+            </a:br>
+            <a:r>
+              <a:rPr lang="en-US">
+                <a:latin typeface="Consolas" panose="020B0609020204030204" pitchFamily="49" charset="0"/>
+              </a:rPr>
+              <a:t>  int index;     </a:t>
+            </a:r>
+            <a:r>
+              <a:rPr lang="en-US">
+                <a:solidFill>
+                  <a:schemeClr val="bg1">
+                    <a:lumMod val="50000"/>
+                  </a:schemeClr>
+                </a:solidFill>
+                <a:latin typeface="Consolas" panose="020B0609020204030204" pitchFamily="49" charset="0"/>
+              </a:rPr>
+              <a:t>// page index: 1, 2, ... n</a:t>
+            </a:r>
+            <a:br>
+              <a:rPr lang="en-US">
+                <a:solidFill>
+                  <a:schemeClr val="bg1">
+                    <a:lumMod val="50000"/>
+                  </a:schemeClr>
+                </a:solidFill>
+                <a:latin typeface="Consolas" panose="020B0609020204030204" pitchFamily="49" charset="0"/>
+              </a:rPr>
+            </a:br>
+            <a:r>
+              <a:rPr lang="en-US">
+                <a:latin typeface="Consolas" panose="020B0609020204030204" pitchFamily="49" charset="0"/>
+              </a:rPr>
+              <a:t>  char data[60]; </a:t>
+            </a:r>
+            <a:r>
+              <a:rPr lang="en-US">
+                <a:solidFill>
+                  <a:schemeClr val="bg1">
+                    <a:lumMod val="50000"/>
+                  </a:schemeClr>
+                </a:solidFill>
+                <a:latin typeface="Consolas" panose="020B0609020204030204" pitchFamily="49" charset="0"/>
+              </a:rPr>
+              <a:t>// page data</a:t>
+            </a:r>
+            <a:br>
+              <a:rPr lang="en-US">
+                <a:latin typeface="Consolas" panose="020B0609020204030204" pitchFamily="49" charset="0"/>
+              </a:rPr>
+            </a:br>
+            <a:r>
+              <a:rPr lang="en-US">
+                <a:latin typeface="Consolas" panose="020B0609020204030204" pitchFamily="49" charset="0"/>
+              </a:rPr>
+              <a:t>};</a:t>
+            </a:r>
+            <a:endParaRPr lang="ru-RU">
+              <a:latin typeface="Consolas" panose="020B0609020204030204" pitchFamily="49" charset="0"/>
+            </a:endParaRPr>
+          </a:p>
+          <a:p>
+            <a:pPr marL="45720" indent="0">
+              <a:buNone/>
+            </a:pPr>
+            <a:r>
+              <a:rPr lang="en-US">
+                <a:latin typeface="Consolas" panose="020B0609020204030204" pitchFamily="49" charset="0"/>
+              </a:rPr>
+              <a:t>void slow_get_page(int n, struct page *p);</a:t>
+            </a:r>
+            <a:endParaRPr lang="ru-RU">
+              <a:latin typeface="Consolas" panose="020B0609020204030204" pitchFamily="49" charset="0"/>
+            </a:endParaRPr>
+          </a:p>
+          <a:p>
+            <a:pPr marL="45720" indent="0">
+              <a:buNone/>
+            </a:pPr>
+            <a:r>
+              <a:rPr lang="en-US">
+                <a:latin typeface="Consolas" panose="020B0609020204030204" pitchFamily="49" charset="0"/>
+              </a:rPr>
+              <a:t>void get_page(int id, struct page *p) {</a:t>
+            </a:r>
+            <a:br>
+              <a:rPr lang="ru-RU">
+                <a:latin typeface="Consolas" panose="020B0609020204030204" pitchFamily="49" charset="0"/>
+              </a:rPr>
+            </a:br>
+            <a:r>
+              <a:rPr lang="ru-RU">
+                <a:solidFill>
+                  <a:schemeClr val="bg1">
+                    <a:lumMod val="50000"/>
+                  </a:schemeClr>
+                </a:solidFill>
+                <a:latin typeface="Consolas" panose="020B0609020204030204" pitchFamily="49" charset="0"/>
+              </a:rPr>
+              <a:t>  </a:t>
+            </a:r>
+            <a:r>
+              <a:rPr lang="en-US">
+                <a:solidFill>
+                  <a:schemeClr val="bg1">
+                    <a:lumMod val="50000"/>
+                  </a:schemeClr>
+                </a:solidFill>
+                <a:latin typeface="Consolas" panose="020B0609020204030204" pitchFamily="49" charset="0"/>
+              </a:rPr>
+              <a:t>// TODO: </a:t>
+            </a:r>
+            <a:r>
+              <a:rPr lang="ru-RU">
+                <a:solidFill>
+                  <a:schemeClr val="bg1">
+                    <a:lumMod val="50000"/>
+                  </a:schemeClr>
+                </a:solidFill>
+                <a:latin typeface="Consolas" panose="020B0609020204030204" pitchFamily="49" charset="0"/>
+              </a:rPr>
+              <a:t>заполнить структуру </a:t>
+            </a:r>
+            <a:r>
+              <a:rPr lang="en-US">
+                <a:solidFill>
+                  <a:schemeClr val="bg1">
+                    <a:lumMod val="50000"/>
+                  </a:schemeClr>
+                </a:solidFill>
+                <a:latin typeface="Consolas" panose="020B0609020204030204" pitchFamily="49" charset="0"/>
+              </a:rPr>
+              <a:t>*p </a:t>
+            </a:r>
+            <a:r>
+              <a:rPr lang="ru-RU">
+                <a:solidFill>
+                  <a:schemeClr val="bg1">
+                    <a:lumMod val="50000"/>
+                  </a:schemeClr>
+                </a:solidFill>
+                <a:latin typeface="Consolas" panose="020B0609020204030204" pitchFamily="49" charset="0"/>
+              </a:rPr>
+              <a:t>используя кэш</a:t>
+            </a:r>
+            <a:br>
+              <a:rPr lang="en-US">
+                <a:latin typeface="Consolas" panose="020B0609020204030204" pitchFamily="49" charset="0"/>
+              </a:rPr>
+            </a:br>
+            <a:r>
+              <a:rPr lang="en-US">
+                <a:latin typeface="Consolas" panose="020B0609020204030204" pitchFamily="49" charset="0"/>
+              </a:rPr>
+              <a:t>}</a:t>
+            </a:r>
+            <a:endParaRPr lang="ru-RU">
+              <a:latin typeface="Consolas" panose="020B0609020204030204" pitchFamily="49" charset="0"/>
+            </a:endParaRPr>
+          </a:p>
+          <a:p>
+            <a:r>
+              <a:rPr lang="ru-RU"/>
+              <a:t>Функция должна обеспечивать переиспользование страниц не худшее, чем при стратегии </a:t>
+            </a:r>
+            <a:r>
+              <a:rPr lang="en-US"/>
+              <a:t>LRU</a:t>
+            </a:r>
+            <a:endParaRPr lang="ru-RU"/>
+          </a:p>
+        </p:txBody>
+      </p:sp>
+    </p:spTree>
+    <p:extLst>
+      <p:ext uri="{BB962C8B-B14F-4D97-AF65-F5344CB8AC3E}">
+        <p14:creationId xmlns:p14="http://schemas.microsoft.com/office/powerpoint/2010/main" val="3679424995"/>
+      </p:ext>
+    </p:extLst>
+  </p:cSld>
+  <p:clrMapOvr>
+    <a:masterClrMapping/>
+  </p:clrMapOvr>
+</p:sld>
+</file>
+
+<file path=ppt/slides/slide23.xml><?xml version="1.0" encoding="utf-8"?>
+<p:sld xmlns:a="http://schemas.openxmlformats.org/drawingml/2006/main" xmlns:r="http://schemas.openxmlformats.org/officeDocument/2006/relationships" xmlns:p="http://schemas.openxmlformats.org/presentationml/2006/main">
+  <p:cSld>
+    <p:spTree>
+      <p:nvGrpSpPr>
+        <p:cNvPr id="1" name=""/>
+        <p:cNvGrpSpPr/>
+        <p:nvPr/>
+      </p:nvGrpSpPr>
+      <p:grpSpPr>
+        <a:xfrm>
+          <a:off x="0" y="0"/>
+          <a:ext cx="0" cy="0"/>
+          <a:chOff x="0" y="0"/>
+          <a:chExt cx="0" cy="0"/>
+        </a:xfrm>
+      </p:grpSpPr>
+      <p:sp>
+        <p:nvSpPr>
+          <p:cNvPr id="2" name="Title 1">
+            <a:extLst>
+              <a:ext uri="{FF2B5EF4-FFF2-40B4-BE49-F238E27FC236}">
+                <a16:creationId xmlns:a16="http://schemas.microsoft.com/office/drawing/2014/main" id="{8318723F-8279-4DB1-BB76-F8F146EFF241}"/>
+              </a:ext>
+            </a:extLst>
+          </p:cNvPr>
+          <p:cNvSpPr>
+            <a:spLocks noGrp="1"/>
+          </p:cNvSpPr>
+          <p:nvPr>
+            <p:ph type="title"/>
+          </p:nvPr>
+        </p:nvSpPr>
+        <p:spPr/>
+        <p:txBody>
+          <a:bodyPr/>
+          <a:lstStyle/>
+          <a:p>
+            <a:r>
+              <a:rPr lang="en-US"/>
+              <a:t>Prefetch</a:t>
+            </a:r>
+            <a:endParaRPr lang="ru-RU"/>
+          </a:p>
+        </p:txBody>
+      </p:sp>
+      <p:sp>
+        <p:nvSpPr>
+          <p:cNvPr id="3" name="Content Placeholder 2">
+            <a:extLst>
+              <a:ext uri="{FF2B5EF4-FFF2-40B4-BE49-F238E27FC236}">
+                <a16:creationId xmlns:a16="http://schemas.microsoft.com/office/drawing/2014/main" id="{8147EE87-6CEC-44D0-80D6-56286741B105}"/>
+              </a:ext>
+            </a:extLst>
+          </p:cNvPr>
+          <p:cNvSpPr>
+            <a:spLocks noGrp="1"/>
+          </p:cNvSpPr>
+          <p:nvPr>
+            <p:ph idx="1"/>
+          </p:nvPr>
+        </p:nvSpPr>
+        <p:spPr/>
+        <p:txBody>
+          <a:bodyPr/>
+          <a:lstStyle/>
+          <a:p>
+            <a:r>
+              <a:rPr lang="ru-RU"/>
+              <a:t>Техника </a:t>
+            </a:r>
+            <a:r>
+              <a:rPr lang="ru-RU">
+                <a:solidFill>
+                  <a:srgbClr val="0000FF"/>
+                </a:solidFill>
+              </a:rPr>
+              <a:t>предвыборки (</a:t>
+            </a:r>
+            <a:r>
+              <a:rPr lang="en-US">
+                <a:solidFill>
+                  <a:srgbClr val="0000FF"/>
+                </a:solidFill>
+              </a:rPr>
+              <a:t>prefetch)</a:t>
+            </a:r>
+            <a:r>
+              <a:rPr lang="ru-RU"/>
+              <a:t> служит для того, чтобы подкачать в кэш данные</a:t>
+            </a:r>
+            <a:endParaRPr lang="en-US"/>
+          </a:p>
+          <a:p>
+            <a:pPr marL="45720" indent="0">
+              <a:buNone/>
+            </a:pPr>
+            <a:r>
+              <a:rPr lang="en-US">
+                <a:latin typeface="Consolas" panose="020B0609020204030204" pitchFamily="49" charset="0"/>
+              </a:rPr>
+              <a:t>for (int i = 0; i &lt; ARRSZ; ++i) {</a:t>
+            </a:r>
+            <a:br>
+              <a:rPr lang="en-US">
+                <a:latin typeface="Consolas" panose="020B0609020204030204" pitchFamily="49" charset="0"/>
+              </a:rPr>
+            </a:br>
+            <a:r>
+              <a:rPr lang="en-US">
+                <a:latin typeface="Consolas" panose="020B0609020204030204" pitchFamily="49" charset="0"/>
+              </a:rPr>
+              <a:t>  a[i] = a[i] + b[i];</a:t>
+            </a:r>
+            <a:br>
+              <a:rPr lang="en-US">
+                <a:latin typeface="Consolas" panose="020B0609020204030204" pitchFamily="49" charset="0"/>
+              </a:rPr>
+            </a:br>
+            <a:r>
+              <a:rPr lang="en-US">
+                <a:latin typeface="Consolas" panose="020B0609020204030204" pitchFamily="49" charset="0"/>
+              </a:rPr>
+              <a:t>  __builtin_prefetch(a[i+1]);</a:t>
+            </a:r>
+            <a:br>
+              <a:rPr lang="en-US">
+                <a:latin typeface="Consolas" panose="020B0609020204030204" pitchFamily="49" charset="0"/>
+              </a:rPr>
+            </a:br>
+            <a:r>
+              <a:rPr lang="en-US">
+                <a:latin typeface="Consolas" panose="020B0609020204030204" pitchFamily="49" charset="0"/>
+              </a:rPr>
+              <a:t>  __builtin_prefetch(b[i+1]);</a:t>
+            </a:r>
+            <a:br>
+              <a:rPr lang="en-US">
+                <a:latin typeface="Consolas" panose="020B0609020204030204" pitchFamily="49" charset="0"/>
+              </a:rPr>
+            </a:br>
+            <a:r>
+              <a:rPr lang="en-US">
+                <a:latin typeface="Consolas" panose="020B0609020204030204" pitchFamily="49" charset="0"/>
+              </a:rPr>
+              <a:t>}</a:t>
+            </a:r>
+          </a:p>
+          <a:p>
+            <a:r>
+              <a:rPr lang="ru-RU"/>
+              <a:t>Здесь до перехода будут подкачаны</a:t>
+            </a:r>
+          </a:p>
+        </p:txBody>
+      </p:sp>
+    </p:spTree>
+    <p:extLst>
+      <p:ext uri="{BB962C8B-B14F-4D97-AF65-F5344CB8AC3E}">
+        <p14:creationId xmlns:p14="http://schemas.microsoft.com/office/powerpoint/2010/main" val="2997879610"/>
+      </p:ext>
+    </p:extLst>
+  </p:cSld>
+  <p:clrMapOvr>
+    <a:masterClrMapping/>
+  </p:clrMapOvr>
+</p:sld>
+</file>
+
+<file path=ppt/slides/slide24.xml><?xml version="1.0" encoding="utf-8"?>
+<p:sld xmlns:a="http://schemas.openxmlformats.org/drawingml/2006/main" xmlns:r="http://schemas.openxmlformats.org/officeDocument/2006/relationships" xmlns:p="http://schemas.openxmlformats.org/presentationml/2006/main">
+  <p:cSld>
+    <p:spTree>
+      <p:nvGrpSpPr>
+        <p:cNvPr id="1" name=""/>
+        <p:cNvGrpSpPr/>
+        <p:nvPr/>
+      </p:nvGrpSpPr>
+      <p:grpSpPr>
+        <a:xfrm>
+          <a:off x="0" y="0"/>
+          <a:ext cx="0" cy="0"/>
+          <a:chOff x="0" y="0"/>
+          <a:chExt cx="0" cy="0"/>
+        </a:xfrm>
+      </p:grpSpPr>
+      <p:sp>
+        <p:nvSpPr>
+          <p:cNvPr id="2" name="Title 1">
+            <a:extLst>
+              <a:ext uri="{FF2B5EF4-FFF2-40B4-BE49-F238E27FC236}">
+                <a16:creationId xmlns:a16="http://schemas.microsoft.com/office/drawing/2014/main" id="{2CB5029A-95F0-4E3B-B9BC-83A7612AF55A}"/>
+              </a:ext>
+            </a:extLst>
+          </p:cNvPr>
+          <p:cNvSpPr>
+            <a:spLocks noGrp="1"/>
+          </p:cNvSpPr>
+          <p:nvPr>
+            <p:ph type="title"/>
+          </p:nvPr>
+        </p:nvSpPr>
+        <p:spPr/>
+        <p:txBody>
+          <a:bodyPr/>
+          <a:lstStyle/>
+          <a:p>
+            <a:r>
+              <a:rPr lang="en-US"/>
+              <a:t>Instruction cache</a:t>
+            </a:r>
+            <a:endParaRPr lang="ru-RU"/>
+          </a:p>
+        </p:txBody>
+      </p:sp>
+      <p:sp>
+        <p:nvSpPr>
+          <p:cNvPr id="3" name="Content Placeholder 2">
+            <a:extLst>
+              <a:ext uri="{FF2B5EF4-FFF2-40B4-BE49-F238E27FC236}">
+                <a16:creationId xmlns:a16="http://schemas.microsoft.com/office/drawing/2014/main" id="{784C8091-BC24-4AEF-8141-4FB95AE641D1}"/>
+              </a:ext>
+            </a:extLst>
+          </p:cNvPr>
+          <p:cNvSpPr>
+            <a:spLocks noGrp="1"/>
+          </p:cNvSpPr>
+          <p:nvPr>
+            <p:ph idx="1"/>
+          </p:nvPr>
+        </p:nvSpPr>
+        <p:spPr/>
+        <p:txBody>
+          <a:bodyPr/>
+          <a:lstStyle/>
+          <a:p>
+            <a:r>
+              <a:rPr lang="ru-RU"/>
+              <a:t>Инструкции это тоже данные</a:t>
+            </a:r>
+          </a:p>
+          <a:p>
+            <a:r>
+              <a:rPr lang="ru-RU"/>
+              <a:t>Конвейер декодировав инструкцию сохраняет её в кэш инструкций</a:t>
+            </a:r>
+          </a:p>
+          <a:p>
+            <a:endParaRPr lang="ru-RU"/>
+          </a:p>
+          <a:p>
+            <a:r>
+              <a:rPr lang="ru-RU"/>
+              <a:t>Таким образом</a:t>
+            </a:r>
+            <a:r>
+              <a:rPr lang="en-US"/>
+              <a:t>, </a:t>
+            </a:r>
+            <a:r>
+              <a:rPr lang="ru-RU"/>
+              <a:t>кроме </a:t>
+            </a:r>
+            <a:r>
+              <a:rPr lang="en-US"/>
+              <a:t>branch mispredict </a:t>
+            </a:r>
+            <a:r>
+              <a:rPr lang="ru-RU"/>
+              <a:t>можно рассматривать </a:t>
+            </a:r>
+            <a:r>
+              <a:rPr lang="en-US"/>
+              <a:t>instruction cache miss</a:t>
+            </a:r>
+            <a:endParaRPr lang="ru-RU"/>
+          </a:p>
+        </p:txBody>
+      </p:sp>
+    </p:spTree>
+    <p:extLst>
+      <p:ext uri="{BB962C8B-B14F-4D97-AF65-F5344CB8AC3E}">
+        <p14:creationId xmlns:p14="http://schemas.microsoft.com/office/powerpoint/2010/main" val="165033581"/>
+      </p:ext>
+    </p:extLst>
+  </p:cSld>
+  <p:clrMapOvr>
+    <a:masterClrMapping/>
+  </p:clrMapOvr>
+</p:sld>
+</file>
+
+<file path=ppt/slides/slide25.xml><?xml version="1.0" encoding="utf-8"?>
+<p:sld xmlns:a="http://schemas.openxmlformats.org/drawingml/2006/main" xmlns:r="http://schemas.openxmlformats.org/officeDocument/2006/relationships" xmlns:p="http://schemas.openxmlformats.org/presentationml/2006/main">
+  <p:cSld>
+    <p:spTree>
+      <p:nvGrpSpPr>
+        <p:cNvPr id="1" name=""/>
+        <p:cNvGrpSpPr/>
+        <p:nvPr/>
+      </p:nvGrpSpPr>
+      <p:grpSpPr>
+        <a:xfrm>
+          <a:off x="0" y="0"/>
+          <a:ext cx="0" cy="0"/>
+          <a:chOff x="0" y="0"/>
+          <a:chExt cx="0" cy="0"/>
+        </a:xfrm>
+      </p:grpSpPr>
+      <p:sp>
+        <p:nvSpPr>
           <p:cNvPr id="2" name="Title 1"/>
           <p:cNvSpPr>
             <a:spLocks noGrp="1"/>
@@ -13851,213 +16168,6 @@
     <p:extLst>
       <p:ext uri="{BB962C8B-B14F-4D97-AF65-F5344CB8AC3E}">
         <p14:creationId xmlns:p14="http://schemas.microsoft.com/office/powerpoint/2010/main" val="1719869055"/>
-      </p:ext>
-    </p:extLst>
-  </p:cSld>
-  <p:clrMapOvr>
-    <a:masterClrMapping/>
-  </p:clrMapOvr>
-</p:sld>
-</file>
-
-<file path=ppt/slides/slide2.xml><?xml version="1.0" encoding="utf-8"?>
-<p:sld xmlns:a="http://schemas.openxmlformats.org/drawingml/2006/main" xmlns:r="http://schemas.openxmlformats.org/officeDocument/2006/relationships" xmlns:p="http://schemas.openxmlformats.org/presentationml/2006/main">
-  <p:cSld>
-    <p:spTree>
-      <p:nvGrpSpPr>
-        <p:cNvPr id="1" name=""/>
-        <p:cNvGrpSpPr/>
-        <p:nvPr/>
-      </p:nvGrpSpPr>
-      <p:grpSpPr>
-        <a:xfrm>
-          <a:off x="0" y="0"/>
-          <a:ext cx="0" cy="0"/>
-          <a:chOff x="0" y="0"/>
-          <a:chExt cx="0" cy="0"/>
-        </a:xfrm>
-      </p:grpSpPr>
-      <p:sp>
-        <p:nvSpPr>
-          <p:cNvPr id="2" name="Title 1">
-            <a:extLst>
-              <a:ext uri="{FF2B5EF4-FFF2-40B4-BE49-F238E27FC236}">
-                <a16:creationId xmlns:a16="http://schemas.microsoft.com/office/drawing/2014/main" id="{FAB44B53-E875-43D6-AC4C-772A677B97FC}"/>
-              </a:ext>
-            </a:extLst>
-          </p:cNvPr>
-          <p:cNvSpPr>
-            <a:spLocks noGrp="1"/>
-          </p:cNvSpPr>
-          <p:nvPr>
-            <p:ph type="title"/>
-          </p:nvPr>
-        </p:nvSpPr>
-        <p:spPr/>
-        <p:txBody>
-          <a:bodyPr/>
-          <a:lstStyle/>
-          <a:p>
-            <a:r>
-              <a:rPr lang="ru-RU"/>
-              <a:t>Загадочная проблема</a:t>
-            </a:r>
-          </a:p>
-        </p:txBody>
-      </p:sp>
-      <p:sp>
-        <p:nvSpPr>
-          <p:cNvPr id="3" name="Content Placeholder 2">
-            <a:extLst>
-              <a:ext uri="{FF2B5EF4-FFF2-40B4-BE49-F238E27FC236}">
-                <a16:creationId xmlns:a16="http://schemas.microsoft.com/office/drawing/2014/main" id="{A7FD2C83-04A6-43DC-98B2-C73A76BB6A91}"/>
-              </a:ext>
-            </a:extLst>
-          </p:cNvPr>
-          <p:cNvSpPr>
-            <a:spLocks noGrp="1"/>
-          </p:cNvSpPr>
-          <p:nvPr>
-            <p:ph idx="1"/>
-          </p:nvPr>
-        </p:nvSpPr>
-        <p:spPr>
-          <a:xfrm>
-            <a:off x="1143000" y="2057400"/>
-            <a:ext cx="9872871" cy="4494320"/>
-          </a:xfrm>
-        </p:spPr>
-        <p:txBody>
-          <a:bodyPr/>
-          <a:lstStyle/>
-          <a:p>
-            <a:r>
-              <a:rPr lang="ru-RU"/>
-              <a:t>Следующий код суммирует все элементы массива, меньшие, чем </a:t>
-            </a:r>
-            <a:r>
-              <a:rPr lang="en-US">
-                <a:latin typeface="Consolas" panose="020B0609020204030204" pitchFamily="49" charset="0"/>
-              </a:rPr>
-              <a:t>128</a:t>
-            </a:r>
-            <a:endParaRPr lang="ru-RU"/>
-          </a:p>
-          <a:p>
-            <a:pPr marL="45720" indent="0">
-              <a:buNone/>
-            </a:pPr>
-            <a:r>
-              <a:rPr lang="en-US">
-                <a:latin typeface="Consolas" panose="020B0609020204030204" pitchFamily="49" charset="0"/>
-              </a:rPr>
-              <a:t>for (j = 0; j &lt; len; ++j)</a:t>
-            </a:r>
-            <a:br>
-              <a:rPr lang="en-US">
-                <a:latin typeface="Consolas" panose="020B0609020204030204" pitchFamily="49" charset="0"/>
-              </a:rPr>
-            </a:br>
-            <a:r>
-              <a:rPr lang="en-US">
-                <a:latin typeface="Consolas" panose="020B0609020204030204" pitchFamily="49" charset="0"/>
-              </a:rPr>
-              <a:t>  if (arr[j] &gt; 128)</a:t>
-            </a:r>
-            <a:br>
-              <a:rPr lang="en-US">
-                <a:latin typeface="Consolas" panose="020B0609020204030204" pitchFamily="49" charset="0"/>
-              </a:rPr>
-            </a:br>
-            <a:r>
-              <a:rPr lang="en-US">
-                <a:latin typeface="Consolas" panose="020B0609020204030204" pitchFamily="49" charset="0"/>
-              </a:rPr>
-              <a:t>    sum += arr[j]; </a:t>
-            </a:r>
-            <a:endParaRPr lang="ru-RU">
-              <a:latin typeface="Consolas" panose="020B0609020204030204" pitchFamily="49" charset="0"/>
-            </a:endParaRPr>
-          </a:p>
-          <a:p>
-            <a:r>
-              <a:rPr lang="ru-RU"/>
-              <a:t>Проблема в том, что</a:t>
-            </a:r>
-            <a:r>
-              <a:rPr lang="en-US"/>
-              <a:t> </a:t>
-            </a:r>
-            <a:r>
-              <a:rPr lang="ru-RU"/>
-              <a:t>для несортированных массивов он (без изменений в самом коде) работает почти в четыре раза медленнее, чем для сортированных</a:t>
-            </a:r>
-          </a:p>
-          <a:p>
-            <a:r>
-              <a:rPr lang="ru-RU"/>
-              <a:t>См. пример </a:t>
-            </a:r>
-            <a:r>
-              <a:rPr lang="en-US" b="1">
-                <a:latin typeface="Consolas" panose="020B0609020204030204" pitchFamily="49" charset="0"/>
-              </a:rPr>
-              <a:t>bmystery.c</a:t>
-            </a:r>
-            <a:r>
-              <a:rPr lang="en-US"/>
-              <a:t> </a:t>
-            </a:r>
-            <a:r>
-              <a:rPr lang="ru-RU"/>
-              <a:t>в файлах к семинару</a:t>
-            </a:r>
-          </a:p>
-          <a:p>
-            <a:r>
-              <a:rPr lang="ru-RU"/>
-              <a:t>Предположим, необходимо эффективно обрабатывать именно несортированные массивы</a:t>
-            </a:r>
-          </a:p>
-          <a:p>
-            <a:r>
-              <a:rPr lang="ru-RU"/>
-              <a:t>Значит надо понять </a:t>
-            </a:r>
-            <a:r>
-              <a:rPr lang="ru-RU">
-                <a:solidFill>
-                  <a:srgbClr val="0000FF"/>
-                </a:solidFill>
-              </a:rPr>
-              <a:t>почему</a:t>
-            </a:r>
-            <a:r>
-              <a:rPr lang="ru-RU"/>
-              <a:t> происходит замедление и </a:t>
-            </a:r>
-            <a:r>
-              <a:rPr lang="ru-RU">
-                <a:solidFill>
-                  <a:srgbClr val="0000FF"/>
-                </a:solidFill>
-              </a:rPr>
-              <a:t>как</a:t>
-            </a:r>
-            <a:r>
-              <a:rPr lang="ru-RU"/>
-              <a:t> это исправить</a:t>
-            </a:r>
-          </a:p>
-          <a:p>
-            <a:endParaRPr lang="ru-RU"/>
-          </a:p>
-        </p:txBody>
-      </p:sp>
-    </p:spTree>
-    <p:extLst>
-      <p:ext uri="{BB962C8B-B14F-4D97-AF65-F5344CB8AC3E}">
-        <p14:creationId xmlns:p14="http://schemas.microsoft.com/office/powerpoint/2010/main" val="3437026259"/>
       </p:ext>
     </p:extLst>
   </p:cSld>

</xml_diff>

<commit_message>
Finalizing slides and adding files to seminar 8 Also some concepts correction and iterators slides for postgraduates
git-svn-id: https://svn.code.sf.net/p/cpp-lects-rus/code/trunk@337 39143b06-f351-456c-9f92-4cd32fad6823
</commit_message>
<xml_diff>
--- a/other_lects/informatics/08-realworld.pptx
+++ b/other_lects/informatics/08-realworld.pptx
@@ -15,21 +15,28 @@
     <p:sldId id="265" r:id="rId9"/>
     <p:sldId id="266" r:id="rId10"/>
     <p:sldId id="267" r:id="rId11"/>
-    <p:sldId id="268" r:id="rId12"/>
-    <p:sldId id="269" r:id="rId13"/>
-    <p:sldId id="270" r:id="rId14"/>
-    <p:sldId id="271" r:id="rId15"/>
-    <p:sldId id="272" r:id="rId16"/>
-    <p:sldId id="273" r:id="rId17"/>
-    <p:sldId id="278" r:id="rId18"/>
-    <p:sldId id="279" r:id="rId19"/>
-    <p:sldId id="274" r:id="rId20"/>
-    <p:sldId id="275" r:id="rId21"/>
-    <p:sldId id="276" r:id="rId22"/>
-    <p:sldId id="277" r:id="rId23"/>
-    <p:sldId id="280" r:id="rId24"/>
-    <p:sldId id="281" r:id="rId25"/>
-    <p:sldId id="258" r:id="rId26"/>
+    <p:sldId id="282" r:id="rId12"/>
+    <p:sldId id="268" r:id="rId13"/>
+    <p:sldId id="269" r:id="rId14"/>
+    <p:sldId id="270" r:id="rId15"/>
+    <p:sldId id="283" r:id="rId16"/>
+    <p:sldId id="271" r:id="rId17"/>
+    <p:sldId id="272" r:id="rId18"/>
+    <p:sldId id="284" r:id="rId19"/>
+    <p:sldId id="285" r:id="rId20"/>
+    <p:sldId id="286" r:id="rId21"/>
+    <p:sldId id="287" r:id="rId22"/>
+    <p:sldId id="288" r:id="rId23"/>
+    <p:sldId id="273" r:id="rId24"/>
+    <p:sldId id="278" r:id="rId25"/>
+    <p:sldId id="279" r:id="rId26"/>
+    <p:sldId id="274" r:id="rId27"/>
+    <p:sldId id="275" r:id="rId28"/>
+    <p:sldId id="276" r:id="rId29"/>
+    <p:sldId id="277" r:id="rId30"/>
+    <p:sldId id="280" r:id="rId31"/>
+    <p:sldId id="281" r:id="rId32"/>
+    <p:sldId id="258" r:id="rId33"/>
   </p:sldIdLst>
   <p:sldSz cx="12192000" cy="6858000"/>
   <p:notesSz cx="6858000" cy="9144000"/>
@@ -7343,7 +7350,7 @@
             <a:fld id="{96DFF08F-DC6B-4601-B491-B0F83F6DD2DA}" type="datetimeFigureOut">
               <a:rPr lang="en-US" dirty="0"/>
               <a:pPr/>
-              <a:t>4/14/2019</a:t>
+              <a:t>5/2/2019</a:t>
             </a:fld>
             <a:endParaRPr lang="en-US" dirty="0"/>
           </a:p>
@@ -7560,7 +7567,7 @@
           <a:p>
             <a:fld id="{96DFF08F-DC6B-4601-B491-B0F83F6DD2DA}" type="datetimeFigureOut">
               <a:rPr lang="en-US" dirty="0"/>
-              <a:t>4/14/2019</a:t>
+              <a:t>5/2/2019</a:t>
             </a:fld>
             <a:endParaRPr lang="en-US" dirty="0"/>
           </a:p>
@@ -7735,7 +7742,7 @@
           <a:p>
             <a:fld id="{96DFF08F-DC6B-4601-B491-B0F83F6DD2DA}" type="datetimeFigureOut">
               <a:rPr lang="en-US" dirty="0"/>
-              <a:t>4/14/2019</a:t>
+              <a:t>5/2/2019</a:t>
             </a:fld>
             <a:endParaRPr lang="en-US" dirty="0"/>
           </a:p>
@@ -7900,7 +7907,7 @@
           <a:p>
             <a:fld id="{96DFF08F-DC6B-4601-B491-B0F83F6DD2DA}" type="datetimeFigureOut">
               <a:rPr lang="en-US" dirty="0"/>
-              <a:t>4/14/2019</a:t>
+              <a:t>5/2/2019</a:t>
             </a:fld>
             <a:endParaRPr lang="en-US" dirty="0"/>
           </a:p>
@@ -8146,7 +8153,7 @@
           <a:p>
             <a:fld id="{96DFF08F-DC6B-4601-B491-B0F83F6DD2DA}" type="datetimeFigureOut">
               <a:rPr lang="en-US" dirty="0"/>
-              <a:t>4/14/2019</a:t>
+              <a:t>5/2/2019</a:t>
             </a:fld>
             <a:endParaRPr lang="en-US" dirty="0"/>
           </a:p>
@@ -8464,7 +8471,7 @@
           <a:p>
             <a:fld id="{96DFF08F-DC6B-4601-B491-B0F83F6DD2DA}" type="datetimeFigureOut">
               <a:rPr lang="en-US" dirty="0"/>
-              <a:t>4/14/2019</a:t>
+              <a:t>5/2/2019</a:t>
             </a:fld>
             <a:endParaRPr lang="en-US" dirty="0"/>
           </a:p>
@@ -8883,7 +8890,7 @@
           <a:p>
             <a:fld id="{96DFF08F-DC6B-4601-B491-B0F83F6DD2DA}" type="datetimeFigureOut">
               <a:rPr lang="en-US" dirty="0"/>
-              <a:t>4/14/2019</a:t>
+              <a:t>5/2/2019</a:t>
             </a:fld>
             <a:endParaRPr lang="en-US" dirty="0"/>
           </a:p>
@@ -8996,7 +9003,7 @@
           <a:p>
             <a:fld id="{96DFF08F-DC6B-4601-B491-B0F83F6DD2DA}" type="datetimeFigureOut">
               <a:rPr lang="en-US" dirty="0"/>
-              <a:t>4/14/2019</a:t>
+              <a:t>5/2/2019</a:t>
             </a:fld>
             <a:endParaRPr lang="en-US" dirty="0"/>
           </a:p>
@@ -9086,7 +9093,7 @@
           <a:p>
             <a:fld id="{96DFF08F-DC6B-4601-B491-B0F83F6DD2DA}" type="datetimeFigureOut">
               <a:rPr lang="en-US" dirty="0"/>
-              <a:t>4/14/2019</a:t>
+              <a:t>5/2/2019</a:t>
             </a:fld>
             <a:endParaRPr lang="en-US" dirty="0"/>
           </a:p>
@@ -9371,7 +9378,7 @@
           <a:p>
             <a:fld id="{96DFF08F-DC6B-4601-B491-B0F83F6DD2DA}" type="datetimeFigureOut">
               <a:rPr lang="en-US" dirty="0"/>
-              <a:t>4/14/2019</a:t>
+              <a:t>5/2/2019</a:t>
             </a:fld>
             <a:endParaRPr lang="en-US" dirty="0"/>
           </a:p>
@@ -9638,7 +9645,7 @@
           <a:p>
             <a:fld id="{96DFF08F-DC6B-4601-B491-B0F83F6DD2DA}" type="datetimeFigureOut">
               <a:rPr lang="en-US" dirty="0"/>
-              <a:t>4/14/2019</a:t>
+              <a:t>5/2/2019</a:t>
             </a:fld>
             <a:endParaRPr lang="en-US" dirty="0"/>
           </a:p>
@@ -9887,7 +9894,7 @@
             <a:fld id="{96DFF08F-DC6B-4601-B491-B0F83F6DD2DA}" type="datetimeFigureOut">
               <a:rPr lang="en-US" dirty="0"/>
               <a:pPr/>
-              <a:t>4/14/2019</a:t>
+              <a:t>5/2/2019</a:t>
             </a:fld>
             <a:endParaRPr lang="en-US" dirty="0"/>
           </a:p>
@@ -10893,6 +10900,184 @@
           <p:cNvPr id="2" name="Title 1">
             <a:extLst>
               <a:ext uri="{FF2B5EF4-FFF2-40B4-BE49-F238E27FC236}">
+                <a16:creationId xmlns:a16="http://schemas.microsoft.com/office/drawing/2014/main" id="{1E860D5E-AF38-4882-ACFE-949076036556}"/>
+              </a:ext>
+            </a:extLst>
+          </p:cNvPr>
+          <p:cNvSpPr>
+            <a:spLocks noGrp="1"/>
+          </p:cNvSpPr>
+          <p:nvPr>
+            <p:ph type="title"/>
+          </p:nvPr>
+        </p:nvSpPr>
+        <p:spPr/>
+        <p:txBody>
+          <a:bodyPr/>
+          <a:lstStyle/>
+          <a:p>
+            <a:r>
+              <a:rPr lang="ru-RU"/>
+              <a:t>Интермедия: </a:t>
+            </a:r>
+            <a:r>
+              <a:rPr lang="en-US"/>
+              <a:t>out-of-order</a:t>
+            </a:r>
+            <a:endParaRPr lang="ru-RU"/>
+          </a:p>
+        </p:txBody>
+      </p:sp>
+      <p:pic>
+        <p:nvPicPr>
+          <p:cNvPr id="6" name="Content Placeholder 5">
+            <a:extLst>
+              <a:ext uri="{FF2B5EF4-FFF2-40B4-BE49-F238E27FC236}">
+                <a16:creationId xmlns:a16="http://schemas.microsoft.com/office/drawing/2014/main" id="{0EEFD27E-730F-4800-BF74-04246976318E}"/>
+              </a:ext>
+            </a:extLst>
+          </p:cNvPr>
+          <p:cNvPicPr>
+            <a:picLocks noGrp="1" noChangeAspect="1"/>
+          </p:cNvPicPr>
+          <p:nvPr>
+            <p:ph idx="1"/>
+          </p:nvPr>
+        </p:nvPicPr>
+        <p:blipFill>
+          <a:blip r:embed="rId2"/>
+          <a:stretch>
+            <a:fillRect/>
+          </a:stretch>
+        </p:blipFill>
+        <p:spPr>
+          <a:xfrm>
+            <a:off x="5796793" y="294401"/>
+            <a:ext cx="5461233" cy="6269198"/>
+          </a:xfrm>
+        </p:spPr>
+      </p:pic>
+      <p:sp>
+        <p:nvSpPr>
+          <p:cNvPr id="4" name="Text Placeholder 3">
+            <a:extLst>
+              <a:ext uri="{FF2B5EF4-FFF2-40B4-BE49-F238E27FC236}">
+                <a16:creationId xmlns:a16="http://schemas.microsoft.com/office/drawing/2014/main" id="{558235D9-9916-467A-A32A-F7C8063BF51B}"/>
+              </a:ext>
+            </a:extLst>
+          </p:cNvPr>
+          <p:cNvSpPr>
+            <a:spLocks noGrp="1"/>
+          </p:cNvSpPr>
+          <p:nvPr>
+            <p:ph type="body" sz="half" idx="2"/>
+          </p:nvPr>
+        </p:nvSpPr>
+        <p:spPr/>
+        <p:txBody>
+          <a:bodyPr/>
+          <a:lstStyle/>
+          <a:p>
+            <a:pPr marL="285750" indent="-285750">
+              <a:buFont typeface="Arial" panose="020B0604020202020204" pitchFamily="34" charset="0"/>
+              <a:buChar char="•"/>
+            </a:pPr>
+            <a:r>
+              <a:rPr lang="ru-RU"/>
+              <a:t>Слайд с конвейером мог ввести в заблуждение</a:t>
+            </a:r>
+          </a:p>
+          <a:p>
+            <a:pPr marL="285750" indent="-285750">
+              <a:buFont typeface="Arial" panose="020B0604020202020204" pitchFamily="34" charset="0"/>
+              <a:buChar char="•"/>
+            </a:pPr>
+            <a:r>
+              <a:rPr lang="ru-RU"/>
+              <a:t>На самом деле инструкции исполняются не так уж линейно</a:t>
+            </a:r>
+          </a:p>
+          <a:p>
+            <a:pPr marL="285750" indent="-285750">
+              <a:buFont typeface="Arial" panose="020B0604020202020204" pitchFamily="34" charset="0"/>
+              <a:buChar char="•"/>
+            </a:pPr>
+            <a:r>
+              <a:rPr lang="ru-RU"/>
+              <a:t>Важная часть конвейера – </a:t>
+            </a:r>
+            <a:r>
+              <a:rPr lang="ru-RU" b="1"/>
+              <a:t>планировщик</a:t>
+            </a:r>
+            <a:r>
+              <a:rPr lang="ru-RU"/>
+              <a:t> который раскидывает инструкции по </a:t>
+            </a:r>
+            <a:r>
+              <a:rPr lang="en-US"/>
+              <a:t>ALU, </a:t>
+            </a:r>
+            <a:r>
+              <a:rPr lang="ru-RU"/>
+              <a:t>учитывая их специфику и взаимосвязи</a:t>
+            </a:r>
+          </a:p>
+          <a:p>
+            <a:pPr marL="285750" indent="-285750">
+              <a:buFont typeface="Arial" panose="020B0604020202020204" pitchFamily="34" charset="0"/>
+              <a:buChar char="•"/>
+            </a:pPr>
+            <a:r>
+              <a:rPr lang="ru-RU"/>
+              <a:t>Это делает </a:t>
+            </a:r>
+            <a:r>
+              <a:rPr lang="en-US"/>
+              <a:t>mispredict </a:t>
+            </a:r>
+            <a:r>
+              <a:rPr lang="ru-RU" b="1"/>
+              <a:t>ещё хуже</a:t>
+            </a:r>
+          </a:p>
+        </p:txBody>
+      </p:sp>
+    </p:spTree>
+    <p:extLst>
+      <p:ext uri="{BB962C8B-B14F-4D97-AF65-F5344CB8AC3E}">
+        <p14:creationId xmlns:p14="http://schemas.microsoft.com/office/powerpoint/2010/main" val="1435523718"/>
+      </p:ext>
+    </p:extLst>
+  </p:cSld>
+  <p:clrMapOvr>
+    <a:masterClrMapping/>
+  </p:clrMapOvr>
+</p:sld>
+</file>
+
+<file path=ppt/slides/slide12.xml><?xml version="1.0" encoding="utf-8"?>
+<p:sld xmlns:a="http://schemas.openxmlformats.org/drawingml/2006/main" xmlns:r="http://schemas.openxmlformats.org/officeDocument/2006/relationships" xmlns:p="http://schemas.openxmlformats.org/presentationml/2006/main">
+  <p:cSld>
+    <p:spTree>
+      <p:nvGrpSpPr>
+        <p:cNvPr id="1" name=""/>
+        <p:cNvGrpSpPr/>
+        <p:nvPr/>
+      </p:nvGrpSpPr>
+      <p:grpSpPr>
+        <a:xfrm>
+          <a:off x="0" y="0"/>
+          <a:ext cx="0" cy="0"/>
+          <a:chOff x="0" y="0"/>
+          <a:chExt cx="0" cy="0"/>
+        </a:xfrm>
+      </p:grpSpPr>
+      <p:sp>
+        <p:nvSpPr>
+          <p:cNvPr id="2" name="Title 1">
+            <a:extLst>
+              <a:ext uri="{FF2B5EF4-FFF2-40B4-BE49-F238E27FC236}">
                 <a16:creationId xmlns:a16="http://schemas.microsoft.com/office/drawing/2014/main" id="{9568B9F8-A35B-4F2D-B961-6CBC96FFA9FC}"/>
               </a:ext>
             </a:extLst>
@@ -11098,7 +11283,7 @@
 </p:sld>
 </file>
 
-<file path=ppt/slides/slide12.xml><?xml version="1.0" encoding="utf-8"?>
+<file path=ppt/slides/slide13.xml><?xml version="1.0" encoding="utf-8"?>
 <p:sld xmlns:a="http://schemas.openxmlformats.org/drawingml/2006/main" xmlns:r="http://schemas.openxmlformats.org/officeDocument/2006/relationships" xmlns:p="http://schemas.openxmlformats.org/presentationml/2006/main">
   <p:cSld>
     <p:spTree>
@@ -11166,7 +11351,7 @@
           <a:p>
             <a:r>
               <a:rPr lang="ru-RU"/>
-              <a:t>Грубо можно классифицировать память на статическую и динамическую</a:t>
+              <a:t>Грубо можно классифицировать память на динамическую и статическую</a:t>
             </a:r>
           </a:p>
         </p:txBody>
@@ -11323,7 +11508,7 @@
 </p:sld>
 </file>
 
-<file path=ppt/slides/slide13.xml><?xml version="1.0" encoding="utf-8"?>
+<file path=ppt/slides/slide14.xml><?xml version="1.0" encoding="utf-8"?>
 <p:sld xmlns:a="http://schemas.openxmlformats.org/drawingml/2006/main" xmlns:r="http://schemas.openxmlformats.org/officeDocument/2006/relationships" xmlns:p="http://schemas.openxmlformats.org/presentationml/2006/main">
   <p:cSld>
     <p:spTree>
@@ -11436,7 +11621,7 @@
                   <a:srgbClr val="0000FF"/>
                 </a:solidFill>
               </a:rPr>
-              <a:t>кешировать</a:t>
+              <a:t>кэшировать</a:t>
             </a:r>
             <a:r>
               <a:rPr lang="ru-RU"/>
@@ -11489,7 +11674,273 @@
 </p:sld>
 </file>
 
-<file path=ppt/slides/slide14.xml><?xml version="1.0" encoding="utf-8"?>
+<file path=ppt/slides/slide15.xml><?xml version="1.0" encoding="utf-8"?>
+<p:sld xmlns:a="http://schemas.openxmlformats.org/drawingml/2006/main" xmlns:r="http://schemas.openxmlformats.org/officeDocument/2006/relationships" xmlns:p="http://schemas.openxmlformats.org/presentationml/2006/main">
+  <p:cSld>
+    <p:spTree>
+      <p:nvGrpSpPr>
+        <p:cNvPr id="1" name=""/>
+        <p:cNvGrpSpPr/>
+        <p:nvPr/>
+      </p:nvGrpSpPr>
+      <p:grpSpPr>
+        <a:xfrm>
+          <a:off x="0" y="0"/>
+          <a:ext cx="0" cy="0"/>
+          <a:chOff x="0" y="0"/>
+          <a:chExt cx="0" cy="0"/>
+        </a:xfrm>
+      </p:grpSpPr>
+      <p:sp>
+        <p:nvSpPr>
+          <p:cNvPr id="2" name="Title 1">
+            <a:extLst>
+              <a:ext uri="{FF2B5EF4-FFF2-40B4-BE49-F238E27FC236}">
+                <a16:creationId xmlns:a16="http://schemas.microsoft.com/office/drawing/2014/main" id="{BE11FDC9-0C2C-4000-9524-955B7DAAE4CB}"/>
+              </a:ext>
+            </a:extLst>
+          </p:cNvPr>
+          <p:cNvSpPr>
+            <a:spLocks noGrp="1"/>
+          </p:cNvSpPr>
+          <p:nvPr>
+            <p:ph type="title"/>
+          </p:nvPr>
+        </p:nvSpPr>
+        <p:spPr/>
+        <p:txBody>
+          <a:bodyPr/>
+          <a:lstStyle/>
+          <a:p>
+            <a:r>
+              <a:rPr lang="ru-RU"/>
+              <a:t>Идея кэширования</a:t>
+            </a:r>
+          </a:p>
+        </p:txBody>
+      </p:sp>
+      <p:sp>
+        <p:nvSpPr>
+          <p:cNvPr id="3" name="Content Placeholder 2">
+            <a:extLst>
+              <a:ext uri="{FF2B5EF4-FFF2-40B4-BE49-F238E27FC236}">
+                <a16:creationId xmlns:a16="http://schemas.microsoft.com/office/drawing/2014/main" id="{0FC2544A-5123-4DCB-B595-0D32534EED0F}"/>
+              </a:ext>
+            </a:extLst>
+          </p:cNvPr>
+          <p:cNvSpPr>
+            <a:spLocks noGrp="1"/>
+          </p:cNvSpPr>
+          <p:nvPr>
+            <p:ph idx="1"/>
+          </p:nvPr>
+        </p:nvSpPr>
+        <p:spPr/>
+        <p:txBody>
+          <a:bodyPr/>
+          <a:lstStyle/>
+          <a:p>
+            <a:r>
+              <a:rPr lang="ru-RU"/>
+              <a:t>Допустим вы делаете обращение в память</a:t>
+            </a:r>
+          </a:p>
+          <a:p>
+            <a:pPr marL="45720" indent="0">
+              <a:buNone/>
+            </a:pPr>
+            <a:r>
+              <a:rPr lang="en-US">
+                <a:latin typeface="Consolas" panose="020B0609020204030204" pitchFamily="49" charset="0"/>
+              </a:rPr>
+              <a:t>int b = a[0];</a:t>
+            </a:r>
+            <a:r>
+              <a:rPr lang="en-US"/>
+              <a:t> // </a:t>
+            </a:r>
+            <a:r>
+              <a:rPr lang="ru-RU"/>
+              <a:t>около </a:t>
+            </a:r>
+            <a:r>
+              <a:rPr lang="ru-RU">
+                <a:latin typeface="Consolas" panose="020B0609020204030204" pitchFamily="49" charset="0"/>
+              </a:rPr>
+              <a:t>100</a:t>
+            </a:r>
+            <a:r>
+              <a:rPr lang="ru-RU"/>
+              <a:t> наносекунд</a:t>
+            </a:r>
+          </a:p>
+          <a:p>
+            <a:r>
+              <a:rPr lang="ru-RU"/>
+              <a:t>Процессор предполагает что следующее обращение будет недалеко и загружает всю кэш-линию (около </a:t>
+            </a:r>
+            <a:r>
+              <a:rPr lang="ru-RU">
+                <a:latin typeface="Consolas" panose="020B0609020204030204" pitchFamily="49" charset="0"/>
+              </a:rPr>
+              <a:t>64</a:t>
+            </a:r>
+            <a:r>
+              <a:rPr lang="ru-RU"/>
+              <a:t> байт) в </a:t>
+            </a:r>
+            <a:r>
+              <a:rPr lang="en-US">
+                <a:latin typeface="Consolas" panose="020B0609020204030204" pitchFamily="49" charset="0"/>
+              </a:rPr>
+              <a:t>L1</a:t>
+            </a:r>
+            <a:r>
+              <a:rPr lang="en-US"/>
+              <a:t> </a:t>
+            </a:r>
+            <a:r>
+              <a:rPr lang="ru-RU"/>
+              <a:t>кэш</a:t>
+            </a:r>
+          </a:p>
+          <a:p>
+            <a:pPr marL="45720" indent="0">
+              <a:buNone/>
+            </a:pPr>
+            <a:r>
+              <a:rPr lang="en-US">
+                <a:latin typeface="Consolas" panose="020B0609020204030204" pitchFamily="49" charset="0"/>
+              </a:rPr>
+              <a:t>int </a:t>
+            </a:r>
+            <a:r>
+              <a:rPr lang="ru-RU">
+                <a:latin typeface="Consolas" panose="020B0609020204030204" pitchFamily="49" charset="0"/>
+              </a:rPr>
+              <a:t>с</a:t>
+            </a:r>
+            <a:r>
+              <a:rPr lang="en-US">
+                <a:latin typeface="Consolas" panose="020B0609020204030204" pitchFamily="49" charset="0"/>
+              </a:rPr>
+              <a:t> = a[</a:t>
+            </a:r>
+            <a:r>
+              <a:rPr lang="ru-RU">
+                <a:latin typeface="Consolas" panose="020B0609020204030204" pitchFamily="49" charset="0"/>
+              </a:rPr>
+              <a:t>1</a:t>
+            </a:r>
+            <a:r>
+              <a:rPr lang="en-US">
+                <a:latin typeface="Consolas" panose="020B0609020204030204" pitchFamily="49" charset="0"/>
+              </a:rPr>
+              <a:t>]</a:t>
+            </a:r>
+            <a:r>
+              <a:rPr lang="en-US"/>
+              <a:t>; // </a:t>
+            </a:r>
+            <a:r>
+              <a:rPr lang="ru-RU"/>
+              <a:t>около </a:t>
+            </a:r>
+            <a:r>
+              <a:rPr lang="ru-RU">
+                <a:latin typeface="Consolas" panose="020B0609020204030204" pitchFamily="49" charset="0"/>
+              </a:rPr>
+              <a:t>0</a:t>
+            </a:r>
+            <a:r>
+              <a:rPr lang="en-US">
+                <a:latin typeface="Consolas" panose="020B0609020204030204" pitchFamily="49" charset="0"/>
+              </a:rPr>
+              <a:t>.5</a:t>
+            </a:r>
+            <a:r>
+              <a:rPr lang="ru-RU"/>
+              <a:t> наносекунд</a:t>
+            </a:r>
+          </a:p>
+          <a:p>
+            <a:r>
+              <a:rPr lang="ru-RU"/>
+              <a:t>В современных</a:t>
+            </a:r>
+            <a:r>
+              <a:rPr lang="en-US"/>
+              <a:t> </a:t>
+            </a:r>
+            <a:r>
+              <a:rPr lang="ru-RU"/>
+              <a:t>процессорах есть много уровней кэшей и данные, которые не влезают (или вытесняются) из кэша </a:t>
+            </a:r>
+            <a:r>
+              <a:rPr lang="en-US">
+                <a:latin typeface="Consolas" panose="020B0609020204030204" pitchFamily="49" charset="0"/>
+              </a:rPr>
+              <a:t>L1</a:t>
+            </a:r>
+            <a:r>
+              <a:rPr lang="ru-RU"/>
+              <a:t> попадают в </a:t>
+            </a:r>
+            <a:r>
+              <a:rPr lang="en-US">
+                <a:latin typeface="Consolas" panose="020B0609020204030204" pitchFamily="49" charset="0"/>
+              </a:rPr>
+              <a:t>L</a:t>
+            </a:r>
+            <a:r>
+              <a:rPr lang="ru-RU">
+                <a:latin typeface="Consolas" panose="020B0609020204030204" pitchFamily="49" charset="0"/>
+              </a:rPr>
+              <a:t>2</a:t>
+            </a:r>
+            <a:r>
+              <a:rPr lang="ru-RU"/>
+              <a:t>, а потом и в </a:t>
+            </a:r>
+            <a:r>
+              <a:rPr lang="en-US">
+                <a:latin typeface="Consolas" panose="020B0609020204030204" pitchFamily="49" charset="0"/>
+              </a:rPr>
+              <a:t>L</a:t>
+            </a:r>
+            <a:r>
+              <a:rPr lang="ru-RU">
+                <a:latin typeface="Consolas" panose="020B0609020204030204" pitchFamily="49" charset="0"/>
+              </a:rPr>
+              <a:t>3</a:t>
+            </a:r>
+            <a:r>
+              <a:rPr lang="ru-RU"/>
+              <a:t>.</a:t>
+            </a:r>
+          </a:p>
+          <a:p>
+            <a:r>
+              <a:rPr lang="ru-RU"/>
+              <a:t>В итоге чем активнее программа использует данные, тем быстрее у неё к ним доступ</a:t>
+            </a:r>
+          </a:p>
+        </p:txBody>
+      </p:sp>
+    </p:spTree>
+    <p:extLst>
+      <p:ext uri="{BB962C8B-B14F-4D97-AF65-F5344CB8AC3E}">
+        <p14:creationId xmlns:p14="http://schemas.microsoft.com/office/powerpoint/2010/main" val="2770191528"/>
+      </p:ext>
+    </p:extLst>
+  </p:cSld>
+  <p:clrMapOvr>
+    <a:masterClrMapping/>
+  </p:clrMapOvr>
+</p:sld>
+</file>
+
+<file path=ppt/slides/slide16.xml><?xml version="1.0" encoding="utf-8"?>
 <p:sld xmlns:a="http://schemas.openxmlformats.org/drawingml/2006/main" xmlns:r="http://schemas.openxmlformats.org/officeDocument/2006/relationships" xmlns:p="http://schemas.openxmlformats.org/presentationml/2006/main">
   <p:cSld>
     <p:spTree>
@@ -12159,7 +12610,7 @@
 </p:sld>
 </file>
 
-<file path=ppt/slides/slide15.xml><?xml version="1.0" encoding="utf-8"?>
+<file path=ppt/slides/slide17.xml><?xml version="1.0" encoding="utf-8"?>
 <p:sld xmlns:a="http://schemas.openxmlformats.org/drawingml/2006/main" xmlns:r="http://schemas.openxmlformats.org/officeDocument/2006/relationships" xmlns:p="http://schemas.openxmlformats.org/presentationml/2006/main">
   <p:cSld>
     <p:spTree>
@@ -13554,7 +14005,1661 @@
 </p:sld>
 </file>
 
-<file path=ppt/slides/slide16.xml><?xml version="1.0" encoding="utf-8"?>
+<file path=ppt/slides/slide18.xml><?xml version="1.0" encoding="utf-8"?>
+<p:sld xmlns:a="http://schemas.openxmlformats.org/drawingml/2006/main" xmlns:r="http://schemas.openxmlformats.org/officeDocument/2006/relationships" xmlns:p="http://schemas.openxmlformats.org/presentationml/2006/main">
+  <p:cSld>
+    <p:spTree>
+      <p:nvGrpSpPr>
+        <p:cNvPr id="1" name=""/>
+        <p:cNvGrpSpPr/>
+        <p:nvPr/>
+      </p:nvGrpSpPr>
+      <p:grpSpPr>
+        <a:xfrm>
+          <a:off x="0" y="0"/>
+          <a:ext cx="0" cy="0"/>
+          <a:chOff x="0" y="0"/>
+          <a:chExt cx="0" cy="0"/>
+        </a:xfrm>
+      </p:grpSpPr>
+      <p:sp>
+        <p:nvSpPr>
+          <p:cNvPr id="2" name="Title 1">
+            <a:extLst>
+              <a:ext uri="{FF2B5EF4-FFF2-40B4-BE49-F238E27FC236}">
+                <a16:creationId xmlns:a16="http://schemas.microsoft.com/office/drawing/2014/main" id="{0D7B0176-3C03-4E06-83DB-CC0506BA391F}"/>
+              </a:ext>
+            </a:extLst>
+          </p:cNvPr>
+          <p:cNvSpPr>
+            <a:spLocks noGrp="1"/>
+          </p:cNvSpPr>
+          <p:nvPr>
+            <p:ph type="title"/>
+          </p:nvPr>
+        </p:nvSpPr>
+        <p:spPr/>
+        <p:txBody>
+          <a:bodyPr/>
+          <a:lstStyle/>
+          <a:p>
+            <a:r>
+              <a:rPr lang="ru-RU"/>
+              <a:t>Использование профилировщика</a:t>
+            </a:r>
+          </a:p>
+        </p:txBody>
+      </p:sp>
+      <p:sp>
+        <p:nvSpPr>
+          <p:cNvPr id="3" name="Content Placeholder 2">
+            <a:extLst>
+              <a:ext uri="{FF2B5EF4-FFF2-40B4-BE49-F238E27FC236}">
+                <a16:creationId xmlns:a16="http://schemas.microsoft.com/office/drawing/2014/main" id="{345FB54D-AF18-4DE8-B8C5-E38C3EE6B7D5}"/>
+              </a:ext>
+            </a:extLst>
+          </p:cNvPr>
+          <p:cNvSpPr>
+            <a:spLocks noGrp="1"/>
+          </p:cNvSpPr>
+          <p:nvPr>
+            <p:ph idx="1"/>
+          </p:nvPr>
+        </p:nvSpPr>
+        <p:spPr/>
+        <p:txBody>
+          <a:bodyPr/>
+          <a:lstStyle/>
+          <a:p>
+            <a:r>
+              <a:rPr lang="ru-RU"/>
+              <a:t>Как обычно профилировка позволяет показать довольно точное распределение промахов по уровням кэшей для каждой строчки</a:t>
+            </a:r>
+          </a:p>
+          <a:p>
+            <a:endParaRPr lang="ru-RU"/>
+          </a:p>
+          <a:p>
+            <a:endParaRPr lang="ru-RU"/>
+          </a:p>
+          <a:p>
+            <a:endParaRPr lang="ru-RU"/>
+          </a:p>
+          <a:p>
+            <a:pPr marL="45720" indent="0">
+              <a:buNone/>
+            </a:pPr>
+            <a:endParaRPr lang="ru-RU"/>
+          </a:p>
+          <a:p>
+            <a:r>
+              <a:rPr lang="ru-RU"/>
+              <a:t>После этого можно смотреть код и делать выводы</a:t>
+            </a:r>
+          </a:p>
+          <a:p>
+            <a:r>
+              <a:rPr lang="ru-RU"/>
+              <a:t>Обратите внимание: на скриншоте из-за погрешности отладочной информации мы видим смещение на одну строчку</a:t>
+            </a:r>
+          </a:p>
+        </p:txBody>
+      </p:sp>
+      <p:pic>
+        <p:nvPicPr>
+          <p:cNvPr id="5" name="Picture 4">
+            <a:extLst>
+              <a:ext uri="{FF2B5EF4-FFF2-40B4-BE49-F238E27FC236}">
+                <a16:creationId xmlns:a16="http://schemas.microsoft.com/office/drawing/2014/main" id="{9F5AB624-AD4D-475E-88CF-D6CE1653747D}"/>
+              </a:ext>
+            </a:extLst>
+          </p:cNvPr>
+          <p:cNvPicPr>
+            <a:picLocks noChangeAspect="1"/>
+          </p:cNvPicPr>
+          <p:nvPr/>
+        </p:nvPicPr>
+        <p:blipFill>
+          <a:blip r:embed="rId2"/>
+          <a:stretch>
+            <a:fillRect/>
+          </a:stretch>
+        </p:blipFill>
+        <p:spPr>
+          <a:xfrm>
+            <a:off x="942256" y="2931716"/>
+            <a:ext cx="10307488" cy="1514686"/>
+          </a:xfrm>
+          <a:prstGeom prst="rect">
+            <a:avLst/>
+          </a:prstGeom>
+        </p:spPr>
+      </p:pic>
+    </p:spTree>
+    <p:extLst>
+      <p:ext uri="{BB962C8B-B14F-4D97-AF65-F5344CB8AC3E}">
+        <p14:creationId xmlns:p14="http://schemas.microsoft.com/office/powerpoint/2010/main" val="1871162873"/>
+      </p:ext>
+    </p:extLst>
+  </p:cSld>
+  <p:clrMapOvr>
+    <a:masterClrMapping/>
+  </p:clrMapOvr>
+</p:sld>
+</file>
+
+<file path=ppt/slides/slide19.xml><?xml version="1.0" encoding="utf-8"?>
+<p:sld xmlns:a="http://schemas.openxmlformats.org/drawingml/2006/main" xmlns:r="http://schemas.openxmlformats.org/officeDocument/2006/relationships" xmlns:p="http://schemas.openxmlformats.org/presentationml/2006/main">
+  <p:cSld>
+    <p:spTree>
+      <p:nvGrpSpPr>
+        <p:cNvPr id="1" name=""/>
+        <p:cNvGrpSpPr/>
+        <p:nvPr/>
+      </p:nvGrpSpPr>
+      <p:grpSpPr>
+        <a:xfrm>
+          <a:off x="0" y="0"/>
+          <a:ext cx="0" cy="0"/>
+          <a:chOff x="0" y="0"/>
+          <a:chExt cx="0" cy="0"/>
+        </a:xfrm>
+      </p:grpSpPr>
+      <p:sp>
+        <p:nvSpPr>
+          <p:cNvPr id="2" name="Title 1">
+            <a:extLst>
+              <a:ext uri="{FF2B5EF4-FFF2-40B4-BE49-F238E27FC236}">
+                <a16:creationId xmlns:a16="http://schemas.microsoft.com/office/drawing/2014/main" id="{2A4E0F9B-E531-4CF1-BD3B-4F81E533809D}"/>
+              </a:ext>
+            </a:extLst>
+          </p:cNvPr>
+          <p:cNvSpPr>
+            <a:spLocks noGrp="1"/>
+          </p:cNvSpPr>
+          <p:nvPr>
+            <p:ph type="title"/>
+          </p:nvPr>
+        </p:nvSpPr>
+        <p:spPr/>
+        <p:txBody>
+          <a:bodyPr/>
+          <a:lstStyle/>
+          <a:p>
+            <a:r>
+              <a:rPr lang="ru-RU"/>
+              <a:t>Более сложный пример</a:t>
+            </a:r>
+          </a:p>
+        </p:txBody>
+      </p:sp>
+      <p:sp>
+        <p:nvSpPr>
+          <p:cNvPr id="3" name="Content Placeholder 2">
+            <a:extLst>
+              <a:ext uri="{FF2B5EF4-FFF2-40B4-BE49-F238E27FC236}">
+                <a16:creationId xmlns:a16="http://schemas.microsoft.com/office/drawing/2014/main" id="{D7885909-9E60-46C5-AF65-8125E6E19F7A}"/>
+              </a:ext>
+            </a:extLst>
+          </p:cNvPr>
+          <p:cNvSpPr>
+            <a:spLocks noGrp="1"/>
+          </p:cNvSpPr>
+          <p:nvPr>
+            <p:ph idx="1"/>
+          </p:nvPr>
+        </p:nvSpPr>
+        <p:spPr>
+          <a:xfrm>
+            <a:off x="1143000" y="2057399"/>
+            <a:ext cx="9872871" cy="4360179"/>
+          </a:xfrm>
+        </p:spPr>
+        <p:txBody>
+          <a:bodyPr>
+            <a:normAutofit/>
+          </a:bodyPr>
+          <a:lstStyle/>
+          <a:p>
+            <a:r>
+              <a:rPr lang="ru-RU"/>
+              <a:t>Представьте, что у вас есть код, выполняющий перемножение матриц</a:t>
+            </a:r>
+          </a:p>
+          <a:p>
+            <a:pPr marL="45720" indent="0">
+              <a:buNone/>
+            </a:pPr>
+            <a:r>
+              <a:rPr lang="en-US">
+                <a:latin typeface="Consolas" panose="020B0609020204030204" pitchFamily="49" charset="0"/>
+              </a:rPr>
+              <a:t>void matrix_mult(const int *A, const int *B, int *C, </a:t>
+            </a:r>
+            <a:br>
+              <a:rPr lang="ru-RU">
+                <a:latin typeface="Consolas" panose="020B0609020204030204" pitchFamily="49" charset="0"/>
+              </a:rPr>
+            </a:br>
+            <a:r>
+              <a:rPr lang="ru-RU">
+                <a:latin typeface="Consolas" panose="020B0609020204030204" pitchFamily="49" charset="0"/>
+              </a:rPr>
+              <a:t>                 </a:t>
+            </a:r>
+            <a:r>
+              <a:rPr lang="en-US">
+                <a:latin typeface="Consolas" panose="020B0609020204030204" pitchFamily="49" charset="0"/>
+              </a:rPr>
+              <a:t>int AX, int AY, int BY) {</a:t>
+            </a:r>
+            <a:br>
+              <a:rPr lang="ru-RU">
+                <a:latin typeface="Consolas" panose="020B0609020204030204" pitchFamily="49" charset="0"/>
+              </a:rPr>
+            </a:br>
+            <a:r>
+              <a:rPr lang="en-US">
+                <a:latin typeface="Consolas" panose="020B0609020204030204" pitchFamily="49" charset="0"/>
+              </a:rPr>
+              <a:t>  for(int i = 0; i &lt; AX; i++)</a:t>
+            </a:r>
+            <a:br>
+              <a:rPr lang="ru-RU">
+                <a:latin typeface="Consolas" panose="020B0609020204030204" pitchFamily="49" charset="0"/>
+              </a:rPr>
+            </a:br>
+            <a:r>
+              <a:rPr lang="en-US">
+                <a:latin typeface="Consolas" panose="020B0609020204030204" pitchFamily="49" charset="0"/>
+              </a:rPr>
+              <a:t>    for(int j = 0; j &lt; BY; j++) {</a:t>
+            </a:r>
+            <a:br>
+              <a:rPr lang="ru-RU">
+                <a:latin typeface="Consolas" panose="020B0609020204030204" pitchFamily="49" charset="0"/>
+              </a:rPr>
+            </a:br>
+            <a:r>
+              <a:rPr lang="en-US">
+                <a:latin typeface="Consolas" panose="020B0609020204030204" pitchFamily="49" charset="0"/>
+              </a:rPr>
+              <a:t>      C[i * BY + j] = 0;</a:t>
+            </a:r>
+            <a:br>
+              <a:rPr lang="ru-RU">
+                <a:latin typeface="Consolas" panose="020B0609020204030204" pitchFamily="49" charset="0"/>
+              </a:rPr>
+            </a:br>
+            <a:r>
+              <a:rPr lang="ru-RU">
+                <a:latin typeface="Consolas" panose="020B0609020204030204" pitchFamily="49" charset="0"/>
+              </a:rPr>
+              <a:t>      </a:t>
+            </a:r>
+            <a:r>
+              <a:rPr lang="en-US">
+                <a:latin typeface="Consolas" panose="020B0609020204030204" pitchFamily="49" charset="0"/>
+              </a:rPr>
+              <a:t>for(int k = 0; k &lt; AY; k++)</a:t>
+            </a:r>
+            <a:br>
+              <a:rPr lang="ru-RU">
+                <a:latin typeface="Consolas" panose="020B0609020204030204" pitchFamily="49" charset="0"/>
+              </a:rPr>
+            </a:br>
+            <a:r>
+              <a:rPr lang="en-US">
+                <a:latin typeface="Consolas" panose="020B0609020204030204" pitchFamily="49" charset="0"/>
+              </a:rPr>
+              <a:t>        C[i * BY + j] += A[i * AY + k] * B[k * BY + j];</a:t>
+            </a:r>
+            <a:br>
+              <a:rPr lang="ru-RU">
+                <a:latin typeface="Consolas" panose="020B0609020204030204" pitchFamily="49" charset="0"/>
+              </a:rPr>
+            </a:br>
+            <a:r>
+              <a:rPr lang="en-US">
+                <a:latin typeface="Consolas" panose="020B0609020204030204" pitchFamily="49" charset="0"/>
+              </a:rPr>
+              <a:t>    }</a:t>
+            </a:r>
+            <a:br>
+              <a:rPr lang="ru-RU">
+                <a:latin typeface="Consolas" panose="020B0609020204030204" pitchFamily="49" charset="0"/>
+              </a:rPr>
+            </a:br>
+            <a:r>
+              <a:rPr lang="en-US">
+                <a:latin typeface="Consolas" panose="020B0609020204030204" pitchFamily="49" charset="0"/>
+              </a:rPr>
+              <a:t>}</a:t>
+            </a:r>
+            <a:endParaRPr lang="ru-RU">
+              <a:latin typeface="Consolas" panose="020B0609020204030204" pitchFamily="49" charset="0"/>
+            </a:endParaRPr>
+          </a:p>
+          <a:p>
+            <a:r>
+              <a:rPr lang="ru-RU"/>
+              <a:t>Будет ли здесь влиять перестановка строчек внешних циклов? Если да то как, если нет, то почему?</a:t>
+            </a:r>
+          </a:p>
+        </p:txBody>
+      </p:sp>
+    </p:spTree>
+    <p:extLst>
+      <p:ext uri="{BB962C8B-B14F-4D97-AF65-F5344CB8AC3E}">
+        <p14:creationId xmlns:p14="http://schemas.microsoft.com/office/powerpoint/2010/main" val="3728708092"/>
+      </p:ext>
+    </p:extLst>
+  </p:cSld>
+  <p:clrMapOvr>
+    <a:masterClrMapping/>
+  </p:clrMapOvr>
+</p:sld>
+</file>
+
+<file path=ppt/slides/slide2.xml><?xml version="1.0" encoding="utf-8"?>
+<p:sld xmlns:a="http://schemas.openxmlformats.org/drawingml/2006/main" xmlns:r="http://schemas.openxmlformats.org/officeDocument/2006/relationships" xmlns:p="http://schemas.openxmlformats.org/presentationml/2006/main">
+  <p:cSld>
+    <p:spTree>
+      <p:nvGrpSpPr>
+        <p:cNvPr id="1" name=""/>
+        <p:cNvGrpSpPr/>
+        <p:nvPr/>
+      </p:nvGrpSpPr>
+      <p:grpSpPr>
+        <a:xfrm>
+          <a:off x="0" y="0"/>
+          <a:ext cx="0" cy="0"/>
+          <a:chOff x="0" y="0"/>
+          <a:chExt cx="0" cy="0"/>
+        </a:xfrm>
+      </p:grpSpPr>
+      <p:sp>
+        <p:nvSpPr>
+          <p:cNvPr id="2" name="Title 1">
+            <a:extLst>
+              <a:ext uri="{FF2B5EF4-FFF2-40B4-BE49-F238E27FC236}">
+                <a16:creationId xmlns:a16="http://schemas.microsoft.com/office/drawing/2014/main" id="{FAB44B53-E875-43D6-AC4C-772A677B97FC}"/>
+              </a:ext>
+            </a:extLst>
+          </p:cNvPr>
+          <p:cNvSpPr>
+            <a:spLocks noGrp="1"/>
+          </p:cNvSpPr>
+          <p:nvPr>
+            <p:ph type="title"/>
+          </p:nvPr>
+        </p:nvSpPr>
+        <p:spPr/>
+        <p:txBody>
+          <a:bodyPr/>
+          <a:lstStyle/>
+          <a:p>
+            <a:r>
+              <a:rPr lang="ru-RU"/>
+              <a:t>Загадочная проблема</a:t>
+            </a:r>
+          </a:p>
+        </p:txBody>
+      </p:sp>
+      <p:sp>
+        <p:nvSpPr>
+          <p:cNvPr id="3" name="Content Placeholder 2">
+            <a:extLst>
+              <a:ext uri="{FF2B5EF4-FFF2-40B4-BE49-F238E27FC236}">
+                <a16:creationId xmlns:a16="http://schemas.microsoft.com/office/drawing/2014/main" id="{A7FD2C83-04A6-43DC-98B2-C73A76BB6A91}"/>
+              </a:ext>
+            </a:extLst>
+          </p:cNvPr>
+          <p:cNvSpPr>
+            <a:spLocks noGrp="1"/>
+          </p:cNvSpPr>
+          <p:nvPr>
+            <p:ph idx="1"/>
+          </p:nvPr>
+        </p:nvSpPr>
+        <p:spPr>
+          <a:xfrm>
+            <a:off x="1143000" y="2057400"/>
+            <a:ext cx="9872871" cy="4494320"/>
+          </a:xfrm>
+        </p:spPr>
+        <p:txBody>
+          <a:bodyPr/>
+          <a:lstStyle/>
+          <a:p>
+            <a:r>
+              <a:rPr lang="ru-RU"/>
+              <a:t>Следующий код суммирует все элементы массива, меньшие, чем </a:t>
+            </a:r>
+            <a:r>
+              <a:rPr lang="en-US">
+                <a:latin typeface="Consolas" panose="020B0609020204030204" pitchFamily="49" charset="0"/>
+              </a:rPr>
+              <a:t>128</a:t>
+            </a:r>
+            <a:endParaRPr lang="ru-RU"/>
+          </a:p>
+          <a:p>
+            <a:pPr marL="45720" indent="0">
+              <a:buNone/>
+            </a:pPr>
+            <a:r>
+              <a:rPr lang="en-US">
+                <a:latin typeface="Consolas" panose="020B0609020204030204" pitchFamily="49" charset="0"/>
+              </a:rPr>
+              <a:t>for (j = 0; j &lt; len; ++j)</a:t>
+            </a:r>
+            <a:br>
+              <a:rPr lang="en-US">
+                <a:latin typeface="Consolas" panose="020B0609020204030204" pitchFamily="49" charset="0"/>
+              </a:rPr>
+            </a:br>
+            <a:r>
+              <a:rPr lang="en-US">
+                <a:latin typeface="Consolas" panose="020B0609020204030204" pitchFamily="49" charset="0"/>
+              </a:rPr>
+              <a:t>  if (arr[j] &gt; 128)</a:t>
+            </a:r>
+            <a:br>
+              <a:rPr lang="en-US">
+                <a:latin typeface="Consolas" panose="020B0609020204030204" pitchFamily="49" charset="0"/>
+              </a:rPr>
+            </a:br>
+            <a:r>
+              <a:rPr lang="en-US">
+                <a:latin typeface="Consolas" panose="020B0609020204030204" pitchFamily="49" charset="0"/>
+              </a:rPr>
+              <a:t>    sum += arr[j]; </a:t>
+            </a:r>
+            <a:endParaRPr lang="ru-RU">
+              <a:latin typeface="Consolas" panose="020B0609020204030204" pitchFamily="49" charset="0"/>
+            </a:endParaRPr>
+          </a:p>
+          <a:p>
+            <a:r>
+              <a:rPr lang="ru-RU"/>
+              <a:t>Проблема в том, что</a:t>
+            </a:r>
+            <a:r>
+              <a:rPr lang="en-US"/>
+              <a:t> </a:t>
+            </a:r>
+            <a:r>
+              <a:rPr lang="ru-RU"/>
+              <a:t>для несортированных массивов он (без изменений в самом коде) работает почти в четыре раза медленнее, чем для сортированных</a:t>
+            </a:r>
+          </a:p>
+          <a:p>
+            <a:r>
+              <a:rPr lang="ru-RU"/>
+              <a:t>См. пример </a:t>
+            </a:r>
+            <a:r>
+              <a:rPr lang="en-US" b="1">
+                <a:latin typeface="Consolas" panose="020B0609020204030204" pitchFamily="49" charset="0"/>
+              </a:rPr>
+              <a:t>bmystery.c</a:t>
+            </a:r>
+            <a:r>
+              <a:rPr lang="en-US"/>
+              <a:t> </a:t>
+            </a:r>
+            <a:r>
+              <a:rPr lang="ru-RU"/>
+              <a:t>в файлах к семинару</a:t>
+            </a:r>
+          </a:p>
+          <a:p>
+            <a:r>
+              <a:rPr lang="ru-RU"/>
+              <a:t>Предположим, необходимо эффективно обрабатывать именно несортированные массивы</a:t>
+            </a:r>
+          </a:p>
+          <a:p>
+            <a:r>
+              <a:rPr lang="ru-RU"/>
+              <a:t>Значит надо понять </a:t>
+            </a:r>
+            <a:r>
+              <a:rPr lang="ru-RU">
+                <a:solidFill>
+                  <a:srgbClr val="0000FF"/>
+                </a:solidFill>
+              </a:rPr>
+              <a:t>почему</a:t>
+            </a:r>
+            <a:r>
+              <a:rPr lang="ru-RU"/>
+              <a:t> происходит замедление и </a:t>
+            </a:r>
+            <a:r>
+              <a:rPr lang="ru-RU">
+                <a:solidFill>
+                  <a:srgbClr val="0000FF"/>
+                </a:solidFill>
+              </a:rPr>
+              <a:t>как</a:t>
+            </a:r>
+            <a:r>
+              <a:rPr lang="ru-RU"/>
+              <a:t> это исправить</a:t>
+            </a:r>
+          </a:p>
+          <a:p>
+            <a:endParaRPr lang="ru-RU"/>
+          </a:p>
+        </p:txBody>
+      </p:sp>
+    </p:spTree>
+    <p:extLst>
+      <p:ext uri="{BB962C8B-B14F-4D97-AF65-F5344CB8AC3E}">
+        <p14:creationId xmlns:p14="http://schemas.microsoft.com/office/powerpoint/2010/main" val="3437026259"/>
+      </p:ext>
+    </p:extLst>
+  </p:cSld>
+  <p:clrMapOvr>
+    <a:masterClrMapping/>
+  </p:clrMapOvr>
+</p:sld>
+</file>
+
+<file path=ppt/slides/slide20.xml><?xml version="1.0" encoding="utf-8"?>
+<p:sld xmlns:a="http://schemas.openxmlformats.org/drawingml/2006/main" xmlns:r="http://schemas.openxmlformats.org/officeDocument/2006/relationships" xmlns:p="http://schemas.openxmlformats.org/presentationml/2006/main">
+  <p:cSld>
+    <p:spTree>
+      <p:nvGrpSpPr>
+        <p:cNvPr id="1" name=""/>
+        <p:cNvGrpSpPr/>
+        <p:nvPr/>
+      </p:nvGrpSpPr>
+      <p:grpSpPr>
+        <a:xfrm>
+          <a:off x="0" y="0"/>
+          <a:ext cx="0" cy="0"/>
+          <a:chOff x="0" y="0"/>
+          <a:chExt cx="0" cy="0"/>
+        </a:xfrm>
+      </p:grpSpPr>
+      <p:sp>
+        <p:nvSpPr>
+          <p:cNvPr id="2" name="Title 1">
+            <a:extLst>
+              <a:ext uri="{FF2B5EF4-FFF2-40B4-BE49-F238E27FC236}">
+                <a16:creationId xmlns:a16="http://schemas.microsoft.com/office/drawing/2014/main" id="{21BA6A04-3DF7-422C-9171-DFD7F974A575}"/>
+              </a:ext>
+            </a:extLst>
+          </p:cNvPr>
+          <p:cNvSpPr>
+            <a:spLocks noGrp="1"/>
+          </p:cNvSpPr>
+          <p:nvPr>
+            <p:ph type="title"/>
+          </p:nvPr>
+        </p:nvSpPr>
+        <p:spPr/>
+        <p:txBody>
+          <a:bodyPr/>
+          <a:lstStyle/>
+          <a:p>
+            <a:r>
+              <a:rPr lang="ru-RU"/>
+              <a:t>Математика идёт на помощь</a:t>
+            </a:r>
+          </a:p>
+        </p:txBody>
+      </p:sp>
+      <mc:AlternateContent xmlns:mc="http://schemas.openxmlformats.org/markup-compatibility/2006">
+        <mc:Choice xmlns:a14="http://schemas.microsoft.com/office/drawing/2010/main" Requires="a14">
+          <p:sp>
+            <p:nvSpPr>
+              <p:cNvPr id="3" name="Content Placeholder 2">
+                <a:extLst>
+                  <a:ext uri="{FF2B5EF4-FFF2-40B4-BE49-F238E27FC236}">
+                    <a16:creationId xmlns:a16="http://schemas.microsoft.com/office/drawing/2014/main" id="{62BC590F-9254-4FE9-9954-71A021407176}"/>
+                  </a:ext>
+                </a:extLst>
+              </p:cNvPr>
+              <p:cNvSpPr>
+                <a:spLocks noGrp="1"/>
+              </p:cNvSpPr>
+              <p:nvPr>
+                <p:ph sz="half" idx="1"/>
+              </p:nvPr>
+            </p:nvSpPr>
+            <p:spPr>
+              <a:xfrm>
+                <a:off x="606804" y="2057398"/>
+                <a:ext cx="4527258" cy="4460847"/>
+              </a:xfrm>
+            </p:spPr>
+            <p:txBody>
+              <a:bodyPr>
+                <a:normAutofit/>
+              </a:bodyPr>
+              <a:lstStyle/>
+              <a:p>
+                <a:r>
+                  <a:rPr lang="ru-RU"/>
+                  <a:t>Запишем </a:t>
+                </a:r>
+                <a14:m>
+                  <m:oMath xmlns:m="http://schemas.openxmlformats.org/officeDocument/2006/math">
+                    <m:sSub>
+                      <m:sSubPr>
+                        <m:ctrlPr>
+                          <a:rPr lang="ru-RU" b="0" i="1" smtClean="0">
+                            <a:latin typeface="Cambria Math" panose="02040503050406030204" pitchFamily="18" charset="0"/>
+                          </a:rPr>
+                        </m:ctrlPr>
+                      </m:sSubPr>
+                      <m:e>
+                        <m:d>
+                          <m:dPr>
+                            <m:ctrlPr>
+                              <a:rPr lang="ru-RU" b="0" i="1" smtClean="0">
+                                <a:latin typeface="Cambria Math" panose="02040503050406030204" pitchFamily="18" charset="0"/>
+                              </a:rPr>
+                            </m:ctrlPr>
+                          </m:dPr>
+                          <m:e>
+                            <m:r>
+                              <a:rPr lang="en-US" b="0" i="1" smtClean="0">
+                                <a:latin typeface="Cambria Math" panose="02040503050406030204" pitchFamily="18" charset="0"/>
+                              </a:rPr>
+                              <m:t>𝐴𝐵</m:t>
+                            </m:r>
+                          </m:e>
+                        </m:d>
+                      </m:e>
+                      <m:sub>
+                        <m:r>
+                          <a:rPr lang="en-US" b="0" i="1" smtClean="0">
+                            <a:latin typeface="Cambria Math" panose="02040503050406030204" pitchFamily="18" charset="0"/>
+                          </a:rPr>
+                          <m:t>𝑖𝑗</m:t>
+                        </m:r>
+                      </m:sub>
+                    </m:sSub>
+                    <m:r>
+                      <a:rPr lang="en-US" b="0" i="1" smtClean="0">
+                        <a:latin typeface="Cambria Math" panose="02040503050406030204" pitchFamily="18" charset="0"/>
+                      </a:rPr>
+                      <m:t>=</m:t>
+                    </m:r>
+                  </m:oMath>
+                </a14:m>
+                <a:endParaRPr lang="en-US"/>
+              </a:p>
+              <a:p>
+                <a:endParaRPr lang="ru-RU"/>
+              </a:p>
+              <a:p>
+                <a:r>
+                  <a:rPr lang="ru-RU"/>
+                  <a:t>Теперь можно заметить, что нелокальность вычислений проистекает из того факта, что обращения к второй матрице происходят в транспонированном виде</a:t>
+                </a:r>
+                <a:endParaRPr lang="en-US"/>
+              </a:p>
+              <a:p>
+                <a:r>
+                  <a:rPr lang="ru-RU"/>
+                  <a:t>Ради улучшения локальности мы можем завести дополнительную матрицу и транспонировать её</a:t>
+                </a:r>
+                <a:endParaRPr lang="en-US"/>
+              </a:p>
+            </p:txBody>
+          </p:sp>
+        </mc:Choice>
+        <mc:Fallback>
+          <p:sp>
+            <p:nvSpPr>
+              <p:cNvPr id="3" name="Content Placeholder 2">
+                <a:extLst>
+                  <a:ext uri="{FF2B5EF4-FFF2-40B4-BE49-F238E27FC236}">
+                    <a16:creationId xmlns:a16="http://schemas.microsoft.com/office/drawing/2014/main" id="{62BC590F-9254-4FE9-9954-71A021407176}"/>
+                  </a:ext>
+                </a:extLst>
+              </p:cNvPr>
+              <p:cNvSpPr>
+                <a:spLocks noGrp="1" noRot="1" noChangeAspect="1" noMove="1" noResize="1" noEditPoints="1" noAdjustHandles="1" noChangeArrowheads="1" noChangeShapeType="1" noTextEdit="1"/>
+              </p:cNvSpPr>
+              <p:nvPr>
+                <p:ph sz="half" idx="1"/>
+              </p:nvPr>
+            </p:nvSpPr>
+            <p:spPr>
+              <a:xfrm>
+                <a:off x="606804" y="2057398"/>
+                <a:ext cx="4527258" cy="4460847"/>
+              </a:xfrm>
+              <a:blipFill>
+                <a:blip r:embed="rId2"/>
+                <a:stretch>
+                  <a:fillRect t="-1366"/>
+                </a:stretch>
+              </a:blipFill>
+            </p:spPr>
+            <p:txBody>
+              <a:bodyPr/>
+              <a:lstStyle/>
+              <a:p>
+                <a:r>
+                  <a:rPr lang="ru-RU">
+                    <a:noFill/>
+                  </a:rPr>
+                  <a:t> </a:t>
+                </a:r>
+              </a:p>
+            </p:txBody>
+          </p:sp>
+        </mc:Fallback>
+      </mc:AlternateContent>
+      <p:sp>
+        <p:nvSpPr>
+          <p:cNvPr id="5" name="Content Placeholder 4">
+            <a:extLst>
+              <a:ext uri="{FF2B5EF4-FFF2-40B4-BE49-F238E27FC236}">
+                <a16:creationId xmlns:a16="http://schemas.microsoft.com/office/drawing/2014/main" id="{43102C0D-9AF9-42A3-9D3C-BE187F521774}"/>
+              </a:ext>
+            </a:extLst>
+          </p:cNvPr>
+          <p:cNvSpPr>
+            <a:spLocks noGrp="1"/>
+          </p:cNvSpPr>
+          <p:nvPr>
+            <p:ph sz="half" idx="2"/>
+          </p:nvPr>
+        </p:nvSpPr>
+        <p:spPr>
+          <a:xfrm>
+            <a:off x="5243119" y="2057399"/>
+            <a:ext cx="6342077" cy="4335011"/>
+          </a:xfrm>
+        </p:spPr>
+        <p:txBody>
+          <a:bodyPr>
+            <a:normAutofit/>
+          </a:bodyPr>
+          <a:lstStyle/>
+          <a:p>
+            <a:pPr marL="45720" indent="0">
+              <a:buNone/>
+            </a:pPr>
+            <a:r>
+              <a:rPr lang="en-US" sz="2000">
+                <a:solidFill>
+                  <a:srgbClr val="0000FF"/>
+                </a:solidFill>
+                <a:latin typeface="Consolas" panose="020B0609020204030204" pitchFamily="49" charset="0"/>
+              </a:rPr>
+              <a:t>size_t bsz = BIG_BY * BIG_AY * sizeof(int);</a:t>
+            </a:r>
+            <a:br>
+              <a:rPr lang="en-US" sz="2000">
+                <a:solidFill>
+                  <a:srgbClr val="0000FF"/>
+                </a:solidFill>
+                <a:latin typeface="Consolas" panose="020B0609020204030204" pitchFamily="49" charset="0"/>
+              </a:rPr>
+            </a:br>
+            <a:r>
+              <a:rPr lang="en-US" sz="2000">
+                <a:solidFill>
+                  <a:srgbClr val="0000FF"/>
+                </a:solidFill>
+                <a:latin typeface="Consolas" panose="020B0609020204030204" pitchFamily="49" charset="0"/>
+              </a:rPr>
+              <a:t>int *tmp = (int *) malloc(bsz);</a:t>
+            </a:r>
+            <a:br>
+              <a:rPr lang="ru-RU" sz="2000">
+                <a:solidFill>
+                  <a:srgbClr val="0000FF"/>
+                </a:solidFill>
+                <a:latin typeface="Consolas" panose="020B0609020204030204" pitchFamily="49" charset="0"/>
+              </a:rPr>
+            </a:br>
+            <a:r>
+              <a:rPr lang="en-US" sz="2000">
+                <a:solidFill>
+                  <a:srgbClr val="0000FF"/>
+                </a:solidFill>
+                <a:latin typeface="Consolas" panose="020B0609020204030204" pitchFamily="49" charset="0"/>
+              </a:rPr>
+              <a:t>for(int i = 0; i &lt; AY; i++)</a:t>
+            </a:r>
+            <a:br>
+              <a:rPr lang="ru-RU" sz="2000">
+                <a:solidFill>
+                  <a:srgbClr val="0000FF"/>
+                </a:solidFill>
+                <a:latin typeface="Consolas" panose="020B0609020204030204" pitchFamily="49" charset="0"/>
+              </a:rPr>
+            </a:br>
+            <a:r>
+              <a:rPr lang="en-US" sz="2000">
+                <a:solidFill>
+                  <a:srgbClr val="0000FF"/>
+                </a:solidFill>
+                <a:latin typeface="Consolas" panose="020B0609020204030204" pitchFamily="49" charset="0"/>
+              </a:rPr>
+              <a:t>  for(int j = 0; j &lt; BY; j++)</a:t>
+            </a:r>
+            <a:br>
+              <a:rPr lang="ru-RU" sz="2000">
+                <a:solidFill>
+                  <a:srgbClr val="0000FF"/>
+                </a:solidFill>
+                <a:latin typeface="Consolas" panose="020B0609020204030204" pitchFamily="49" charset="0"/>
+              </a:rPr>
+            </a:br>
+            <a:r>
+              <a:rPr lang="en-US" sz="2000">
+                <a:solidFill>
+                  <a:srgbClr val="0000FF"/>
+                </a:solidFill>
+                <a:latin typeface="Consolas" panose="020B0609020204030204" pitchFamily="49" charset="0"/>
+              </a:rPr>
+              <a:t>    tmp[j * AY + i]  = B[i * BY + j];</a:t>
+            </a:r>
+            <a:endParaRPr lang="ru-RU" sz="2000">
+              <a:solidFill>
+                <a:srgbClr val="0000FF"/>
+              </a:solidFill>
+              <a:latin typeface="Consolas" panose="020B0609020204030204" pitchFamily="49" charset="0"/>
+            </a:endParaRPr>
+          </a:p>
+          <a:p>
+            <a:pPr marL="45720" indent="0">
+              <a:buNone/>
+            </a:pPr>
+            <a:r>
+              <a:rPr lang="en-US" sz="2000">
+                <a:latin typeface="Consolas" panose="020B0609020204030204" pitchFamily="49" charset="0"/>
+              </a:rPr>
+              <a:t>for(int i = 0; i &lt; AX; i++)</a:t>
+            </a:r>
+            <a:br>
+              <a:rPr lang="ru-RU" sz="2000">
+                <a:latin typeface="Consolas" panose="020B0609020204030204" pitchFamily="49" charset="0"/>
+              </a:rPr>
+            </a:br>
+            <a:r>
+              <a:rPr lang="en-US" sz="2000">
+                <a:latin typeface="Consolas" panose="020B0609020204030204" pitchFamily="49" charset="0"/>
+              </a:rPr>
+              <a:t>  for(int j = 0; j &lt; BY; j++) {</a:t>
+            </a:r>
+            <a:br>
+              <a:rPr lang="ru-RU" sz="2000">
+                <a:latin typeface="Consolas" panose="020B0609020204030204" pitchFamily="49" charset="0"/>
+              </a:rPr>
+            </a:br>
+            <a:r>
+              <a:rPr lang="en-US" sz="2000">
+                <a:latin typeface="Consolas" panose="020B0609020204030204" pitchFamily="49" charset="0"/>
+              </a:rPr>
+              <a:t>    C[i * BY + j] = 0;</a:t>
+            </a:r>
+            <a:br>
+              <a:rPr lang="ru-RU" sz="2000">
+                <a:latin typeface="Consolas" panose="020B0609020204030204" pitchFamily="49" charset="0"/>
+              </a:rPr>
+            </a:br>
+            <a:r>
+              <a:rPr lang="ru-RU" sz="2000">
+                <a:latin typeface="Consolas" panose="020B0609020204030204" pitchFamily="49" charset="0"/>
+              </a:rPr>
+              <a:t>    </a:t>
+            </a:r>
+            <a:r>
+              <a:rPr lang="en-US" sz="2000">
+                <a:latin typeface="Consolas" panose="020B0609020204030204" pitchFamily="49" charset="0"/>
+              </a:rPr>
+              <a:t>for(int k = 0; k &lt; AY; k++)</a:t>
+            </a:r>
+            <a:br>
+              <a:rPr lang="ru-RU" sz="2000">
+                <a:latin typeface="Consolas" panose="020B0609020204030204" pitchFamily="49" charset="0"/>
+              </a:rPr>
+            </a:br>
+            <a:r>
+              <a:rPr lang="en-US" sz="2000">
+                <a:latin typeface="Consolas" panose="020B0609020204030204" pitchFamily="49" charset="0"/>
+              </a:rPr>
+              <a:t>      C[i * BY + j] += </a:t>
+            </a:r>
+            <a:br>
+              <a:rPr lang="en-US" sz="2000">
+                <a:latin typeface="Consolas" panose="020B0609020204030204" pitchFamily="49" charset="0"/>
+              </a:rPr>
+            </a:br>
+            <a:r>
+              <a:rPr lang="en-US" sz="2000">
+                <a:latin typeface="Consolas" panose="020B0609020204030204" pitchFamily="49" charset="0"/>
+              </a:rPr>
+              <a:t>        </a:t>
+            </a:r>
+            <a:r>
+              <a:rPr lang="en-US" sz="2000">
+                <a:solidFill>
+                  <a:srgbClr val="FF0000"/>
+                </a:solidFill>
+                <a:latin typeface="Consolas" panose="020B0609020204030204" pitchFamily="49" charset="0"/>
+              </a:rPr>
+              <a:t>A[i * AY + k] * tmp[j * AY + k];</a:t>
+            </a:r>
+            <a:br>
+              <a:rPr lang="ru-RU" sz="2000">
+                <a:latin typeface="Consolas" panose="020B0609020204030204" pitchFamily="49" charset="0"/>
+              </a:rPr>
+            </a:br>
+            <a:r>
+              <a:rPr lang="en-US" sz="2000">
+                <a:latin typeface="Consolas" panose="020B0609020204030204" pitchFamily="49" charset="0"/>
+              </a:rPr>
+              <a:t>  }</a:t>
+            </a:r>
+            <a:br>
+              <a:rPr lang="ru-RU" sz="2000">
+                <a:latin typeface="Consolas" panose="020B0609020204030204" pitchFamily="49" charset="0"/>
+              </a:rPr>
+            </a:br>
+            <a:r>
+              <a:rPr lang="en-US" sz="2000">
+                <a:solidFill>
+                  <a:srgbClr val="0000FF"/>
+                </a:solidFill>
+                <a:latin typeface="Consolas" panose="020B0609020204030204" pitchFamily="49" charset="0"/>
+              </a:rPr>
+              <a:t>free(tmp);</a:t>
+            </a:r>
+            <a:br>
+              <a:rPr lang="ru-RU" sz="2000">
+                <a:solidFill>
+                  <a:srgbClr val="0000FF"/>
+                </a:solidFill>
+                <a:latin typeface="Consolas" panose="020B0609020204030204" pitchFamily="49" charset="0"/>
+              </a:rPr>
+            </a:br>
+            <a:endParaRPr lang="ru-RU" sz="2000">
+              <a:latin typeface="Consolas" panose="020B0609020204030204" pitchFamily="49" charset="0"/>
+            </a:endParaRPr>
+          </a:p>
+        </p:txBody>
+      </p:sp>
+      <mc:AlternateContent xmlns:mc="http://schemas.openxmlformats.org/markup-compatibility/2006">
+        <mc:Choice xmlns:a14="http://schemas.microsoft.com/office/drawing/2010/main" Requires="a14">
+          <p:graphicFrame>
+            <p:nvGraphicFramePr>
+              <p:cNvPr id="4" name="Table 3">
+                <a:extLst>
+                  <a:ext uri="{FF2B5EF4-FFF2-40B4-BE49-F238E27FC236}">
+                    <a16:creationId xmlns:a16="http://schemas.microsoft.com/office/drawing/2014/main" id="{E38EAADD-6398-48BF-8A4E-643E373247F9}"/>
+                  </a:ext>
+                </a:extLst>
+              </p:cNvPr>
+              <p:cNvGraphicFramePr>
+                <a:graphicFrameLocks noGrp="1"/>
+              </p:cNvGraphicFramePr>
+              <p:nvPr>
+                <p:extLst>
+                  <p:ext uri="{D42A27DB-BD31-4B8C-83A1-F6EECF244321}">
+                    <p14:modId xmlns:p14="http://schemas.microsoft.com/office/powerpoint/2010/main" val="2099803809"/>
+                  </p:ext>
+                </p:extLst>
+              </p:nvPr>
+            </p:nvGraphicFramePr>
+            <p:xfrm>
+              <a:off x="3105791" y="1793458"/>
+              <a:ext cx="1340374" cy="1137349"/>
+            </p:xfrm>
+            <a:graphic>
+              <a:graphicData uri="http://schemas.openxmlformats.org/drawingml/2006/table">
+                <a:tbl>
+                  <a:tblPr firstRow="1" bandRow="1">
+                    <a:tableStyleId>{2D5ABB26-0587-4C30-8999-92F81FD0307C}</a:tableStyleId>
+                  </a:tblPr>
+                  <a:tblGrid>
+                    <a:gridCol w="1340374">
+                      <a:extLst>
+                        <a:ext uri="{9D8B030D-6E8A-4147-A177-3AD203B41FA5}">
+                          <a16:colId xmlns:a16="http://schemas.microsoft.com/office/drawing/2014/main" val="335913985"/>
+                        </a:ext>
+                      </a:extLst>
+                    </a:gridCol>
+                  </a:tblGrid>
+                  <a:tr h="874242">
+                    <a:tc>
+                      <a:txBody>
+                        <a:bodyPr/>
+                        <a:lstStyle/>
+                        <a:p>
+                          <a:pPr marL="0" marR="0" lvl="0" indent="0" algn="l" defTabSz="914400" rtl="0" eaLnBrk="1" fontAlgn="auto" latinLnBrk="0" hangingPunct="1">
+                            <a:lnSpc>
+                              <a:spcPct val="100000"/>
+                            </a:lnSpc>
+                            <a:spcBef>
+                              <a:spcPts val="0"/>
+                            </a:spcBef>
+                            <a:spcAft>
+                              <a:spcPts val="0"/>
+                            </a:spcAft>
+                            <a:buClrTx/>
+                            <a:buSzTx/>
+                            <a:buFontTx/>
+                            <a:buNone/>
+                            <a:tabLst/>
+                            <a:defRPr/>
+                          </a:pPr>
+                          <a14:m>
+                            <m:oMathPara xmlns:m="http://schemas.openxmlformats.org/officeDocument/2006/math">
+                              <m:oMathParaPr>
+                                <m:jc m:val="centerGroup"/>
+                              </m:oMathParaPr>
+                              <m:oMath xmlns:m="http://schemas.openxmlformats.org/officeDocument/2006/math">
+                                <m:nary>
+                                  <m:naryPr>
+                                    <m:chr m:val="∑"/>
+                                    <m:ctrlPr>
+                                      <a:rPr lang="en-US" i="1" smtClean="0">
+                                        <a:latin typeface="Cambria Math" panose="02040503050406030204" pitchFamily="18" charset="0"/>
+                                      </a:rPr>
+                                    </m:ctrlPr>
+                                  </m:naryPr>
+                                  <m:sub>
+                                    <m:r>
+                                      <m:rPr>
+                                        <m:brk m:alnAt="23"/>
+                                      </m:rPr>
+                                      <a:rPr lang="en-US" b="0" i="1" smtClean="0">
+                                        <a:latin typeface="Cambria Math" panose="02040503050406030204" pitchFamily="18" charset="0"/>
+                                      </a:rPr>
+                                      <m:t>𝑘</m:t>
+                                    </m:r>
+                                    <m:r>
+                                      <a:rPr lang="en-US" b="0" i="1" smtClean="0">
+                                        <a:latin typeface="Cambria Math" panose="02040503050406030204" pitchFamily="18" charset="0"/>
+                                      </a:rPr>
+                                      <m:t>=0</m:t>
+                                    </m:r>
+                                  </m:sub>
+                                  <m:sup>
+                                    <m:r>
+                                      <a:rPr lang="en-US" b="0" i="1" smtClean="0">
+                                        <a:latin typeface="Cambria Math" panose="02040503050406030204" pitchFamily="18" charset="0"/>
+                                      </a:rPr>
+                                      <m:t>𝑁</m:t>
+                                    </m:r>
+                                    <m:r>
+                                      <a:rPr lang="en-US" b="0" i="1" smtClean="0">
+                                        <a:latin typeface="Cambria Math" panose="02040503050406030204" pitchFamily="18" charset="0"/>
+                                      </a:rPr>
+                                      <m:t>−1</m:t>
+                                    </m:r>
+                                  </m:sup>
+                                  <m:e>
+                                    <m:sSub>
+                                      <m:sSubPr>
+                                        <m:ctrlPr>
+                                          <a:rPr lang="en-US" i="1">
+                                            <a:latin typeface="Cambria Math" panose="02040503050406030204" pitchFamily="18" charset="0"/>
+                                          </a:rPr>
+                                        </m:ctrlPr>
+                                      </m:sSubPr>
+                                      <m:e>
+                                        <m:r>
+                                          <a:rPr lang="en-US" i="1">
+                                            <a:latin typeface="Cambria Math" panose="02040503050406030204" pitchFamily="18" charset="0"/>
+                                          </a:rPr>
+                                          <m:t>𝑎</m:t>
+                                        </m:r>
+                                      </m:e>
+                                      <m:sub>
+                                        <m:r>
+                                          <a:rPr lang="en-US" i="1">
+                                            <a:latin typeface="Cambria Math" panose="02040503050406030204" pitchFamily="18" charset="0"/>
+                                          </a:rPr>
+                                          <m:t>𝑖𝑘</m:t>
+                                        </m:r>
+                                      </m:sub>
+                                    </m:sSub>
+                                    <m:sSubSup>
+                                      <m:sSubSupPr>
+                                        <m:ctrlPr>
+                                          <a:rPr lang="en-US" i="1">
+                                            <a:latin typeface="Cambria Math" panose="02040503050406030204" pitchFamily="18" charset="0"/>
+                                          </a:rPr>
+                                        </m:ctrlPr>
+                                      </m:sSubSupPr>
+                                      <m:e>
+                                        <m:r>
+                                          <a:rPr lang="en-US" i="1">
+                                            <a:latin typeface="Cambria Math" panose="02040503050406030204" pitchFamily="18" charset="0"/>
+                                          </a:rPr>
+                                          <m:t>𝑏</m:t>
+                                        </m:r>
+                                      </m:e>
+                                      <m:sub>
+                                        <m:r>
+                                          <a:rPr lang="en-US" i="1">
+                                            <a:latin typeface="Cambria Math" panose="02040503050406030204" pitchFamily="18" charset="0"/>
+                                          </a:rPr>
+                                          <m:t>𝑗𝑘</m:t>
+                                        </m:r>
+                                      </m:sub>
+                                      <m:sup>
+                                        <m:r>
+                                          <a:rPr lang="en-US" i="1">
+                                            <a:latin typeface="Cambria Math" panose="02040503050406030204" pitchFamily="18" charset="0"/>
+                                          </a:rPr>
+                                          <m:t>𝑇</m:t>
+                                        </m:r>
+                                      </m:sup>
+                                    </m:sSubSup>
+                                  </m:e>
+                                </m:nary>
+                              </m:oMath>
+                            </m:oMathPara>
+                          </a14:m>
+                          <a:endParaRPr lang="en-US"/>
+                        </a:p>
+                        <a:p>
+                          <a:endParaRPr lang="ru-RU"/>
+                        </a:p>
+                      </a:txBody>
+                      <a:tcPr/>
+                    </a:tc>
+                    <a:extLst>
+                      <a:ext uri="{0D108BD9-81ED-4DB2-BD59-A6C34878D82A}">
+                        <a16:rowId xmlns:a16="http://schemas.microsoft.com/office/drawing/2014/main" val="1964137830"/>
+                      </a:ext>
+                    </a:extLst>
+                  </a:tr>
+                </a:tbl>
+              </a:graphicData>
+            </a:graphic>
+          </p:graphicFrame>
+        </mc:Choice>
+        <mc:Fallback>
+          <p:graphicFrame>
+            <p:nvGraphicFramePr>
+              <p:cNvPr id="4" name="Table 3">
+                <a:extLst>
+                  <a:ext uri="{FF2B5EF4-FFF2-40B4-BE49-F238E27FC236}">
+                    <a16:creationId xmlns:a16="http://schemas.microsoft.com/office/drawing/2014/main" id="{E38EAADD-6398-48BF-8A4E-643E373247F9}"/>
+                  </a:ext>
+                </a:extLst>
+              </p:cNvPr>
+              <p:cNvGraphicFramePr>
+                <a:graphicFrameLocks noGrp="1"/>
+              </p:cNvGraphicFramePr>
+              <p:nvPr>
+                <p:extLst>
+                  <p:ext uri="{D42A27DB-BD31-4B8C-83A1-F6EECF244321}">
+                    <p14:modId xmlns:p14="http://schemas.microsoft.com/office/powerpoint/2010/main" val="2099803809"/>
+                  </p:ext>
+                </p:extLst>
+              </p:nvPr>
+            </p:nvGraphicFramePr>
+            <p:xfrm>
+              <a:off x="3105791" y="1793458"/>
+              <a:ext cx="1340374" cy="1137349"/>
+            </p:xfrm>
+            <a:graphic>
+              <a:graphicData uri="http://schemas.openxmlformats.org/drawingml/2006/table">
+                <a:tbl>
+                  <a:tblPr firstRow="1" bandRow="1">
+                    <a:tableStyleId>{2D5ABB26-0587-4C30-8999-92F81FD0307C}</a:tableStyleId>
+                  </a:tblPr>
+                  <a:tblGrid>
+                    <a:gridCol w="1340374">
+                      <a:extLst>
+                        <a:ext uri="{9D8B030D-6E8A-4147-A177-3AD203B41FA5}">
+                          <a16:colId xmlns:a16="http://schemas.microsoft.com/office/drawing/2014/main" val="335913985"/>
+                        </a:ext>
+                      </a:extLst>
+                    </a:gridCol>
+                  </a:tblGrid>
+                  <a:tr h="1137349">
+                    <a:tc>
+                      <a:txBody>
+                        <a:bodyPr/>
+                        <a:lstStyle/>
+                        <a:p>
+                          <a:endParaRPr lang="ru-RU"/>
+                        </a:p>
+                      </a:txBody>
+                      <a:tcPr>
+                        <a:blipFill>
+                          <a:blip r:embed="rId3"/>
+                          <a:stretch>
+                            <a:fillRect/>
+                          </a:stretch>
+                        </a:blipFill>
+                      </a:tcPr>
+                    </a:tc>
+                    <a:extLst>
+                      <a:ext uri="{0D108BD9-81ED-4DB2-BD59-A6C34878D82A}">
+                        <a16:rowId xmlns:a16="http://schemas.microsoft.com/office/drawing/2014/main" val="1964137830"/>
+                      </a:ext>
+                    </a:extLst>
+                  </a:tr>
+                </a:tbl>
+              </a:graphicData>
+            </a:graphic>
+          </p:graphicFrame>
+        </mc:Fallback>
+      </mc:AlternateContent>
+    </p:spTree>
+    <p:extLst>
+      <p:ext uri="{BB962C8B-B14F-4D97-AF65-F5344CB8AC3E}">
+        <p14:creationId xmlns:p14="http://schemas.microsoft.com/office/powerpoint/2010/main" val="122319073"/>
+      </p:ext>
+    </p:extLst>
+  </p:cSld>
+  <p:clrMapOvr>
+    <a:masterClrMapping/>
+  </p:clrMapOvr>
+</p:sld>
+</file>
+
+<file path=ppt/slides/slide21.xml><?xml version="1.0" encoding="utf-8"?>
+<p:sld xmlns:a="http://schemas.openxmlformats.org/drawingml/2006/main" xmlns:r="http://schemas.openxmlformats.org/officeDocument/2006/relationships" xmlns:p="http://schemas.openxmlformats.org/presentationml/2006/main">
+  <p:cSld>
+    <p:spTree>
+      <p:nvGrpSpPr>
+        <p:cNvPr id="1" name=""/>
+        <p:cNvGrpSpPr/>
+        <p:nvPr/>
+      </p:nvGrpSpPr>
+      <p:grpSpPr>
+        <a:xfrm>
+          <a:off x="0" y="0"/>
+          <a:ext cx="0" cy="0"/>
+          <a:chOff x="0" y="0"/>
+          <a:chExt cx="0" cy="0"/>
+        </a:xfrm>
+      </p:grpSpPr>
+      <p:sp>
+        <p:nvSpPr>
+          <p:cNvPr id="5" name="Title 4">
+            <a:extLst>
+              <a:ext uri="{FF2B5EF4-FFF2-40B4-BE49-F238E27FC236}">
+                <a16:creationId xmlns:a16="http://schemas.microsoft.com/office/drawing/2014/main" id="{2C8E4307-9AE8-48F0-9A50-17E22121319D}"/>
+              </a:ext>
+            </a:extLst>
+          </p:cNvPr>
+          <p:cNvSpPr>
+            <a:spLocks noGrp="1"/>
+          </p:cNvSpPr>
+          <p:nvPr>
+            <p:ph type="title"/>
+          </p:nvPr>
+        </p:nvSpPr>
+        <p:spPr/>
+        <p:txBody>
+          <a:bodyPr/>
+          <a:lstStyle/>
+          <a:p>
+            <a:r>
+              <a:rPr lang="ru-RU"/>
+              <a:t>Клеточное перемножение</a:t>
+            </a:r>
+          </a:p>
+        </p:txBody>
+      </p:sp>
+      <mc:AlternateContent xmlns:mc="http://schemas.openxmlformats.org/markup-compatibility/2006">
+        <mc:Choice xmlns:a14="http://schemas.microsoft.com/office/drawing/2010/main" Requires="a14">
+          <p:sp>
+            <p:nvSpPr>
+              <p:cNvPr id="6" name="Content Placeholder 5">
+                <a:extLst>
+                  <a:ext uri="{FF2B5EF4-FFF2-40B4-BE49-F238E27FC236}">
+                    <a16:creationId xmlns:a16="http://schemas.microsoft.com/office/drawing/2014/main" id="{F8ECB000-B621-46A5-9591-296DEB784478}"/>
+                  </a:ext>
+                </a:extLst>
+              </p:cNvPr>
+              <p:cNvSpPr>
+                <a:spLocks noGrp="1"/>
+              </p:cNvSpPr>
+              <p:nvPr>
+                <p:ph idx="1"/>
+              </p:nvPr>
+            </p:nvSpPr>
+            <p:spPr>
+              <a:xfrm>
+                <a:off x="1143000" y="2057400"/>
+                <a:ext cx="10601587" cy="4038600"/>
+              </a:xfrm>
+            </p:spPr>
+            <p:txBody>
+              <a:bodyPr/>
+              <a:lstStyle/>
+              <a:p>
+                <a:r>
+                  <a:rPr lang="ru-RU"/>
+                  <a:t>Ульрих Дреппер в своей замечательной статье</a:t>
+                </a:r>
+                <a:r>
+                  <a:rPr lang="en-US"/>
+                  <a:t> </a:t>
+                </a:r>
+                <a14:m>
+                  <m:oMath xmlns:m="http://schemas.openxmlformats.org/officeDocument/2006/math">
+                    <m:d>
+                      <m:dPr>
+                        <m:begChr m:val="["/>
+                        <m:endChr m:val="]"/>
+                        <m:ctrlPr>
+                          <a:rPr lang="en-US" i="1">
+                            <a:latin typeface="Cambria Math" panose="02040503050406030204" pitchFamily="18" charset="0"/>
+                          </a:rPr>
+                        </m:ctrlPr>
+                      </m:dPr>
+                      <m:e>
+                        <m:r>
+                          <a:rPr lang="en-US" i="1">
+                            <a:latin typeface="Cambria Math" panose="02040503050406030204" pitchFamily="18" charset="0"/>
+                          </a:rPr>
+                          <m:t>𝐷𝑟𝑒𝑝𝑝𝑒𝑟</m:t>
+                        </m:r>
+                      </m:e>
+                    </m:d>
+                  </m:oMath>
+                </a14:m>
+                <a:r>
+                  <a:rPr lang="ru-RU"/>
+                  <a:t> предлагает ещё более интересный подход</a:t>
+                </a:r>
+              </a:p>
+              <a:p>
+                <a:pPr marL="45720" indent="0">
+                  <a:buNone/>
+                </a:pPr>
+                <a:r>
+                  <a:rPr lang="en-US">
+                    <a:latin typeface="Consolas" panose="020B0609020204030204" pitchFamily="49" charset="0"/>
+                  </a:rPr>
+                  <a:t>int SM = L1_LINE_SIZE / sizeof (int);</a:t>
+                </a:r>
+                <a:br>
+                  <a:rPr lang="ru-RU">
+                    <a:latin typeface="Consolas" panose="020B0609020204030204" pitchFamily="49" charset="0"/>
+                  </a:rPr>
+                </a:br>
+                <a:r>
+                  <a:rPr lang="en-US">
+                    <a:latin typeface="Consolas" panose="020B0609020204030204" pitchFamily="49" charset="0"/>
+                  </a:rPr>
+                  <a:t>for (i = 0; i &lt; AX; i += SM)</a:t>
+                </a:r>
+                <a:br>
+                  <a:rPr lang="en-US">
+                    <a:latin typeface="Consolas" panose="020B0609020204030204" pitchFamily="49" charset="0"/>
+                  </a:rPr>
+                </a:br>
+                <a:r>
+                  <a:rPr lang="en-US">
+                    <a:latin typeface="Consolas" panose="020B0609020204030204" pitchFamily="49" charset="0"/>
+                  </a:rPr>
+                  <a:t>  for (j = 0; j &lt; BY; j += SM)</a:t>
+                </a:r>
+                <a:br>
+                  <a:rPr lang="en-US">
+                    <a:latin typeface="Consolas" panose="020B0609020204030204" pitchFamily="49" charset="0"/>
+                  </a:rPr>
+                </a:br>
+                <a:r>
+                  <a:rPr lang="en-US">
+                    <a:latin typeface="Consolas" panose="020B0609020204030204" pitchFamily="49" charset="0"/>
+                  </a:rPr>
+                  <a:t>    for (k = 0; k &lt; AY; k += SM)</a:t>
+                </a:r>
+                <a:br>
+                  <a:rPr lang="en-US">
+                    <a:latin typeface="Consolas" panose="020B0609020204030204" pitchFamily="49" charset="0"/>
+                  </a:rPr>
+                </a:br>
+                <a:r>
+                  <a:rPr lang="en-US">
+                    <a:latin typeface="Consolas" panose="020B0609020204030204" pitchFamily="49" charset="0"/>
+                  </a:rPr>
+                  <a:t>      for (i2 = 0, rres = &amp;C[i * BY + j], rmul1 = &amp;A[i * AY + k];</a:t>
+                </a:r>
+                <a:br>
+                  <a:rPr lang="en-US">
+                    <a:latin typeface="Consolas" panose="020B0609020204030204" pitchFamily="49" charset="0"/>
+                  </a:rPr>
+                </a:br>
+                <a:r>
+                  <a:rPr lang="en-US">
+                    <a:latin typeface="Consolas" panose="020B0609020204030204" pitchFamily="49" charset="0"/>
+                  </a:rPr>
+                  <a:t>           i2 &lt; SM; ++i2, rres += BY, rmul1 += AY)</a:t>
+                </a:r>
+                <a:br>
+                  <a:rPr lang="en-US">
+                    <a:latin typeface="Consolas" panose="020B0609020204030204" pitchFamily="49" charset="0"/>
+                  </a:rPr>
+                </a:br>
+                <a:r>
+                  <a:rPr lang="en-US">
+                    <a:latin typeface="Consolas" panose="020B0609020204030204" pitchFamily="49" charset="0"/>
+                  </a:rPr>
+                  <a:t>        for (k2 = 0, rmul2 = &amp;B[k * BY + j];</a:t>
+                </a:r>
+                <a:br>
+                  <a:rPr lang="en-US">
+                    <a:latin typeface="Consolas" panose="020B0609020204030204" pitchFamily="49" charset="0"/>
+                  </a:rPr>
+                </a:br>
+                <a:r>
+                  <a:rPr lang="en-US">
+                    <a:latin typeface="Consolas" panose="020B0609020204030204" pitchFamily="49" charset="0"/>
+                  </a:rPr>
+                  <a:t>             k2 &lt; SM; ++k2, rmul2 += BY)</a:t>
+                </a:r>
+                <a:br>
+                  <a:rPr lang="en-US">
+                    <a:latin typeface="Consolas" panose="020B0609020204030204" pitchFamily="49" charset="0"/>
+                  </a:rPr>
+                </a:br>
+                <a:r>
+                  <a:rPr lang="en-US">
+                    <a:latin typeface="Consolas" panose="020B0609020204030204" pitchFamily="49" charset="0"/>
+                  </a:rPr>
+                  <a:t>          for (j2 = 0; j2 &lt; SM; ++j2)</a:t>
+                </a:r>
+                <a:br>
+                  <a:rPr lang="en-US">
+                    <a:latin typeface="Consolas" panose="020B0609020204030204" pitchFamily="49" charset="0"/>
+                  </a:rPr>
+                </a:br>
+                <a:r>
+                  <a:rPr lang="en-US">
+                    <a:latin typeface="Consolas" panose="020B0609020204030204" pitchFamily="49" charset="0"/>
+                  </a:rPr>
+                  <a:t>            rres[j2] += rmul1[k2] * rmul2[j2];</a:t>
+                </a:r>
+                <a:endParaRPr lang="ru-RU">
+                  <a:latin typeface="Consolas" panose="020B0609020204030204" pitchFamily="49" charset="0"/>
+                </a:endParaRPr>
+              </a:p>
+            </p:txBody>
+          </p:sp>
+        </mc:Choice>
+        <mc:Fallback>
+          <p:sp>
+            <p:nvSpPr>
+              <p:cNvPr id="6" name="Content Placeholder 5">
+                <a:extLst>
+                  <a:ext uri="{FF2B5EF4-FFF2-40B4-BE49-F238E27FC236}">
+                    <a16:creationId xmlns:a16="http://schemas.microsoft.com/office/drawing/2014/main" id="{F8ECB000-B621-46A5-9591-296DEB784478}"/>
+                  </a:ext>
+                </a:extLst>
+              </p:cNvPr>
+              <p:cNvSpPr>
+                <a:spLocks noGrp="1" noRot="1" noChangeAspect="1" noMove="1" noResize="1" noEditPoints="1" noAdjustHandles="1" noChangeArrowheads="1" noChangeShapeType="1" noTextEdit="1"/>
+              </p:cNvSpPr>
+              <p:nvPr>
+                <p:ph idx="1"/>
+              </p:nvPr>
+            </p:nvSpPr>
+            <p:spPr>
+              <a:xfrm>
+                <a:off x="1143000" y="2057400"/>
+                <a:ext cx="10601587" cy="4038600"/>
+              </a:xfrm>
+              <a:blipFill>
+                <a:blip r:embed="rId2"/>
+                <a:stretch>
+                  <a:fillRect l="-288" t="-1813"/>
+                </a:stretch>
+              </a:blipFill>
+            </p:spPr>
+            <p:txBody>
+              <a:bodyPr/>
+              <a:lstStyle/>
+              <a:p>
+                <a:r>
+                  <a:rPr lang="ru-RU">
+                    <a:noFill/>
+                  </a:rPr>
+                  <a:t> </a:t>
+                </a:r>
+              </a:p>
+            </p:txBody>
+          </p:sp>
+        </mc:Fallback>
+      </mc:AlternateContent>
+    </p:spTree>
+    <p:extLst>
+      <p:ext uri="{BB962C8B-B14F-4D97-AF65-F5344CB8AC3E}">
+        <p14:creationId xmlns:p14="http://schemas.microsoft.com/office/powerpoint/2010/main" val="3881764281"/>
+      </p:ext>
+    </p:extLst>
+  </p:cSld>
+  <p:clrMapOvr>
+    <a:masterClrMapping/>
+  </p:clrMapOvr>
+</p:sld>
+</file>
+
+<file path=ppt/slides/slide22.xml><?xml version="1.0" encoding="utf-8"?>
+<p:sld xmlns:a="http://schemas.openxmlformats.org/drawingml/2006/main" xmlns:r="http://schemas.openxmlformats.org/officeDocument/2006/relationships" xmlns:p="http://schemas.openxmlformats.org/presentationml/2006/main">
+  <p:cSld>
+    <p:spTree>
+      <p:nvGrpSpPr>
+        <p:cNvPr id="1" name=""/>
+        <p:cNvGrpSpPr/>
+        <p:nvPr/>
+      </p:nvGrpSpPr>
+      <p:grpSpPr>
+        <a:xfrm>
+          <a:off x="0" y="0"/>
+          <a:ext cx="0" cy="0"/>
+          <a:chOff x="0" y="0"/>
+          <a:chExt cx="0" cy="0"/>
+        </a:xfrm>
+      </p:grpSpPr>
+      <p:sp>
+        <p:nvSpPr>
+          <p:cNvPr id="2" name="Title 1">
+            <a:extLst>
+              <a:ext uri="{FF2B5EF4-FFF2-40B4-BE49-F238E27FC236}">
+                <a16:creationId xmlns:a16="http://schemas.microsoft.com/office/drawing/2014/main" id="{7B254A65-1865-4093-A792-DEE8A74C1555}"/>
+              </a:ext>
+            </a:extLst>
+          </p:cNvPr>
+          <p:cNvSpPr>
+            <a:spLocks noGrp="1"/>
+          </p:cNvSpPr>
+          <p:nvPr>
+            <p:ph type="title"/>
+          </p:nvPr>
+        </p:nvSpPr>
+        <p:spPr/>
+        <p:txBody>
+          <a:bodyPr/>
+          <a:lstStyle/>
+          <a:p>
+            <a:r>
+              <a:rPr lang="ru-RU"/>
+              <a:t>Обсуждение</a:t>
+            </a:r>
+          </a:p>
+        </p:txBody>
+      </p:sp>
+      <p:sp>
+        <p:nvSpPr>
+          <p:cNvPr id="3" name="Content Placeholder 2">
+            <a:extLst>
+              <a:ext uri="{FF2B5EF4-FFF2-40B4-BE49-F238E27FC236}">
+                <a16:creationId xmlns:a16="http://schemas.microsoft.com/office/drawing/2014/main" id="{59B6CDBF-CDFF-4831-9529-0701F5732691}"/>
+              </a:ext>
+            </a:extLst>
+          </p:cNvPr>
+          <p:cNvSpPr>
+            <a:spLocks noGrp="1"/>
+          </p:cNvSpPr>
+          <p:nvPr>
+            <p:ph idx="1"/>
+          </p:nvPr>
+        </p:nvSpPr>
+        <p:spPr/>
+        <p:txBody>
+          <a:bodyPr/>
+          <a:lstStyle/>
+          <a:p>
+            <a:r>
+              <a:rPr lang="ru-RU"/>
+              <a:t>Из-за предсказания бранчей, клеточное перемножение на замерах ведёт себя чуть хуже, чем подход с транспонированной матрицей</a:t>
+            </a:r>
+          </a:p>
+          <a:p>
+            <a:r>
+              <a:rPr lang="ru-RU"/>
+              <a:t>Кроме того там накладывается важное ограничение: размеры матриц должны нацело делиться на </a:t>
+            </a:r>
+            <a:r>
+              <a:rPr lang="en-US">
+                <a:latin typeface="Consolas" panose="020B0609020204030204" pitchFamily="49" charset="0"/>
+              </a:rPr>
+              <a:t>SM</a:t>
+            </a:r>
+            <a:r>
+              <a:rPr lang="ru-RU"/>
+              <a:t> иначе нужно писать чуть больше кода чтобы учесть краевые эффекты</a:t>
+            </a:r>
+          </a:p>
+          <a:p>
+            <a:r>
+              <a:rPr lang="ru-RU"/>
+              <a:t>Зато этот метод не требует дополнительной памяти</a:t>
+            </a:r>
+          </a:p>
+        </p:txBody>
+      </p:sp>
+    </p:spTree>
+    <p:extLst>
+      <p:ext uri="{BB962C8B-B14F-4D97-AF65-F5344CB8AC3E}">
+        <p14:creationId xmlns:p14="http://schemas.microsoft.com/office/powerpoint/2010/main" val="2055206412"/>
+      </p:ext>
+    </p:extLst>
+  </p:cSld>
+  <p:clrMapOvr>
+    <a:masterClrMapping/>
+  </p:clrMapOvr>
+</p:sld>
+</file>
+
+<file path=ppt/slides/slide23.xml><?xml version="1.0" encoding="utf-8"?>
 <p:sld xmlns:a="http://schemas.openxmlformats.org/drawingml/2006/main" xmlns:r="http://schemas.openxmlformats.org/officeDocument/2006/relationships" xmlns:p="http://schemas.openxmlformats.org/presentationml/2006/main">
   <p:cSld>
     <p:spTree>
@@ -13594,7 +15699,7 @@
           <a:p>
             <a:r>
               <a:rPr lang="ru-RU"/>
-              <a:t>Обсуждение</a:t>
+              <a:t>Задача</a:t>
             </a:r>
           </a:p>
         </p:txBody>
@@ -13628,6 +15733,18 @@
           <a:p>
             <a:r>
               <a:rPr lang="ru-RU"/>
+              <a:t>И у вас нет документации</a:t>
+            </a:r>
+          </a:p>
+          <a:p>
+            <a:r>
+              <a:rPr lang="ru-RU"/>
+              <a:t>Интернета чтобы её поискать тоже нет</a:t>
+            </a:r>
+          </a:p>
+          <a:p>
+            <a:r>
+              <a:rPr lang="ru-RU"/>
               <a:t>Как бы вы его выяснили?</a:t>
             </a:r>
           </a:p>
@@ -13649,7 +15766,7 @@
 </p:sld>
 </file>
 
-<file path=ppt/slides/slide17.xml><?xml version="1.0" encoding="utf-8"?>
+<file path=ppt/slides/slide24.xml><?xml version="1.0" encoding="utf-8"?>
 <p:sld xmlns:a="http://schemas.openxmlformats.org/drawingml/2006/main" xmlns:r="http://schemas.openxmlformats.org/officeDocument/2006/relationships" xmlns:p="http://schemas.openxmlformats.org/presentationml/2006/main">
   <p:cSld>
     <p:spTree>
@@ -13959,7 +16076,7 @@
 </p:sld>
 </file>
 
-<file path=ppt/slides/slide18.xml><?xml version="1.0" encoding="utf-8"?>
+<file path=ppt/slides/slide25.xml><?xml version="1.0" encoding="utf-8"?>
 <p:sld xmlns:a="http://schemas.openxmlformats.org/drawingml/2006/main" xmlns:r="http://schemas.openxmlformats.org/officeDocument/2006/relationships" xmlns:p="http://schemas.openxmlformats.org/presentationml/2006/main">
   <p:cSld>
     <p:spTree>
@@ -14102,7 +16219,7 @@
 </p:sld>
 </file>
 
-<file path=ppt/slides/slide19.xml><?xml version="1.0" encoding="utf-8"?>
+<file path=ppt/slides/slide26.xml><?xml version="1.0" encoding="utf-8"?>
 <p:sld xmlns:a="http://schemas.openxmlformats.org/drawingml/2006/main" xmlns:r="http://schemas.openxmlformats.org/officeDocument/2006/relationships" xmlns:p="http://schemas.openxmlformats.org/presentationml/2006/main">
   <p:cSld>
     <p:spTree>
@@ -14332,214 +16449,7 @@
 </p:sld>
 </file>
 
-<file path=ppt/slides/slide2.xml><?xml version="1.0" encoding="utf-8"?>
-<p:sld xmlns:a="http://schemas.openxmlformats.org/drawingml/2006/main" xmlns:r="http://schemas.openxmlformats.org/officeDocument/2006/relationships" xmlns:p="http://schemas.openxmlformats.org/presentationml/2006/main">
-  <p:cSld>
-    <p:spTree>
-      <p:nvGrpSpPr>
-        <p:cNvPr id="1" name=""/>
-        <p:cNvGrpSpPr/>
-        <p:nvPr/>
-      </p:nvGrpSpPr>
-      <p:grpSpPr>
-        <a:xfrm>
-          <a:off x="0" y="0"/>
-          <a:ext cx="0" cy="0"/>
-          <a:chOff x="0" y="0"/>
-          <a:chExt cx="0" cy="0"/>
-        </a:xfrm>
-      </p:grpSpPr>
-      <p:sp>
-        <p:nvSpPr>
-          <p:cNvPr id="2" name="Title 1">
-            <a:extLst>
-              <a:ext uri="{FF2B5EF4-FFF2-40B4-BE49-F238E27FC236}">
-                <a16:creationId xmlns:a16="http://schemas.microsoft.com/office/drawing/2014/main" id="{FAB44B53-E875-43D6-AC4C-772A677B97FC}"/>
-              </a:ext>
-            </a:extLst>
-          </p:cNvPr>
-          <p:cNvSpPr>
-            <a:spLocks noGrp="1"/>
-          </p:cNvSpPr>
-          <p:nvPr>
-            <p:ph type="title"/>
-          </p:nvPr>
-        </p:nvSpPr>
-        <p:spPr/>
-        <p:txBody>
-          <a:bodyPr/>
-          <a:lstStyle/>
-          <a:p>
-            <a:r>
-              <a:rPr lang="ru-RU"/>
-              <a:t>Загадочная проблема</a:t>
-            </a:r>
-          </a:p>
-        </p:txBody>
-      </p:sp>
-      <p:sp>
-        <p:nvSpPr>
-          <p:cNvPr id="3" name="Content Placeholder 2">
-            <a:extLst>
-              <a:ext uri="{FF2B5EF4-FFF2-40B4-BE49-F238E27FC236}">
-                <a16:creationId xmlns:a16="http://schemas.microsoft.com/office/drawing/2014/main" id="{A7FD2C83-04A6-43DC-98B2-C73A76BB6A91}"/>
-              </a:ext>
-            </a:extLst>
-          </p:cNvPr>
-          <p:cNvSpPr>
-            <a:spLocks noGrp="1"/>
-          </p:cNvSpPr>
-          <p:nvPr>
-            <p:ph idx="1"/>
-          </p:nvPr>
-        </p:nvSpPr>
-        <p:spPr>
-          <a:xfrm>
-            <a:off x="1143000" y="2057400"/>
-            <a:ext cx="9872871" cy="4494320"/>
-          </a:xfrm>
-        </p:spPr>
-        <p:txBody>
-          <a:bodyPr/>
-          <a:lstStyle/>
-          <a:p>
-            <a:r>
-              <a:rPr lang="ru-RU"/>
-              <a:t>Следующий код суммирует все элементы массива, меньшие, чем </a:t>
-            </a:r>
-            <a:r>
-              <a:rPr lang="en-US">
-                <a:latin typeface="Consolas" panose="020B0609020204030204" pitchFamily="49" charset="0"/>
-              </a:rPr>
-              <a:t>128</a:t>
-            </a:r>
-            <a:endParaRPr lang="ru-RU"/>
-          </a:p>
-          <a:p>
-            <a:pPr marL="45720" indent="0">
-              <a:buNone/>
-            </a:pPr>
-            <a:r>
-              <a:rPr lang="en-US">
-                <a:latin typeface="Consolas" panose="020B0609020204030204" pitchFamily="49" charset="0"/>
-              </a:rPr>
-              <a:t>for (j = 0; j &lt; len; ++j)</a:t>
-            </a:r>
-            <a:br>
-              <a:rPr lang="en-US">
-                <a:latin typeface="Consolas" panose="020B0609020204030204" pitchFamily="49" charset="0"/>
-              </a:rPr>
-            </a:br>
-            <a:r>
-              <a:rPr lang="en-US">
-                <a:latin typeface="Consolas" panose="020B0609020204030204" pitchFamily="49" charset="0"/>
-              </a:rPr>
-              <a:t>  if (arr[j] &gt; 128)</a:t>
-            </a:r>
-            <a:br>
-              <a:rPr lang="en-US">
-                <a:latin typeface="Consolas" panose="020B0609020204030204" pitchFamily="49" charset="0"/>
-              </a:rPr>
-            </a:br>
-            <a:r>
-              <a:rPr lang="en-US">
-                <a:latin typeface="Consolas" panose="020B0609020204030204" pitchFamily="49" charset="0"/>
-              </a:rPr>
-              <a:t>    sum += arr[j]; </a:t>
-            </a:r>
-            <a:endParaRPr lang="ru-RU">
-              <a:latin typeface="Consolas" panose="020B0609020204030204" pitchFamily="49" charset="0"/>
-            </a:endParaRPr>
-          </a:p>
-          <a:p>
-            <a:r>
-              <a:rPr lang="ru-RU"/>
-              <a:t>Проблема в том, что</a:t>
-            </a:r>
-            <a:r>
-              <a:rPr lang="en-US"/>
-              <a:t> </a:t>
-            </a:r>
-            <a:r>
-              <a:rPr lang="ru-RU"/>
-              <a:t>для несортированных массивов он (без изменений в самом коде) работает почти в четыре раза медленнее, чем для сортированных</a:t>
-            </a:r>
-          </a:p>
-          <a:p>
-            <a:r>
-              <a:rPr lang="ru-RU"/>
-              <a:t>См. пример </a:t>
-            </a:r>
-            <a:r>
-              <a:rPr lang="en-US" b="1">
-                <a:latin typeface="Consolas" panose="020B0609020204030204" pitchFamily="49" charset="0"/>
-              </a:rPr>
-              <a:t>bmystery.c</a:t>
-            </a:r>
-            <a:r>
-              <a:rPr lang="en-US"/>
-              <a:t> </a:t>
-            </a:r>
-            <a:r>
-              <a:rPr lang="ru-RU"/>
-              <a:t>в файлах к семинару</a:t>
-            </a:r>
-          </a:p>
-          <a:p>
-            <a:r>
-              <a:rPr lang="ru-RU"/>
-              <a:t>Предположим, необходимо эффективно обрабатывать именно несортированные массивы</a:t>
-            </a:r>
-          </a:p>
-          <a:p>
-            <a:r>
-              <a:rPr lang="ru-RU"/>
-              <a:t>Значит надо понять </a:t>
-            </a:r>
-            <a:r>
-              <a:rPr lang="ru-RU">
-                <a:solidFill>
-                  <a:srgbClr val="0000FF"/>
-                </a:solidFill>
-              </a:rPr>
-              <a:t>почему</a:t>
-            </a:r>
-            <a:r>
-              <a:rPr lang="ru-RU"/>
-              <a:t> происходит замедление и </a:t>
-            </a:r>
-            <a:r>
-              <a:rPr lang="ru-RU">
-                <a:solidFill>
-                  <a:srgbClr val="0000FF"/>
-                </a:solidFill>
-              </a:rPr>
-              <a:t>как</a:t>
-            </a:r>
-            <a:r>
-              <a:rPr lang="ru-RU"/>
-              <a:t> это исправить</a:t>
-            </a:r>
-          </a:p>
-          <a:p>
-            <a:endParaRPr lang="ru-RU"/>
-          </a:p>
-        </p:txBody>
-      </p:sp>
-    </p:spTree>
-    <p:extLst>
-      <p:ext uri="{BB962C8B-B14F-4D97-AF65-F5344CB8AC3E}">
-        <p14:creationId xmlns:p14="http://schemas.microsoft.com/office/powerpoint/2010/main" val="3437026259"/>
-      </p:ext>
-    </p:extLst>
-  </p:cSld>
-  <p:clrMapOvr>
-    <a:masterClrMapping/>
-  </p:clrMapOvr>
-</p:sld>
-</file>
-
-<file path=ppt/slides/slide20.xml><?xml version="1.0" encoding="utf-8"?>
+<file path=ppt/slides/slide27.xml><?xml version="1.0" encoding="utf-8"?>
 <p:sld xmlns:a="http://schemas.openxmlformats.org/drawingml/2006/main" xmlns:r="http://schemas.openxmlformats.org/officeDocument/2006/relationships" xmlns:p="http://schemas.openxmlformats.org/presentationml/2006/main">
   <p:cSld>
     <p:spTree>
@@ -14703,7 +16613,7 @@
 </p:sld>
 </file>
 
-<file path=ppt/slides/slide21.xml><?xml version="1.0" encoding="utf-8"?>
+<file path=ppt/slides/slide28.xml><?xml version="1.0" encoding="utf-8"?>
 <p:sld xmlns:a="http://schemas.openxmlformats.org/drawingml/2006/main" xmlns:r="http://schemas.openxmlformats.org/officeDocument/2006/relationships" xmlns:p="http://schemas.openxmlformats.org/presentationml/2006/main">
   <p:cSld>
     <p:spTree>
@@ -15289,7 +17199,7 @@
 </p:sld>
 </file>
 
-<file path=ppt/slides/slide22.xml><?xml version="1.0" encoding="utf-8"?>
+<file path=ppt/slides/slide29.xml><?xml version="1.0" encoding="utf-8"?>
 <p:sld xmlns:a="http://schemas.openxmlformats.org/drawingml/2006/main" xmlns:r="http://schemas.openxmlformats.org/officeDocument/2006/relationships" xmlns:p="http://schemas.openxmlformats.org/presentationml/2006/main">
   <p:cSld>
     <p:spTree>
@@ -15561,613 +17471,6 @@
     <p:extLst>
       <p:ext uri="{BB962C8B-B14F-4D97-AF65-F5344CB8AC3E}">
         <p14:creationId xmlns:p14="http://schemas.microsoft.com/office/powerpoint/2010/main" val="3679424995"/>
-      </p:ext>
-    </p:extLst>
-  </p:cSld>
-  <p:clrMapOvr>
-    <a:masterClrMapping/>
-  </p:clrMapOvr>
-</p:sld>
-</file>
-
-<file path=ppt/slides/slide23.xml><?xml version="1.0" encoding="utf-8"?>
-<p:sld xmlns:a="http://schemas.openxmlformats.org/drawingml/2006/main" xmlns:r="http://schemas.openxmlformats.org/officeDocument/2006/relationships" xmlns:p="http://schemas.openxmlformats.org/presentationml/2006/main">
-  <p:cSld>
-    <p:spTree>
-      <p:nvGrpSpPr>
-        <p:cNvPr id="1" name=""/>
-        <p:cNvGrpSpPr/>
-        <p:nvPr/>
-      </p:nvGrpSpPr>
-      <p:grpSpPr>
-        <a:xfrm>
-          <a:off x="0" y="0"/>
-          <a:ext cx="0" cy="0"/>
-          <a:chOff x="0" y="0"/>
-          <a:chExt cx="0" cy="0"/>
-        </a:xfrm>
-      </p:grpSpPr>
-      <p:sp>
-        <p:nvSpPr>
-          <p:cNvPr id="2" name="Title 1">
-            <a:extLst>
-              <a:ext uri="{FF2B5EF4-FFF2-40B4-BE49-F238E27FC236}">
-                <a16:creationId xmlns:a16="http://schemas.microsoft.com/office/drawing/2014/main" id="{8318723F-8279-4DB1-BB76-F8F146EFF241}"/>
-              </a:ext>
-            </a:extLst>
-          </p:cNvPr>
-          <p:cNvSpPr>
-            <a:spLocks noGrp="1"/>
-          </p:cNvSpPr>
-          <p:nvPr>
-            <p:ph type="title"/>
-          </p:nvPr>
-        </p:nvSpPr>
-        <p:spPr/>
-        <p:txBody>
-          <a:bodyPr/>
-          <a:lstStyle/>
-          <a:p>
-            <a:r>
-              <a:rPr lang="en-US"/>
-              <a:t>Prefetch</a:t>
-            </a:r>
-            <a:endParaRPr lang="ru-RU"/>
-          </a:p>
-        </p:txBody>
-      </p:sp>
-      <p:sp>
-        <p:nvSpPr>
-          <p:cNvPr id="3" name="Content Placeholder 2">
-            <a:extLst>
-              <a:ext uri="{FF2B5EF4-FFF2-40B4-BE49-F238E27FC236}">
-                <a16:creationId xmlns:a16="http://schemas.microsoft.com/office/drawing/2014/main" id="{8147EE87-6CEC-44D0-80D6-56286741B105}"/>
-              </a:ext>
-            </a:extLst>
-          </p:cNvPr>
-          <p:cNvSpPr>
-            <a:spLocks noGrp="1"/>
-          </p:cNvSpPr>
-          <p:nvPr>
-            <p:ph idx="1"/>
-          </p:nvPr>
-        </p:nvSpPr>
-        <p:spPr/>
-        <p:txBody>
-          <a:bodyPr/>
-          <a:lstStyle/>
-          <a:p>
-            <a:r>
-              <a:rPr lang="ru-RU"/>
-              <a:t>Техника </a:t>
-            </a:r>
-            <a:r>
-              <a:rPr lang="ru-RU">
-                <a:solidFill>
-                  <a:srgbClr val="0000FF"/>
-                </a:solidFill>
-              </a:rPr>
-              <a:t>предвыборки (</a:t>
-            </a:r>
-            <a:r>
-              <a:rPr lang="en-US">
-                <a:solidFill>
-                  <a:srgbClr val="0000FF"/>
-                </a:solidFill>
-              </a:rPr>
-              <a:t>prefetch)</a:t>
-            </a:r>
-            <a:r>
-              <a:rPr lang="ru-RU"/>
-              <a:t> служит для того, чтобы подкачать в кэш данные</a:t>
-            </a:r>
-            <a:endParaRPr lang="en-US"/>
-          </a:p>
-          <a:p>
-            <a:pPr marL="45720" indent="0">
-              <a:buNone/>
-            </a:pPr>
-            <a:r>
-              <a:rPr lang="en-US">
-                <a:latin typeface="Consolas" panose="020B0609020204030204" pitchFamily="49" charset="0"/>
-              </a:rPr>
-              <a:t>for (int i = 0; i &lt; ARRSZ; ++i) {</a:t>
-            </a:r>
-            <a:br>
-              <a:rPr lang="en-US">
-                <a:latin typeface="Consolas" panose="020B0609020204030204" pitchFamily="49" charset="0"/>
-              </a:rPr>
-            </a:br>
-            <a:r>
-              <a:rPr lang="en-US">
-                <a:latin typeface="Consolas" panose="020B0609020204030204" pitchFamily="49" charset="0"/>
-              </a:rPr>
-              <a:t>  a[i] = a[i] + b[i];</a:t>
-            </a:r>
-            <a:br>
-              <a:rPr lang="en-US">
-                <a:latin typeface="Consolas" panose="020B0609020204030204" pitchFamily="49" charset="0"/>
-              </a:rPr>
-            </a:br>
-            <a:r>
-              <a:rPr lang="en-US">
-                <a:latin typeface="Consolas" panose="020B0609020204030204" pitchFamily="49" charset="0"/>
-              </a:rPr>
-              <a:t>  __builtin_prefetch(a[i+1]);</a:t>
-            </a:r>
-            <a:br>
-              <a:rPr lang="en-US">
-                <a:latin typeface="Consolas" panose="020B0609020204030204" pitchFamily="49" charset="0"/>
-              </a:rPr>
-            </a:br>
-            <a:r>
-              <a:rPr lang="en-US">
-                <a:latin typeface="Consolas" panose="020B0609020204030204" pitchFamily="49" charset="0"/>
-              </a:rPr>
-              <a:t>  __builtin_prefetch(b[i+1]);</a:t>
-            </a:r>
-            <a:br>
-              <a:rPr lang="en-US">
-                <a:latin typeface="Consolas" panose="020B0609020204030204" pitchFamily="49" charset="0"/>
-              </a:rPr>
-            </a:br>
-            <a:r>
-              <a:rPr lang="en-US">
-                <a:latin typeface="Consolas" panose="020B0609020204030204" pitchFamily="49" charset="0"/>
-              </a:rPr>
-              <a:t>}</a:t>
-            </a:r>
-          </a:p>
-          <a:p>
-            <a:r>
-              <a:rPr lang="ru-RU"/>
-              <a:t>Здесь до перехода будут подкачаны</a:t>
-            </a:r>
-          </a:p>
-        </p:txBody>
-      </p:sp>
-    </p:spTree>
-    <p:extLst>
-      <p:ext uri="{BB962C8B-B14F-4D97-AF65-F5344CB8AC3E}">
-        <p14:creationId xmlns:p14="http://schemas.microsoft.com/office/powerpoint/2010/main" val="2997879610"/>
-      </p:ext>
-    </p:extLst>
-  </p:cSld>
-  <p:clrMapOvr>
-    <a:masterClrMapping/>
-  </p:clrMapOvr>
-</p:sld>
-</file>
-
-<file path=ppt/slides/slide24.xml><?xml version="1.0" encoding="utf-8"?>
-<p:sld xmlns:a="http://schemas.openxmlformats.org/drawingml/2006/main" xmlns:r="http://schemas.openxmlformats.org/officeDocument/2006/relationships" xmlns:p="http://schemas.openxmlformats.org/presentationml/2006/main">
-  <p:cSld>
-    <p:spTree>
-      <p:nvGrpSpPr>
-        <p:cNvPr id="1" name=""/>
-        <p:cNvGrpSpPr/>
-        <p:nvPr/>
-      </p:nvGrpSpPr>
-      <p:grpSpPr>
-        <a:xfrm>
-          <a:off x="0" y="0"/>
-          <a:ext cx="0" cy="0"/>
-          <a:chOff x="0" y="0"/>
-          <a:chExt cx="0" cy="0"/>
-        </a:xfrm>
-      </p:grpSpPr>
-      <p:sp>
-        <p:nvSpPr>
-          <p:cNvPr id="2" name="Title 1">
-            <a:extLst>
-              <a:ext uri="{FF2B5EF4-FFF2-40B4-BE49-F238E27FC236}">
-                <a16:creationId xmlns:a16="http://schemas.microsoft.com/office/drawing/2014/main" id="{2CB5029A-95F0-4E3B-B9BC-83A7612AF55A}"/>
-              </a:ext>
-            </a:extLst>
-          </p:cNvPr>
-          <p:cNvSpPr>
-            <a:spLocks noGrp="1"/>
-          </p:cNvSpPr>
-          <p:nvPr>
-            <p:ph type="title"/>
-          </p:nvPr>
-        </p:nvSpPr>
-        <p:spPr/>
-        <p:txBody>
-          <a:bodyPr/>
-          <a:lstStyle/>
-          <a:p>
-            <a:r>
-              <a:rPr lang="en-US"/>
-              <a:t>Instruction cache</a:t>
-            </a:r>
-            <a:endParaRPr lang="ru-RU"/>
-          </a:p>
-        </p:txBody>
-      </p:sp>
-      <p:sp>
-        <p:nvSpPr>
-          <p:cNvPr id="3" name="Content Placeholder 2">
-            <a:extLst>
-              <a:ext uri="{FF2B5EF4-FFF2-40B4-BE49-F238E27FC236}">
-                <a16:creationId xmlns:a16="http://schemas.microsoft.com/office/drawing/2014/main" id="{784C8091-BC24-4AEF-8141-4FB95AE641D1}"/>
-              </a:ext>
-            </a:extLst>
-          </p:cNvPr>
-          <p:cNvSpPr>
-            <a:spLocks noGrp="1"/>
-          </p:cNvSpPr>
-          <p:nvPr>
-            <p:ph idx="1"/>
-          </p:nvPr>
-        </p:nvSpPr>
-        <p:spPr/>
-        <p:txBody>
-          <a:bodyPr/>
-          <a:lstStyle/>
-          <a:p>
-            <a:r>
-              <a:rPr lang="ru-RU"/>
-              <a:t>Инструкции это тоже данные</a:t>
-            </a:r>
-          </a:p>
-          <a:p>
-            <a:r>
-              <a:rPr lang="ru-RU"/>
-              <a:t>Конвейер декодировав инструкцию сохраняет её в кэш инструкций</a:t>
-            </a:r>
-          </a:p>
-          <a:p>
-            <a:endParaRPr lang="ru-RU"/>
-          </a:p>
-          <a:p>
-            <a:r>
-              <a:rPr lang="ru-RU"/>
-              <a:t>Таким образом</a:t>
-            </a:r>
-            <a:r>
-              <a:rPr lang="en-US"/>
-              <a:t>, </a:t>
-            </a:r>
-            <a:r>
-              <a:rPr lang="ru-RU"/>
-              <a:t>кроме </a:t>
-            </a:r>
-            <a:r>
-              <a:rPr lang="en-US"/>
-              <a:t>branch mispredict </a:t>
-            </a:r>
-            <a:r>
-              <a:rPr lang="ru-RU"/>
-              <a:t>можно рассматривать </a:t>
-            </a:r>
-            <a:r>
-              <a:rPr lang="en-US"/>
-              <a:t>instruction cache miss</a:t>
-            </a:r>
-            <a:endParaRPr lang="ru-RU"/>
-          </a:p>
-        </p:txBody>
-      </p:sp>
-    </p:spTree>
-    <p:extLst>
-      <p:ext uri="{BB962C8B-B14F-4D97-AF65-F5344CB8AC3E}">
-        <p14:creationId xmlns:p14="http://schemas.microsoft.com/office/powerpoint/2010/main" val="165033581"/>
-      </p:ext>
-    </p:extLst>
-  </p:cSld>
-  <p:clrMapOvr>
-    <a:masterClrMapping/>
-  </p:clrMapOvr>
-</p:sld>
-</file>
-
-<file path=ppt/slides/slide25.xml><?xml version="1.0" encoding="utf-8"?>
-<p:sld xmlns:a="http://schemas.openxmlformats.org/drawingml/2006/main" xmlns:r="http://schemas.openxmlformats.org/officeDocument/2006/relationships" xmlns:p="http://schemas.openxmlformats.org/presentationml/2006/main">
-  <p:cSld>
-    <p:spTree>
-      <p:nvGrpSpPr>
-        <p:cNvPr id="1" name=""/>
-        <p:cNvGrpSpPr/>
-        <p:nvPr/>
-      </p:nvGrpSpPr>
-      <p:grpSpPr>
-        <a:xfrm>
-          <a:off x="0" y="0"/>
-          <a:ext cx="0" cy="0"/>
-          <a:chOff x="0" y="0"/>
-          <a:chExt cx="0" cy="0"/>
-        </a:xfrm>
-      </p:grpSpPr>
-      <p:sp>
-        <p:nvSpPr>
-          <p:cNvPr id="2" name="Title 1"/>
-          <p:cNvSpPr>
-            <a:spLocks noGrp="1"/>
-          </p:cNvSpPr>
-          <p:nvPr>
-            <p:ph type="title"/>
-          </p:nvPr>
-        </p:nvSpPr>
-        <p:spPr/>
-        <p:txBody>
-          <a:bodyPr/>
-          <a:lstStyle/>
-          <a:p>
-            <a:r>
-              <a:rPr lang="ru-RU" dirty="0"/>
-              <a:t>Литература</a:t>
-            </a:r>
-            <a:endParaRPr lang="en-US" dirty="0"/>
-          </a:p>
-        </p:txBody>
-      </p:sp>
-      <mc:AlternateContent xmlns:mc="http://schemas.openxmlformats.org/markup-compatibility/2006" xmlns:a14="http://schemas.microsoft.com/office/drawing/2010/main">
-        <mc:Choice Requires="a14">
-          <p:sp>
-            <p:nvSpPr>
-              <p:cNvPr id="3" name="Content Placeholder 2"/>
-              <p:cNvSpPr>
-                <a:spLocks noGrp="1"/>
-              </p:cNvSpPr>
-              <p:nvPr>
-                <p:ph idx="1"/>
-              </p:nvPr>
-            </p:nvSpPr>
-            <p:spPr>
-              <a:xfrm>
-                <a:off x="1143000" y="2057400"/>
-                <a:ext cx="10115026" cy="4191000"/>
-              </a:xfrm>
-            </p:spPr>
-            <p:txBody>
-              <a:bodyPr>
-                <a:normAutofit/>
-              </a:bodyPr>
-              <a:lstStyle/>
-              <a:p>
-                <a:pPr lvl="0"/>
-                <a14:m>
-                  <m:oMath xmlns:m="http://schemas.openxmlformats.org/officeDocument/2006/math">
-                    <m:d>
-                      <m:dPr>
-                        <m:begChr m:val="["/>
-                        <m:endChr m:val="]"/>
-                        <m:ctrlPr>
-                          <a:rPr lang="en-US" i="1" smtClean="0">
-                            <a:latin typeface="Cambria Math" panose="02040503050406030204" pitchFamily="18" charset="0"/>
-                          </a:rPr>
-                        </m:ctrlPr>
-                      </m:dPr>
-                      <m:e>
-                        <m:r>
-                          <a:rPr lang="ru-RU" i="1">
-                            <a:latin typeface="Cambria Math" panose="02040503050406030204" pitchFamily="18" charset="0"/>
-                          </a:rPr>
-                          <m:t>С11</m:t>
-                        </m:r>
-                      </m:e>
-                    </m:d>
-                  </m:oMath>
-                </a14:m>
-                <a:r>
-                  <a:rPr lang="en-US"/>
-                  <a:t> ISO/IEC – </a:t>
-                </a:r>
-                <a:r>
-                  <a:rPr lang="en-US" dirty="0"/>
-                  <a:t>"Information </a:t>
-                </a:r>
-                <a:r>
-                  <a:rPr lang="en-US"/>
-                  <a:t>technology – </a:t>
-                </a:r>
-                <a:r>
-                  <a:rPr lang="en-US" dirty="0"/>
-                  <a:t>Programming languages </a:t>
-                </a:r>
-                <a:r>
-                  <a:rPr lang="en-US"/>
-                  <a:t>– C", </a:t>
-                </a:r>
-                <a:r>
-                  <a:rPr lang="en-US">
-                    <a:latin typeface="Consolas" panose="020B0609020204030204" pitchFamily="49" charset="0"/>
-                  </a:rPr>
-                  <a:t>2011</a:t>
-                </a:r>
-                <a:endParaRPr lang="en-US" dirty="0">
-                  <a:latin typeface="Consolas" panose="020B0609020204030204" pitchFamily="49" charset="0"/>
-                </a:endParaRPr>
-              </a:p>
-              <a:p>
-                <a:pPr lvl="0"/>
-                <a14:m>
-                  <m:oMath xmlns:m="http://schemas.openxmlformats.org/officeDocument/2006/math">
-                    <m:d>
-                      <m:dPr>
-                        <m:begChr m:val="["/>
-                        <m:endChr m:val="]"/>
-                        <m:ctrlPr>
-                          <a:rPr lang="en-US" i="1">
-                            <a:latin typeface="Cambria Math" panose="02040503050406030204" pitchFamily="18" charset="0"/>
-                          </a:rPr>
-                        </m:ctrlPr>
-                      </m:dPr>
-                      <m:e>
-                        <m:r>
-                          <a:rPr lang="en-US" i="1">
-                            <a:latin typeface="Cambria Math" panose="02040503050406030204" pitchFamily="18" charset="0"/>
-                          </a:rPr>
-                          <m:t>𝐾</m:t>
-                        </m:r>
-                        <m:r>
-                          <a:rPr lang="en-US" i="1">
-                            <a:latin typeface="Cambria Math" panose="02040503050406030204" pitchFamily="18" charset="0"/>
-                          </a:rPr>
-                          <m:t>&amp;</m:t>
-                        </m:r>
-                        <m:r>
-                          <a:rPr lang="en-US" i="1">
-                            <a:latin typeface="Cambria Math" panose="02040503050406030204" pitchFamily="18" charset="0"/>
-                          </a:rPr>
-                          <m:t>𝑅</m:t>
-                        </m:r>
-                      </m:e>
-                    </m:d>
-                  </m:oMath>
-                </a14:m>
-                <a:r>
-                  <a:rPr lang="ru-RU"/>
-                  <a:t> </a:t>
-                </a:r>
-                <a:r>
-                  <a:rPr lang="en-US"/>
-                  <a:t>Brian W. Kernighan, Dennis Ritchie –</a:t>
-                </a:r>
-                <a:r>
-                  <a:rPr lang="ru-RU"/>
-                  <a:t> </a:t>
-                </a:r>
-                <a:r>
-                  <a:rPr lang="en-US"/>
-                  <a:t>The C programming language, </a:t>
-                </a:r>
-                <a:r>
-                  <a:rPr lang="en-US">
-                    <a:latin typeface="Consolas" panose="020B0609020204030204" pitchFamily="49" charset="0"/>
-                  </a:rPr>
-                  <a:t>1988</a:t>
-                </a:r>
-              </a:p>
-              <a:p>
-                <a14:m>
-                  <m:oMath xmlns:m="http://schemas.openxmlformats.org/officeDocument/2006/math">
-                    <m:d>
-                      <m:dPr>
-                        <m:begChr m:val="["/>
-                        <m:endChr m:val="]"/>
-                        <m:ctrlPr>
-                          <a:rPr lang="en-US" i="1">
-                            <a:latin typeface="Cambria Math" panose="02040503050406030204" pitchFamily="18" charset="0"/>
-                          </a:rPr>
-                        </m:ctrlPr>
-                      </m:dPr>
-                      <m:e>
-                        <m:r>
-                          <a:rPr lang="en-US" b="0" i="1" smtClean="0">
-                            <a:latin typeface="Cambria Math" panose="02040503050406030204" pitchFamily="18" charset="0"/>
-                          </a:rPr>
-                          <m:t>𝑆𝐷𝑀</m:t>
-                        </m:r>
-                      </m:e>
-                    </m:d>
-                  </m:oMath>
-                </a14:m>
-                <a:r>
-                  <a:rPr lang="ru-RU"/>
-                  <a:t> </a:t>
-                </a:r>
-                <a:r>
-                  <a:rPr lang="en-US"/>
-                  <a:t>Intel Software Developer Manual: </a:t>
-                </a:r>
-                <a:r>
-                  <a:rPr lang="en-US">
-                    <a:hlinkClick r:id="rId2"/>
-                  </a:rPr>
-                  <a:t>intel-sdm</a:t>
-                </a:r>
-                <a:endParaRPr lang="ru-RU" i="1">
-                  <a:latin typeface="Cambria Math" panose="02040503050406030204" pitchFamily="18" charset="0"/>
-                </a:endParaRPr>
-              </a:p>
-              <a:p>
-                <a14:m>
-                  <m:oMath xmlns:m="http://schemas.openxmlformats.org/officeDocument/2006/math">
-                    <m:d>
-                      <m:dPr>
-                        <m:begChr m:val="["/>
-                        <m:endChr m:val="]"/>
-                        <m:ctrlPr>
-                          <a:rPr lang="en-US" i="1">
-                            <a:latin typeface="Cambria Math" panose="02040503050406030204" pitchFamily="18" charset="0"/>
-                          </a:rPr>
-                        </m:ctrlPr>
-                      </m:dPr>
-                      <m:e>
-                        <m:r>
-                          <a:rPr lang="en-US" i="1">
-                            <a:latin typeface="Cambria Math" panose="02040503050406030204" pitchFamily="18" charset="0"/>
-                          </a:rPr>
-                          <m:t>𝐿𝑖𝑛𝑑𝑒𝑛</m:t>
-                        </m:r>
-                      </m:e>
-                    </m:d>
-                  </m:oMath>
-                </a14:m>
-                <a:r>
-                  <a:rPr lang="en-US" i="1">
-                    <a:latin typeface="Cambria Math" panose="02040503050406030204" pitchFamily="18" charset="0"/>
-                  </a:rPr>
-                  <a:t> </a:t>
-                </a:r>
-                <a:r>
-                  <a:rPr lang="en-US"/>
-                  <a:t>Peter van der Linden – Expert C Programming: Deep C Secrets, </a:t>
-                </a:r>
-                <a:r>
-                  <a:rPr lang="en-US">
-                    <a:latin typeface="Consolas" panose="020B0609020204030204" pitchFamily="49" charset="0"/>
-                  </a:rPr>
-                  <a:t>1994</a:t>
-                </a:r>
-              </a:p>
-            </p:txBody>
-          </p:sp>
-        </mc:Choice>
-        <mc:Fallback xmlns="">
-          <p:sp>
-            <p:nvSpPr>
-              <p:cNvPr id="3" name="Content Placeholder 2"/>
-              <p:cNvSpPr>
-                <a:spLocks noGrp="1" noRot="1" noChangeAspect="1" noMove="1" noResize="1" noEditPoints="1" noAdjustHandles="1" noChangeArrowheads="1" noChangeShapeType="1" noTextEdit="1"/>
-              </p:cNvSpPr>
-              <p:nvPr>
-                <p:ph idx="1"/>
-              </p:nvPr>
-            </p:nvSpPr>
-            <p:spPr>
-              <a:xfrm>
-                <a:off x="1143000" y="2057400"/>
-                <a:ext cx="10115026" cy="4191000"/>
-              </a:xfrm>
-              <a:blipFill>
-                <a:blip r:embed="rId3"/>
-                <a:stretch>
-                  <a:fillRect t="-1747"/>
-                </a:stretch>
-              </a:blipFill>
-            </p:spPr>
-            <p:txBody>
-              <a:bodyPr/>
-              <a:lstStyle/>
-              <a:p>
-                <a:r>
-                  <a:rPr lang="ru-RU">
-                    <a:noFill/>
-                  </a:rPr>
-                  <a:t> </a:t>
-                </a:r>
-              </a:p>
-            </p:txBody>
-          </p:sp>
-        </mc:Fallback>
-      </mc:AlternateContent>
-    </p:spTree>
-    <p:extLst>
-      <p:ext uri="{BB962C8B-B14F-4D97-AF65-F5344CB8AC3E}">
-        <p14:creationId xmlns:p14="http://schemas.microsoft.com/office/powerpoint/2010/main" val="1719869055"/>
       </p:ext>
     </p:extLst>
   </p:cSld>
@@ -16780,6 +18083,719 @@
 </p:sld>
 </file>
 
+<file path=ppt/slides/slide30.xml><?xml version="1.0" encoding="utf-8"?>
+<p:sld xmlns:a="http://schemas.openxmlformats.org/drawingml/2006/main" xmlns:r="http://schemas.openxmlformats.org/officeDocument/2006/relationships" xmlns:p="http://schemas.openxmlformats.org/presentationml/2006/main">
+  <p:cSld>
+    <p:spTree>
+      <p:nvGrpSpPr>
+        <p:cNvPr id="1" name=""/>
+        <p:cNvGrpSpPr/>
+        <p:nvPr/>
+      </p:nvGrpSpPr>
+      <p:grpSpPr>
+        <a:xfrm>
+          <a:off x="0" y="0"/>
+          <a:ext cx="0" cy="0"/>
+          <a:chOff x="0" y="0"/>
+          <a:chExt cx="0" cy="0"/>
+        </a:xfrm>
+      </p:grpSpPr>
+      <p:sp>
+        <p:nvSpPr>
+          <p:cNvPr id="2" name="Title 1">
+            <a:extLst>
+              <a:ext uri="{FF2B5EF4-FFF2-40B4-BE49-F238E27FC236}">
+                <a16:creationId xmlns:a16="http://schemas.microsoft.com/office/drawing/2014/main" id="{8318723F-8279-4DB1-BB76-F8F146EFF241}"/>
+              </a:ext>
+            </a:extLst>
+          </p:cNvPr>
+          <p:cNvSpPr>
+            <a:spLocks noGrp="1"/>
+          </p:cNvSpPr>
+          <p:nvPr>
+            <p:ph type="title"/>
+          </p:nvPr>
+        </p:nvSpPr>
+        <p:spPr/>
+        <p:txBody>
+          <a:bodyPr/>
+          <a:lstStyle/>
+          <a:p>
+            <a:r>
+              <a:rPr lang="en-US"/>
+              <a:t>Prefetch</a:t>
+            </a:r>
+            <a:endParaRPr lang="ru-RU"/>
+          </a:p>
+        </p:txBody>
+      </p:sp>
+      <p:sp>
+        <p:nvSpPr>
+          <p:cNvPr id="3" name="Content Placeholder 2">
+            <a:extLst>
+              <a:ext uri="{FF2B5EF4-FFF2-40B4-BE49-F238E27FC236}">
+                <a16:creationId xmlns:a16="http://schemas.microsoft.com/office/drawing/2014/main" id="{8147EE87-6CEC-44D0-80D6-56286741B105}"/>
+              </a:ext>
+            </a:extLst>
+          </p:cNvPr>
+          <p:cNvSpPr>
+            <a:spLocks noGrp="1"/>
+          </p:cNvSpPr>
+          <p:nvPr>
+            <p:ph idx="1"/>
+          </p:nvPr>
+        </p:nvSpPr>
+        <p:spPr/>
+        <p:txBody>
+          <a:bodyPr/>
+          <a:lstStyle/>
+          <a:p>
+            <a:r>
+              <a:rPr lang="ru-RU"/>
+              <a:t>Техника </a:t>
+            </a:r>
+            <a:r>
+              <a:rPr lang="ru-RU">
+                <a:solidFill>
+                  <a:srgbClr val="0000FF"/>
+                </a:solidFill>
+              </a:rPr>
+              <a:t>предвыборки (</a:t>
+            </a:r>
+            <a:r>
+              <a:rPr lang="en-US">
+                <a:solidFill>
+                  <a:srgbClr val="0000FF"/>
+                </a:solidFill>
+              </a:rPr>
+              <a:t>prefetch)</a:t>
+            </a:r>
+            <a:r>
+              <a:rPr lang="ru-RU"/>
+              <a:t> служит для того, чтобы подкачать в кэш данные</a:t>
+            </a:r>
+            <a:endParaRPr lang="en-US"/>
+          </a:p>
+          <a:p>
+            <a:pPr marL="45720" indent="0">
+              <a:buNone/>
+            </a:pPr>
+            <a:r>
+              <a:rPr lang="en-US">
+                <a:latin typeface="Consolas" panose="020B0609020204030204" pitchFamily="49" charset="0"/>
+              </a:rPr>
+              <a:t>for (int i = 0; i &lt; ARRSZ; ++i) {</a:t>
+            </a:r>
+            <a:br>
+              <a:rPr lang="en-US">
+                <a:latin typeface="Consolas" panose="020B0609020204030204" pitchFamily="49" charset="0"/>
+              </a:rPr>
+            </a:br>
+            <a:r>
+              <a:rPr lang="en-US">
+                <a:latin typeface="Consolas" panose="020B0609020204030204" pitchFamily="49" charset="0"/>
+              </a:rPr>
+              <a:t>  a[i] = a[i] + b[i];</a:t>
+            </a:r>
+            <a:br>
+              <a:rPr lang="en-US">
+                <a:latin typeface="Consolas" panose="020B0609020204030204" pitchFamily="49" charset="0"/>
+              </a:rPr>
+            </a:br>
+            <a:r>
+              <a:rPr lang="en-US">
+                <a:latin typeface="Consolas" panose="020B0609020204030204" pitchFamily="49" charset="0"/>
+              </a:rPr>
+              <a:t>  __builtin_prefetch(a[i+1]);</a:t>
+            </a:r>
+            <a:br>
+              <a:rPr lang="en-US">
+                <a:latin typeface="Consolas" panose="020B0609020204030204" pitchFamily="49" charset="0"/>
+              </a:rPr>
+            </a:br>
+            <a:r>
+              <a:rPr lang="en-US">
+                <a:latin typeface="Consolas" panose="020B0609020204030204" pitchFamily="49" charset="0"/>
+              </a:rPr>
+              <a:t>  __builtin_prefetch(b[i+1]);</a:t>
+            </a:r>
+            <a:br>
+              <a:rPr lang="en-US">
+                <a:latin typeface="Consolas" panose="020B0609020204030204" pitchFamily="49" charset="0"/>
+              </a:rPr>
+            </a:br>
+            <a:r>
+              <a:rPr lang="en-US">
+                <a:latin typeface="Consolas" panose="020B0609020204030204" pitchFamily="49" charset="0"/>
+              </a:rPr>
+              <a:t>}</a:t>
+            </a:r>
+          </a:p>
+          <a:p>
+            <a:r>
+              <a:rPr lang="ru-RU"/>
+              <a:t>Здесь до перехода будут подкачаны значения для вычисления следующей итерации цикла</a:t>
+            </a:r>
+          </a:p>
+        </p:txBody>
+      </p:sp>
+    </p:spTree>
+    <p:extLst>
+      <p:ext uri="{BB962C8B-B14F-4D97-AF65-F5344CB8AC3E}">
+        <p14:creationId xmlns:p14="http://schemas.microsoft.com/office/powerpoint/2010/main" val="2997879610"/>
+      </p:ext>
+    </p:extLst>
+  </p:cSld>
+  <p:clrMapOvr>
+    <a:masterClrMapping/>
+  </p:clrMapOvr>
+</p:sld>
+</file>
+
+<file path=ppt/slides/slide31.xml><?xml version="1.0" encoding="utf-8"?>
+<p:sld xmlns:a="http://schemas.openxmlformats.org/drawingml/2006/main" xmlns:r="http://schemas.openxmlformats.org/officeDocument/2006/relationships" xmlns:p="http://schemas.openxmlformats.org/presentationml/2006/main">
+  <p:cSld>
+    <p:spTree>
+      <p:nvGrpSpPr>
+        <p:cNvPr id="1" name=""/>
+        <p:cNvGrpSpPr/>
+        <p:nvPr/>
+      </p:nvGrpSpPr>
+      <p:grpSpPr>
+        <a:xfrm>
+          <a:off x="0" y="0"/>
+          <a:ext cx="0" cy="0"/>
+          <a:chOff x="0" y="0"/>
+          <a:chExt cx="0" cy="0"/>
+        </a:xfrm>
+      </p:grpSpPr>
+      <p:sp>
+        <p:nvSpPr>
+          <p:cNvPr id="2" name="Title 1">
+            <a:extLst>
+              <a:ext uri="{FF2B5EF4-FFF2-40B4-BE49-F238E27FC236}">
+                <a16:creationId xmlns:a16="http://schemas.microsoft.com/office/drawing/2014/main" id="{2CB5029A-95F0-4E3B-B9BC-83A7612AF55A}"/>
+              </a:ext>
+            </a:extLst>
+          </p:cNvPr>
+          <p:cNvSpPr>
+            <a:spLocks noGrp="1"/>
+          </p:cNvSpPr>
+          <p:nvPr>
+            <p:ph type="title"/>
+          </p:nvPr>
+        </p:nvSpPr>
+        <p:spPr/>
+        <p:txBody>
+          <a:bodyPr/>
+          <a:lstStyle/>
+          <a:p>
+            <a:r>
+              <a:rPr lang="en-US"/>
+              <a:t>Instruction cache</a:t>
+            </a:r>
+            <a:endParaRPr lang="ru-RU"/>
+          </a:p>
+        </p:txBody>
+      </p:sp>
+      <p:sp>
+        <p:nvSpPr>
+          <p:cNvPr id="3" name="Content Placeholder 2">
+            <a:extLst>
+              <a:ext uri="{FF2B5EF4-FFF2-40B4-BE49-F238E27FC236}">
+                <a16:creationId xmlns:a16="http://schemas.microsoft.com/office/drawing/2014/main" id="{784C8091-BC24-4AEF-8141-4FB95AE641D1}"/>
+              </a:ext>
+            </a:extLst>
+          </p:cNvPr>
+          <p:cNvSpPr>
+            <a:spLocks noGrp="1"/>
+          </p:cNvSpPr>
+          <p:nvPr>
+            <p:ph idx="1"/>
+          </p:nvPr>
+        </p:nvSpPr>
+        <p:spPr/>
+        <p:txBody>
+          <a:bodyPr/>
+          <a:lstStyle/>
+          <a:p>
+            <a:r>
+              <a:rPr lang="ru-RU"/>
+              <a:t>Инструкции это тоже данные</a:t>
+            </a:r>
+          </a:p>
+          <a:p>
+            <a:r>
+              <a:rPr lang="ru-RU"/>
+              <a:t>Конвейер декодировав инструкцию сохраняет её в кэш инструкций</a:t>
+            </a:r>
+          </a:p>
+          <a:p>
+            <a:r>
+              <a:rPr lang="ru-RU"/>
+              <a:t>Таким образом</a:t>
+            </a:r>
+            <a:r>
+              <a:rPr lang="en-US"/>
+              <a:t>, </a:t>
+            </a:r>
+            <a:r>
+              <a:rPr lang="ru-RU"/>
+              <a:t>кроме </a:t>
+            </a:r>
+            <a:r>
+              <a:rPr lang="en-US"/>
+              <a:t>branch mispredict </a:t>
+            </a:r>
+            <a:r>
+              <a:rPr lang="ru-RU"/>
+              <a:t>можно рассматривать </a:t>
+            </a:r>
+            <a:r>
+              <a:rPr lang="en-US"/>
+              <a:t>instruction cache miss</a:t>
+            </a:r>
+          </a:p>
+          <a:p>
+            <a:r>
+              <a:rPr lang="ru-RU"/>
+              <a:t>Но обычно в процессоре достаточно большой кэш инструкций: речь идёт о чём-то около </a:t>
+            </a:r>
+            <a:r>
+              <a:rPr lang="ru-RU">
+                <a:latin typeface="Consolas" panose="020B0609020204030204" pitchFamily="49" charset="0"/>
+              </a:rPr>
+              <a:t>32</a:t>
+            </a:r>
+            <a:r>
+              <a:rPr lang="ru-RU"/>
+              <a:t> килобайт на каждое ядро и поэтому наглядно увидеть эффекты на простом приложении сложно</a:t>
+            </a:r>
+          </a:p>
+          <a:p>
+            <a:r>
+              <a:rPr lang="ru-RU"/>
+              <a:t>Сможете ли вы самостоятельно придумать эксперимент на кэш инструкций?</a:t>
+            </a:r>
+          </a:p>
+        </p:txBody>
+      </p:sp>
+    </p:spTree>
+    <p:extLst>
+      <p:ext uri="{BB962C8B-B14F-4D97-AF65-F5344CB8AC3E}">
+        <p14:creationId xmlns:p14="http://schemas.microsoft.com/office/powerpoint/2010/main" val="165033581"/>
+      </p:ext>
+    </p:extLst>
+  </p:cSld>
+  <p:clrMapOvr>
+    <a:masterClrMapping/>
+  </p:clrMapOvr>
+</p:sld>
+</file>
+
+<file path=ppt/slides/slide32.xml><?xml version="1.0" encoding="utf-8"?>
+<p:sld xmlns:a="http://schemas.openxmlformats.org/drawingml/2006/main" xmlns:r="http://schemas.openxmlformats.org/officeDocument/2006/relationships" xmlns:p="http://schemas.openxmlformats.org/presentationml/2006/main">
+  <p:cSld>
+    <p:spTree>
+      <p:nvGrpSpPr>
+        <p:cNvPr id="1" name=""/>
+        <p:cNvGrpSpPr/>
+        <p:nvPr/>
+      </p:nvGrpSpPr>
+      <p:grpSpPr>
+        <a:xfrm>
+          <a:off x="0" y="0"/>
+          <a:ext cx="0" cy="0"/>
+          <a:chOff x="0" y="0"/>
+          <a:chExt cx="0" cy="0"/>
+        </a:xfrm>
+      </p:grpSpPr>
+      <p:sp>
+        <p:nvSpPr>
+          <p:cNvPr id="2" name="Title 1"/>
+          <p:cNvSpPr>
+            <a:spLocks noGrp="1"/>
+          </p:cNvSpPr>
+          <p:nvPr>
+            <p:ph type="title"/>
+          </p:nvPr>
+        </p:nvSpPr>
+        <p:spPr/>
+        <p:txBody>
+          <a:bodyPr/>
+          <a:lstStyle/>
+          <a:p>
+            <a:r>
+              <a:rPr lang="ru-RU" dirty="0"/>
+              <a:t>Литература</a:t>
+            </a:r>
+            <a:endParaRPr lang="en-US" dirty="0"/>
+          </a:p>
+        </p:txBody>
+      </p:sp>
+      <mc:AlternateContent xmlns:mc="http://schemas.openxmlformats.org/markup-compatibility/2006">
+        <mc:Choice xmlns:a14="http://schemas.microsoft.com/office/drawing/2010/main" Requires="a14">
+          <p:sp>
+            <p:nvSpPr>
+              <p:cNvPr id="3" name="Content Placeholder 2"/>
+              <p:cNvSpPr>
+                <a:spLocks noGrp="1"/>
+              </p:cNvSpPr>
+              <p:nvPr>
+                <p:ph idx="1"/>
+              </p:nvPr>
+            </p:nvSpPr>
+            <p:spPr>
+              <a:xfrm>
+                <a:off x="1142999" y="2057400"/>
+                <a:ext cx="10685477" cy="4191000"/>
+              </a:xfrm>
+            </p:spPr>
+            <p:txBody>
+              <a:bodyPr>
+                <a:normAutofit/>
+              </a:bodyPr>
+              <a:lstStyle/>
+              <a:p>
+                <a:pPr lvl="0"/>
+                <a14:m>
+                  <m:oMath xmlns:m="http://schemas.openxmlformats.org/officeDocument/2006/math">
+                    <m:d>
+                      <m:dPr>
+                        <m:begChr m:val="["/>
+                        <m:endChr m:val="]"/>
+                        <m:ctrlPr>
+                          <a:rPr lang="en-US" i="1" smtClean="0">
+                            <a:latin typeface="Cambria Math" panose="02040503050406030204" pitchFamily="18" charset="0"/>
+                          </a:rPr>
+                        </m:ctrlPr>
+                      </m:dPr>
+                      <m:e>
+                        <m:r>
+                          <a:rPr lang="ru-RU" i="1">
+                            <a:latin typeface="Cambria Math" panose="02040503050406030204" pitchFamily="18" charset="0"/>
+                          </a:rPr>
+                          <m:t>С11</m:t>
+                        </m:r>
+                      </m:e>
+                    </m:d>
+                  </m:oMath>
+                </a14:m>
+                <a:r>
+                  <a:rPr lang="en-US"/>
+                  <a:t> ISO/IEC – </a:t>
+                </a:r>
+                <a:r>
+                  <a:rPr lang="en-US" dirty="0"/>
+                  <a:t>"Information </a:t>
+                </a:r>
+                <a:r>
+                  <a:rPr lang="en-US"/>
+                  <a:t>technology – </a:t>
+                </a:r>
+                <a:r>
+                  <a:rPr lang="en-US" dirty="0"/>
+                  <a:t>Programming languages </a:t>
+                </a:r>
+                <a:r>
+                  <a:rPr lang="en-US"/>
+                  <a:t>– C", </a:t>
+                </a:r>
+                <a:r>
+                  <a:rPr lang="en-US">
+                    <a:latin typeface="Consolas" panose="020B0609020204030204" pitchFamily="49" charset="0"/>
+                  </a:rPr>
+                  <a:t>2011</a:t>
+                </a:r>
+                <a:endParaRPr lang="en-US" dirty="0">
+                  <a:latin typeface="Consolas" panose="020B0609020204030204" pitchFamily="49" charset="0"/>
+                </a:endParaRPr>
+              </a:p>
+              <a:p>
+                <a:pPr lvl="0"/>
+                <a14:m>
+                  <m:oMath xmlns:m="http://schemas.openxmlformats.org/officeDocument/2006/math">
+                    <m:d>
+                      <m:dPr>
+                        <m:begChr m:val="["/>
+                        <m:endChr m:val="]"/>
+                        <m:ctrlPr>
+                          <a:rPr lang="en-US" i="1">
+                            <a:latin typeface="Cambria Math" panose="02040503050406030204" pitchFamily="18" charset="0"/>
+                          </a:rPr>
+                        </m:ctrlPr>
+                      </m:dPr>
+                      <m:e>
+                        <m:r>
+                          <a:rPr lang="en-US" i="1">
+                            <a:latin typeface="Cambria Math" panose="02040503050406030204" pitchFamily="18" charset="0"/>
+                          </a:rPr>
+                          <m:t>𝐾</m:t>
+                        </m:r>
+                        <m:r>
+                          <a:rPr lang="en-US" i="1">
+                            <a:latin typeface="Cambria Math" panose="02040503050406030204" pitchFamily="18" charset="0"/>
+                          </a:rPr>
+                          <m:t>&amp;</m:t>
+                        </m:r>
+                        <m:r>
+                          <a:rPr lang="en-US" i="1">
+                            <a:latin typeface="Cambria Math" panose="02040503050406030204" pitchFamily="18" charset="0"/>
+                          </a:rPr>
+                          <m:t>𝑅</m:t>
+                        </m:r>
+                      </m:e>
+                    </m:d>
+                  </m:oMath>
+                </a14:m>
+                <a:r>
+                  <a:rPr lang="ru-RU"/>
+                  <a:t> </a:t>
+                </a:r>
+                <a:r>
+                  <a:rPr lang="en-US"/>
+                  <a:t>Brian W. Kernighan, Dennis Ritchie –</a:t>
+                </a:r>
+                <a:r>
+                  <a:rPr lang="ru-RU"/>
+                  <a:t> </a:t>
+                </a:r>
+                <a:r>
+                  <a:rPr lang="en-US"/>
+                  <a:t>The C programming language, </a:t>
+                </a:r>
+                <a:r>
+                  <a:rPr lang="en-US">
+                    <a:latin typeface="Consolas" panose="020B0609020204030204" pitchFamily="49" charset="0"/>
+                  </a:rPr>
+                  <a:t>1988</a:t>
+                </a:r>
+              </a:p>
+              <a:p>
+                <a14:m>
+                  <m:oMath xmlns:m="http://schemas.openxmlformats.org/officeDocument/2006/math">
+                    <m:d>
+                      <m:dPr>
+                        <m:begChr m:val="["/>
+                        <m:endChr m:val="]"/>
+                        <m:ctrlPr>
+                          <a:rPr lang="en-US" i="1">
+                            <a:latin typeface="Cambria Math" panose="02040503050406030204" pitchFamily="18" charset="0"/>
+                          </a:rPr>
+                        </m:ctrlPr>
+                      </m:dPr>
+                      <m:e>
+                        <m:r>
+                          <a:rPr lang="en-US" b="0" i="1" smtClean="0">
+                            <a:latin typeface="Cambria Math" panose="02040503050406030204" pitchFamily="18" charset="0"/>
+                          </a:rPr>
+                          <m:t>𝑆𝐷𝑀</m:t>
+                        </m:r>
+                      </m:e>
+                    </m:d>
+                  </m:oMath>
+                </a14:m>
+                <a:r>
+                  <a:rPr lang="ru-RU"/>
+                  <a:t> </a:t>
+                </a:r>
+                <a:r>
+                  <a:rPr lang="en-US"/>
+                  <a:t>Intel Software Developer Manual: </a:t>
+                </a:r>
+                <a:r>
+                  <a:rPr lang="en-US">
+                    <a:hlinkClick r:id="rId2"/>
+                  </a:rPr>
+                  <a:t>intel-sdm</a:t>
+                </a:r>
+                <a:endParaRPr lang="ru-RU" i="1">
+                  <a:latin typeface="Cambria Math" panose="02040503050406030204" pitchFamily="18" charset="0"/>
+                </a:endParaRPr>
+              </a:p>
+              <a:p>
+                <a14:m>
+                  <m:oMath xmlns:m="http://schemas.openxmlformats.org/officeDocument/2006/math">
+                    <m:d>
+                      <m:dPr>
+                        <m:begChr m:val="["/>
+                        <m:endChr m:val="]"/>
+                        <m:ctrlPr>
+                          <a:rPr lang="en-US" i="1">
+                            <a:latin typeface="Cambria Math" panose="02040503050406030204" pitchFamily="18" charset="0"/>
+                          </a:rPr>
+                        </m:ctrlPr>
+                      </m:dPr>
+                      <m:e>
+                        <m:r>
+                          <a:rPr lang="en-US" b="0" i="1" smtClean="0">
+                            <a:latin typeface="Cambria Math" panose="02040503050406030204" pitchFamily="18" charset="0"/>
+                          </a:rPr>
+                          <m:t>𝑃𝑎𝑡𝑡𝑒𝑟𝑠𝑜𝑛</m:t>
+                        </m:r>
+                      </m:e>
+                    </m:d>
+                    <m:r>
+                      <a:rPr lang="en-US" b="0" i="1">
+                        <a:latin typeface="Cambria Math" panose="02040503050406030204" pitchFamily="18" charset="0"/>
+                      </a:rPr>
+                      <m:t> </m:t>
+                    </m:r>
+                  </m:oMath>
+                </a14:m>
+                <a:r>
+                  <a:rPr lang="en-US"/>
+                  <a:t>John Hennesy, David Patterson – Computer Architecture: A Quantitative Approach, </a:t>
+                </a:r>
+                <a:r>
+                  <a:rPr lang="en-US">
+                    <a:latin typeface="Consolas" panose="020B0609020204030204" pitchFamily="49" charset="0"/>
+                  </a:rPr>
+                  <a:t>2011</a:t>
+                </a:r>
+                <a:endParaRPr lang="en-US" i="1">
+                  <a:latin typeface="Consolas" panose="020B0609020204030204" pitchFamily="49" charset="0"/>
+                </a:endParaRPr>
+              </a:p>
+              <a:p>
+                <a14:m>
+                  <m:oMath xmlns:m="http://schemas.openxmlformats.org/officeDocument/2006/math">
+                    <m:d>
+                      <m:dPr>
+                        <m:begChr m:val="["/>
+                        <m:endChr m:val="]"/>
+                        <m:ctrlPr>
+                          <a:rPr lang="en-US" i="1">
+                            <a:latin typeface="Cambria Math" panose="02040503050406030204" pitchFamily="18" charset="0"/>
+                          </a:rPr>
+                        </m:ctrlPr>
+                      </m:dPr>
+                      <m:e>
+                        <m:r>
+                          <a:rPr lang="en-US" b="0" i="1" smtClean="0">
+                            <a:latin typeface="Cambria Math" panose="02040503050406030204" pitchFamily="18" charset="0"/>
+                          </a:rPr>
+                          <m:t>𝐷𝑟𝑒𝑝𝑝𝑒𝑟</m:t>
+                        </m:r>
+                      </m:e>
+                    </m:d>
+                    <m:r>
+                      <a:rPr lang="en-US" i="1">
+                        <a:latin typeface="Cambria Math" panose="02040503050406030204" pitchFamily="18" charset="0"/>
+                      </a:rPr>
+                      <m:t> </m:t>
+                    </m:r>
+                  </m:oMath>
+                </a14:m>
+                <a:r>
+                  <a:rPr lang="en-US"/>
+                  <a:t>Ulrich Drepper – What Every Programmer Should Know About Memory, </a:t>
+                </a:r>
+                <a:r>
+                  <a:rPr lang="en-US">
+                    <a:latin typeface="Consolas" panose="020B0609020204030204" pitchFamily="49" charset="0"/>
+                  </a:rPr>
+                  <a:t>2007</a:t>
+                </a:r>
+                <a:endParaRPr lang="en-US" i="1">
+                  <a:latin typeface="Cambria Math" panose="02040503050406030204" pitchFamily="18" charset="0"/>
+                </a:endParaRPr>
+              </a:p>
+              <a:p>
+                <a14:m>
+                  <m:oMath xmlns:m="http://schemas.openxmlformats.org/officeDocument/2006/math">
+                    <m:d>
+                      <m:dPr>
+                        <m:begChr m:val="["/>
+                        <m:endChr m:val="]"/>
+                        <m:ctrlPr>
+                          <a:rPr lang="en-US" i="1">
+                            <a:latin typeface="Cambria Math" panose="02040503050406030204" pitchFamily="18" charset="0"/>
+                          </a:rPr>
+                        </m:ctrlPr>
+                      </m:dPr>
+                      <m:e>
+                        <m:r>
+                          <a:rPr lang="en-US" i="1">
+                            <a:latin typeface="Cambria Math" panose="02040503050406030204" pitchFamily="18" charset="0"/>
+                          </a:rPr>
+                          <m:t>𝐿𝑖𝑛𝑑𝑒𝑛</m:t>
+                        </m:r>
+                      </m:e>
+                    </m:d>
+                  </m:oMath>
+                </a14:m>
+                <a:r>
+                  <a:rPr lang="en-US" i="1">
+                    <a:latin typeface="Cambria Math" panose="02040503050406030204" pitchFamily="18" charset="0"/>
+                  </a:rPr>
+                  <a:t> </a:t>
+                </a:r>
+                <a:r>
+                  <a:rPr lang="en-US"/>
+                  <a:t>Peter van der Linden – Expert C Programming: Deep C Secrets, </a:t>
+                </a:r>
+                <a:r>
+                  <a:rPr lang="en-US">
+                    <a:latin typeface="Consolas" panose="020B0609020204030204" pitchFamily="49" charset="0"/>
+                  </a:rPr>
+                  <a:t>1994</a:t>
+                </a:r>
+              </a:p>
+            </p:txBody>
+          </p:sp>
+        </mc:Choice>
+        <mc:Fallback>
+          <p:sp>
+            <p:nvSpPr>
+              <p:cNvPr id="3" name="Content Placeholder 2"/>
+              <p:cNvSpPr>
+                <a:spLocks noGrp="1" noRot="1" noChangeAspect="1" noMove="1" noResize="1" noEditPoints="1" noAdjustHandles="1" noChangeArrowheads="1" noChangeShapeType="1" noTextEdit="1"/>
+              </p:cNvSpPr>
+              <p:nvPr>
+                <p:ph idx="1"/>
+              </p:nvPr>
+            </p:nvSpPr>
+            <p:spPr>
+              <a:xfrm>
+                <a:off x="1142999" y="2057400"/>
+                <a:ext cx="10685477" cy="4191000"/>
+              </a:xfrm>
+              <a:blipFill>
+                <a:blip r:embed="rId3"/>
+                <a:stretch>
+                  <a:fillRect t="-1747" r="-57"/>
+                </a:stretch>
+              </a:blipFill>
+            </p:spPr>
+            <p:txBody>
+              <a:bodyPr/>
+              <a:lstStyle/>
+              <a:p>
+                <a:r>
+                  <a:rPr lang="ru-RU">
+                    <a:noFill/>
+                  </a:rPr>
+                  <a:t> </a:t>
+                </a:r>
+              </a:p>
+            </p:txBody>
+          </p:sp>
+        </mc:Fallback>
+      </mc:AlternateContent>
+    </p:spTree>
+    <p:extLst>
+      <p:ext uri="{BB962C8B-B14F-4D97-AF65-F5344CB8AC3E}">
+        <p14:creationId xmlns:p14="http://schemas.microsoft.com/office/powerpoint/2010/main" val="1719869055"/>
+      </p:ext>
+    </p:extLst>
+  </p:cSld>
+  <p:clrMapOvr>
+    <a:masterClrMapping/>
+  </p:clrMapOvr>
+</p:sld>
+</file>
+
 <file path=ppt/slides/slide4.xml><?xml version="1.0" encoding="utf-8"?>
 <p:sld xmlns:a="http://schemas.openxmlformats.org/drawingml/2006/main" xmlns:r="http://schemas.openxmlformats.org/officeDocument/2006/relationships" xmlns:p="http://schemas.openxmlformats.org/presentationml/2006/main">
   <p:cSld>

</xml_diff>